<commit_message>
Most of the gameplay is done.
</commit_message>
<xml_diff>
--- a/Assets/Textures/TextureIcons.pptx
+++ b/Assets/Textures/TextureIcons.pptx
@@ -6,45 +6,46 @@
   </p:sldMasterIdLst>
   <p:sldIdLst>
     <p:sldId id="295" r:id="rId2"/>
-    <p:sldId id="256" r:id="rId3"/>
-    <p:sldId id="298" r:id="rId4"/>
-    <p:sldId id="294" r:id="rId5"/>
-    <p:sldId id="297" r:id="rId6"/>
-    <p:sldId id="296" r:id="rId7"/>
-    <p:sldId id="257" r:id="rId8"/>
-    <p:sldId id="260" r:id="rId9"/>
-    <p:sldId id="292" r:id="rId10"/>
-    <p:sldId id="293" r:id="rId11"/>
-    <p:sldId id="262" r:id="rId12"/>
-    <p:sldId id="263" r:id="rId13"/>
-    <p:sldId id="264" r:id="rId14"/>
-    <p:sldId id="265" r:id="rId15"/>
-    <p:sldId id="266" r:id="rId16"/>
-    <p:sldId id="267" r:id="rId17"/>
-    <p:sldId id="268" r:id="rId18"/>
-    <p:sldId id="269" r:id="rId19"/>
-    <p:sldId id="270" r:id="rId20"/>
-    <p:sldId id="271" r:id="rId21"/>
-    <p:sldId id="272" r:id="rId22"/>
-    <p:sldId id="273" r:id="rId23"/>
-    <p:sldId id="274" r:id="rId24"/>
-    <p:sldId id="275" r:id="rId25"/>
-    <p:sldId id="276" r:id="rId26"/>
-    <p:sldId id="277" r:id="rId27"/>
-    <p:sldId id="278" r:id="rId28"/>
-    <p:sldId id="279" r:id="rId29"/>
-    <p:sldId id="280" r:id="rId30"/>
-    <p:sldId id="281" r:id="rId31"/>
-    <p:sldId id="282" r:id="rId32"/>
-    <p:sldId id="283" r:id="rId33"/>
-    <p:sldId id="284" r:id="rId34"/>
-    <p:sldId id="285" r:id="rId35"/>
-    <p:sldId id="286" r:id="rId36"/>
-    <p:sldId id="287" r:id="rId37"/>
-    <p:sldId id="288" r:id="rId38"/>
-    <p:sldId id="289" r:id="rId39"/>
-    <p:sldId id="290" r:id="rId40"/>
-    <p:sldId id="291" r:id="rId41"/>
+    <p:sldId id="299" r:id="rId3"/>
+    <p:sldId id="256" r:id="rId4"/>
+    <p:sldId id="298" r:id="rId5"/>
+    <p:sldId id="294" r:id="rId6"/>
+    <p:sldId id="297" r:id="rId7"/>
+    <p:sldId id="296" r:id="rId8"/>
+    <p:sldId id="257" r:id="rId9"/>
+    <p:sldId id="260" r:id="rId10"/>
+    <p:sldId id="292" r:id="rId11"/>
+    <p:sldId id="293" r:id="rId12"/>
+    <p:sldId id="262" r:id="rId13"/>
+    <p:sldId id="263" r:id="rId14"/>
+    <p:sldId id="264" r:id="rId15"/>
+    <p:sldId id="265" r:id="rId16"/>
+    <p:sldId id="266" r:id="rId17"/>
+    <p:sldId id="267" r:id="rId18"/>
+    <p:sldId id="268" r:id="rId19"/>
+    <p:sldId id="269" r:id="rId20"/>
+    <p:sldId id="270" r:id="rId21"/>
+    <p:sldId id="271" r:id="rId22"/>
+    <p:sldId id="272" r:id="rId23"/>
+    <p:sldId id="273" r:id="rId24"/>
+    <p:sldId id="274" r:id="rId25"/>
+    <p:sldId id="275" r:id="rId26"/>
+    <p:sldId id="276" r:id="rId27"/>
+    <p:sldId id="277" r:id="rId28"/>
+    <p:sldId id="278" r:id="rId29"/>
+    <p:sldId id="279" r:id="rId30"/>
+    <p:sldId id="280" r:id="rId31"/>
+    <p:sldId id="281" r:id="rId32"/>
+    <p:sldId id="282" r:id="rId33"/>
+    <p:sldId id="283" r:id="rId34"/>
+    <p:sldId id="284" r:id="rId35"/>
+    <p:sldId id="285" r:id="rId36"/>
+    <p:sldId id="286" r:id="rId37"/>
+    <p:sldId id="287" r:id="rId38"/>
+    <p:sldId id="288" r:id="rId39"/>
+    <p:sldId id="289" r:id="rId40"/>
+    <p:sldId id="290" r:id="rId41"/>
+    <p:sldId id="291" r:id="rId42"/>
   </p:sldIdLst>
   <p:sldSz cx="9144000" cy="6858000" type="screen4x3"/>
   <p:notesSz cx="6858000" cy="9144000"/>
@@ -327,7 +328,7 @@
           <a:p>
             <a:fld id="{02BB6FDC-F2C4-464B-9BAC-FAE7AFB0E257}" type="datetimeFigureOut">
               <a:rPr lang="en-IN" smtClean="0"/>
-              <a:t>11-06-2021</a:t>
+              <a:t>13-06-2021</a:t>
             </a:fld>
             <a:endParaRPr lang="en-IN"/>
           </a:p>
@@ -497,7 +498,7 @@
           <a:p>
             <a:fld id="{02BB6FDC-F2C4-464B-9BAC-FAE7AFB0E257}" type="datetimeFigureOut">
               <a:rPr lang="en-IN" smtClean="0"/>
-              <a:t>11-06-2021</a:t>
+              <a:t>13-06-2021</a:t>
             </a:fld>
             <a:endParaRPr lang="en-IN"/>
           </a:p>
@@ -677,7 +678,7 @@
           <a:p>
             <a:fld id="{02BB6FDC-F2C4-464B-9BAC-FAE7AFB0E257}" type="datetimeFigureOut">
               <a:rPr lang="en-IN" smtClean="0"/>
-              <a:t>11-06-2021</a:t>
+              <a:t>13-06-2021</a:t>
             </a:fld>
             <a:endParaRPr lang="en-IN"/>
           </a:p>
@@ -847,7 +848,7 @@
           <a:p>
             <a:fld id="{02BB6FDC-F2C4-464B-9BAC-FAE7AFB0E257}" type="datetimeFigureOut">
               <a:rPr lang="en-IN" smtClean="0"/>
-              <a:t>11-06-2021</a:t>
+              <a:t>13-06-2021</a:t>
             </a:fld>
             <a:endParaRPr lang="en-IN"/>
           </a:p>
@@ -1093,7 +1094,7 @@
           <a:p>
             <a:fld id="{02BB6FDC-F2C4-464B-9BAC-FAE7AFB0E257}" type="datetimeFigureOut">
               <a:rPr lang="en-IN" smtClean="0"/>
-              <a:t>11-06-2021</a:t>
+              <a:t>13-06-2021</a:t>
             </a:fld>
             <a:endParaRPr lang="en-IN"/>
           </a:p>
@@ -1381,7 +1382,7 @@
           <a:p>
             <a:fld id="{02BB6FDC-F2C4-464B-9BAC-FAE7AFB0E257}" type="datetimeFigureOut">
               <a:rPr lang="en-IN" smtClean="0"/>
-              <a:t>11-06-2021</a:t>
+              <a:t>13-06-2021</a:t>
             </a:fld>
             <a:endParaRPr lang="en-IN"/>
           </a:p>
@@ -1803,7 +1804,7 @@
           <a:p>
             <a:fld id="{02BB6FDC-F2C4-464B-9BAC-FAE7AFB0E257}" type="datetimeFigureOut">
               <a:rPr lang="en-IN" smtClean="0"/>
-              <a:t>11-06-2021</a:t>
+              <a:t>13-06-2021</a:t>
             </a:fld>
             <a:endParaRPr lang="en-IN"/>
           </a:p>
@@ -1921,7 +1922,7 @@
           <a:p>
             <a:fld id="{02BB6FDC-F2C4-464B-9BAC-FAE7AFB0E257}" type="datetimeFigureOut">
               <a:rPr lang="en-IN" smtClean="0"/>
-              <a:t>11-06-2021</a:t>
+              <a:t>13-06-2021</a:t>
             </a:fld>
             <a:endParaRPr lang="en-IN"/>
           </a:p>
@@ -2016,7 +2017,7 @@
           <a:p>
             <a:fld id="{02BB6FDC-F2C4-464B-9BAC-FAE7AFB0E257}" type="datetimeFigureOut">
               <a:rPr lang="en-IN" smtClean="0"/>
-              <a:t>11-06-2021</a:t>
+              <a:t>13-06-2021</a:t>
             </a:fld>
             <a:endParaRPr lang="en-IN"/>
           </a:p>
@@ -2293,7 +2294,7 @@
           <a:p>
             <a:fld id="{02BB6FDC-F2C4-464B-9BAC-FAE7AFB0E257}" type="datetimeFigureOut">
               <a:rPr lang="en-IN" smtClean="0"/>
-              <a:t>11-06-2021</a:t>
+              <a:t>13-06-2021</a:t>
             </a:fld>
             <a:endParaRPr lang="en-IN"/>
           </a:p>
@@ -2546,7 +2547,7 @@
           <a:p>
             <a:fld id="{02BB6FDC-F2C4-464B-9BAC-FAE7AFB0E257}" type="datetimeFigureOut">
               <a:rPr lang="en-IN" smtClean="0"/>
-              <a:t>11-06-2021</a:t>
+              <a:t>13-06-2021</a:t>
             </a:fld>
             <a:endParaRPr lang="en-IN"/>
           </a:p>
@@ -2764,7 +2765,7 @@
           <a:p>
             <a:fld id="{02BB6FDC-F2C4-464B-9BAC-FAE7AFB0E257}" type="datetimeFigureOut">
               <a:rPr lang="en-IN" smtClean="0"/>
-              <a:t>11-06-2021</a:t>
+              <a:t>13-06-2021</a:t>
             </a:fld>
             <a:endParaRPr lang="en-IN"/>
           </a:p>
@@ -3310,6 +3311,234 @@
       </p:grpSpPr>
       <p:sp>
         <p:nvSpPr>
+          <p:cNvPr id="2" name="Block Arc 1">
+            <a:extLst>
+              <a:ext uri="{FF2B5EF4-FFF2-40B4-BE49-F238E27FC236}">
+                <a16:creationId xmlns:a16="http://schemas.microsoft.com/office/drawing/2014/main" xmlns="" id="{50F54194-7244-4A73-A53A-5DF7B86F498D}"/>
+              </a:ext>
+            </a:extLst>
+          </p:cNvPr>
+          <p:cNvSpPr/>
+          <p:nvPr/>
+        </p:nvSpPr>
+        <p:spPr>
+          <a:xfrm>
+            <a:off x="3131820" y="1988820"/>
+            <a:ext cx="2880360" cy="2880360"/>
+          </a:xfrm>
+          <a:prstGeom prst="blockArc">
+            <a:avLst>
+              <a:gd name="adj1" fmla="val 10800000"/>
+              <a:gd name="adj2" fmla="val 9838672"/>
+              <a:gd name="adj3" fmla="val 9265"/>
+            </a:avLst>
+          </a:prstGeom>
+          <a:solidFill>
+            <a:schemeClr val="bg1"/>
+          </a:solidFill>
+          <a:ln w="190500">
+            <a:noFill/>
+          </a:ln>
+        </p:spPr>
+        <p:style>
+          <a:lnRef idx="2">
+            <a:schemeClr val="accent1">
+              <a:shade val="50000"/>
+            </a:schemeClr>
+          </a:lnRef>
+          <a:fillRef idx="1">
+            <a:schemeClr val="accent1"/>
+          </a:fillRef>
+          <a:effectRef idx="0">
+            <a:schemeClr val="accent1"/>
+          </a:effectRef>
+          <a:fontRef idx="minor">
+            <a:schemeClr val="lt1"/>
+          </a:fontRef>
+        </p:style>
+        <p:txBody>
+          <a:bodyPr rtlCol="0" anchor="ctr"/>
+          <a:lstStyle/>
+          <a:p>
+            <a:pPr algn="ctr"/>
+            <a:endParaRPr lang="en-IN"/>
+          </a:p>
+        </p:txBody>
+      </p:sp>
+      <p:sp>
+        <p:nvSpPr>
+          <p:cNvPr id="3" name="Right Triangle 2"/>
+          <p:cNvSpPr/>
+          <p:nvPr/>
+        </p:nvSpPr>
+        <p:spPr>
+          <a:xfrm rot="19800000">
+            <a:off x="2995083" y="2861428"/>
+            <a:ext cx="636815" cy="636815"/>
+          </a:xfrm>
+          <a:prstGeom prst="rtTriangle">
+            <a:avLst/>
+          </a:prstGeom>
+          <a:solidFill>
+            <a:schemeClr val="bg1"/>
+          </a:solidFill>
+          <a:ln w="190500">
+            <a:noFill/>
+          </a:ln>
+        </p:spPr>
+        <p:style>
+          <a:lnRef idx="2">
+            <a:schemeClr val="accent1">
+              <a:shade val="50000"/>
+            </a:schemeClr>
+          </a:lnRef>
+          <a:fillRef idx="1">
+            <a:schemeClr val="accent1"/>
+          </a:fillRef>
+          <a:effectRef idx="0">
+            <a:schemeClr val="accent1"/>
+          </a:effectRef>
+          <a:fontRef idx="minor">
+            <a:schemeClr val="lt1"/>
+          </a:fontRef>
+        </p:style>
+        <p:txBody>
+          <a:bodyPr rtlCol="0" anchor="ctr"/>
+          <a:lstStyle/>
+          <a:p>
+            <a:pPr algn="ctr"/>
+            <a:endParaRPr lang="en-IN"/>
+          </a:p>
+        </p:txBody>
+      </p:sp>
+      <p:sp>
+        <p:nvSpPr>
+          <p:cNvPr id="4" name="Rounded Rectangle 3"/>
+          <p:cNvSpPr/>
+          <p:nvPr/>
+        </p:nvSpPr>
+        <p:spPr>
+          <a:xfrm rot="19894297">
+            <a:off x="4248150" y="2590925"/>
+            <a:ext cx="276225" cy="1066800"/>
+          </a:xfrm>
+          <a:prstGeom prst="roundRect">
+            <a:avLst>
+              <a:gd name="adj" fmla="val 50000"/>
+            </a:avLst>
+          </a:prstGeom>
+          <a:solidFill>
+            <a:schemeClr val="bg1"/>
+          </a:solidFill>
+          <a:ln w="190500">
+            <a:noFill/>
+          </a:ln>
+        </p:spPr>
+        <p:style>
+          <a:lnRef idx="2">
+            <a:schemeClr val="accent1">
+              <a:shade val="50000"/>
+            </a:schemeClr>
+          </a:lnRef>
+          <a:fillRef idx="1">
+            <a:schemeClr val="accent1"/>
+          </a:fillRef>
+          <a:effectRef idx="0">
+            <a:schemeClr val="accent1"/>
+          </a:effectRef>
+          <a:fontRef idx="minor">
+            <a:schemeClr val="lt1"/>
+          </a:fontRef>
+        </p:style>
+        <p:txBody>
+          <a:bodyPr rtlCol="0" anchor="ctr"/>
+          <a:lstStyle/>
+          <a:p>
+            <a:pPr algn="ctr"/>
+            <a:endParaRPr lang="en-IN"/>
+          </a:p>
+        </p:txBody>
+      </p:sp>
+      <p:sp>
+        <p:nvSpPr>
+          <p:cNvPr id="5" name="Rounded Rectangle 4"/>
+          <p:cNvSpPr/>
+          <p:nvPr/>
+        </p:nvSpPr>
+        <p:spPr>
+          <a:xfrm rot="17100000">
+            <a:off x="4846746" y="3081389"/>
+            <a:ext cx="276225" cy="1066800"/>
+          </a:xfrm>
+          <a:prstGeom prst="roundRect">
+            <a:avLst>
+              <a:gd name="adj" fmla="val 50000"/>
+            </a:avLst>
+          </a:prstGeom>
+          <a:solidFill>
+            <a:schemeClr val="bg1"/>
+          </a:solidFill>
+          <a:ln w="190500">
+            <a:noFill/>
+          </a:ln>
+        </p:spPr>
+        <p:style>
+          <a:lnRef idx="2">
+            <a:schemeClr val="accent1">
+              <a:shade val="50000"/>
+            </a:schemeClr>
+          </a:lnRef>
+          <a:fillRef idx="1">
+            <a:schemeClr val="accent1"/>
+          </a:fillRef>
+          <a:effectRef idx="0">
+            <a:schemeClr val="accent1"/>
+          </a:effectRef>
+          <a:fontRef idx="minor">
+            <a:schemeClr val="lt1"/>
+          </a:fontRef>
+        </p:style>
+        <p:txBody>
+          <a:bodyPr rtlCol="0" anchor="ctr"/>
+          <a:lstStyle/>
+          <a:p>
+            <a:pPr algn="ctr"/>
+            <a:endParaRPr lang="en-IN"/>
+          </a:p>
+        </p:txBody>
+      </p:sp>
+    </p:spTree>
+    <p:extLst>
+      <p:ext uri="{BB962C8B-B14F-4D97-AF65-F5344CB8AC3E}">
+        <p14:creationId xmlns:p14="http://schemas.microsoft.com/office/powerpoint/2010/main" val="745623334"/>
+      </p:ext>
+    </p:extLst>
+  </p:cSld>
+  <p:clrMapOvr>
+    <a:masterClrMapping/>
+  </p:clrMapOvr>
+</p:sld>
+</file>
+
+<file path=ppt/slides/slide11.xml><?xml version="1.0" encoding="utf-8"?>
+<p:sld xmlns:a="http://schemas.openxmlformats.org/drawingml/2006/main" xmlns:r="http://schemas.openxmlformats.org/officeDocument/2006/relationships" xmlns:p="http://schemas.openxmlformats.org/presentationml/2006/main">
+  <p:cSld>
+    <p:spTree>
+      <p:nvGrpSpPr>
+        <p:cNvPr id="1" name=""/>
+        <p:cNvGrpSpPr/>
+        <p:nvPr/>
+      </p:nvGrpSpPr>
+      <p:grpSpPr>
+        <a:xfrm>
+          <a:off x="0" y="0"/>
+          <a:ext cx="0" cy="0"/>
+          <a:chOff x="0" y="0"/>
+          <a:chExt cx="0" cy="0"/>
+        </a:xfrm>
+      </p:grpSpPr>
+      <p:sp>
+        <p:nvSpPr>
           <p:cNvPr id="6" name="Oval 5"/>
           <p:cNvSpPr/>
           <p:nvPr/>
@@ -3369,7 +3598,7 @@
 </p:sld>
 </file>
 
-<file path=ppt/slides/slide11.xml><?xml version="1.0" encoding="utf-8"?>
+<file path=ppt/slides/slide12.xml><?xml version="1.0" encoding="utf-8"?>
 <p:sld xmlns:a="http://schemas.openxmlformats.org/drawingml/2006/main" xmlns:r="http://schemas.openxmlformats.org/officeDocument/2006/relationships" xmlns:p="http://schemas.openxmlformats.org/presentationml/2006/main">
   <p:cSld>
     <p:spTree>
@@ -3391,7 +3620,7 @@
           <p:cNvPr id="3" name="Rectangle: Rounded Corners 2">
             <a:extLst>
               <a:ext uri="{FF2B5EF4-FFF2-40B4-BE49-F238E27FC236}">
-                <a16:creationId xmlns="" xmlns:a16="http://schemas.microsoft.com/office/drawing/2014/main" id="{59DB4196-0687-4E82-A4C2-1855B40742C9}"/>
+                <a16:creationId xmlns:a16="http://schemas.microsoft.com/office/drawing/2014/main" xmlns="" id="{59DB4196-0687-4E82-A4C2-1855B40742C9}"/>
               </a:ext>
             </a:extLst>
           </p:cNvPr>
@@ -3462,7 +3691,7 @@
 </p:sld>
 </file>
 
-<file path=ppt/slides/slide12.xml><?xml version="1.0" encoding="utf-8"?>
+<file path=ppt/slides/slide13.xml><?xml version="1.0" encoding="utf-8"?>
 <p:sld xmlns:a="http://schemas.openxmlformats.org/drawingml/2006/main" xmlns:r="http://schemas.openxmlformats.org/officeDocument/2006/relationships" xmlns:p="http://schemas.openxmlformats.org/presentationml/2006/main">
   <p:cSld>
     <p:spTree>
@@ -3484,7 +3713,7 @@
           <p:cNvPr id="1028" name="Picture 4" descr="Breakfast, dinner, eat, eatery, eating, food, fork, kitchen, mall, menu,  restaurant, spoon icon">
             <a:extLst>
               <a:ext uri="{FF2B5EF4-FFF2-40B4-BE49-F238E27FC236}">
-                <a16:creationId xmlns="" xmlns:a16="http://schemas.microsoft.com/office/drawing/2014/main" id="{134BC9E7-1648-4284-8F8B-F48D3A77279E}"/>
+                <a16:creationId xmlns:a16="http://schemas.microsoft.com/office/drawing/2014/main" xmlns="" id="{134BC9E7-1648-4284-8F8B-F48D3A77279E}"/>
               </a:ext>
             </a:extLst>
           </p:cNvPr>
@@ -3531,7 +3760,7 @@
           <p:cNvPr id="17" name="Rectangle: Rounded Corners 16">
             <a:extLst>
               <a:ext uri="{FF2B5EF4-FFF2-40B4-BE49-F238E27FC236}">
-                <a16:creationId xmlns="" xmlns:a16="http://schemas.microsoft.com/office/drawing/2014/main" id="{8FF52E4B-F4AD-49B2-ADC5-256CFA6FC62C}"/>
+                <a16:creationId xmlns:a16="http://schemas.microsoft.com/office/drawing/2014/main" xmlns="" id="{8FF52E4B-F4AD-49B2-ADC5-256CFA6FC62C}"/>
               </a:ext>
             </a:extLst>
           </p:cNvPr>
@@ -3585,7 +3814,7 @@
           <p:cNvPr id="21" name="Rectangle: Rounded Corners 20">
             <a:extLst>
               <a:ext uri="{FF2B5EF4-FFF2-40B4-BE49-F238E27FC236}">
-                <a16:creationId xmlns="" xmlns:a16="http://schemas.microsoft.com/office/drawing/2014/main" id="{7A457185-7D9B-4F78-8A69-D2072A09BBEE}"/>
+                <a16:creationId xmlns:a16="http://schemas.microsoft.com/office/drawing/2014/main" xmlns="" id="{7A457185-7D9B-4F78-8A69-D2072A09BBEE}"/>
               </a:ext>
             </a:extLst>
           </p:cNvPr>
@@ -3647,7 +3876,7 @@
 </p:sld>
 </file>
 
-<file path=ppt/slides/slide13.xml><?xml version="1.0" encoding="utf-8"?>
+<file path=ppt/slides/slide14.xml><?xml version="1.0" encoding="utf-8"?>
 <p:sld xmlns:a="http://schemas.openxmlformats.org/drawingml/2006/main" xmlns:r="http://schemas.openxmlformats.org/officeDocument/2006/relationships" xmlns:p="http://schemas.openxmlformats.org/presentationml/2006/main">
   <p:cSld>
     <p:spTree>
@@ -3669,7 +3898,7 @@
           <p:cNvPr id="2050" name="Picture 2" descr="trash can,garbage can,rubbish bin icon - Buy this stock vector and explore  similar vectors at Adobe Stock | Adobe Stock">
             <a:extLst>
               <a:ext uri="{FF2B5EF4-FFF2-40B4-BE49-F238E27FC236}">
-                <a16:creationId xmlns="" xmlns:a16="http://schemas.microsoft.com/office/drawing/2014/main" id="{6AC0D9C4-4466-472E-B18A-1B3485F670A7}"/>
+                <a16:creationId xmlns:a16="http://schemas.microsoft.com/office/drawing/2014/main" xmlns="" id="{6AC0D9C4-4466-472E-B18A-1B3485F670A7}"/>
               </a:ext>
             </a:extLst>
           </p:cNvPr>
@@ -3716,7 +3945,7 @@
           <p:cNvPr id="2" name="Rectangle: Rounded Corners 1">
             <a:extLst>
               <a:ext uri="{FF2B5EF4-FFF2-40B4-BE49-F238E27FC236}">
-                <a16:creationId xmlns="" xmlns:a16="http://schemas.microsoft.com/office/drawing/2014/main" id="{C90FD948-D8A7-44C8-B812-1049E19BDCCC}"/>
+                <a16:creationId xmlns:a16="http://schemas.microsoft.com/office/drawing/2014/main" xmlns="" id="{C90FD948-D8A7-44C8-B812-1049E19BDCCC}"/>
               </a:ext>
             </a:extLst>
           </p:cNvPr>
@@ -3783,7 +4012,7 @@
 </p:sld>
 </file>
 
-<file path=ppt/slides/slide14.xml><?xml version="1.0" encoding="utf-8"?>
+<file path=ppt/slides/slide15.xml><?xml version="1.0" encoding="utf-8"?>
 <p:sld xmlns:a="http://schemas.openxmlformats.org/drawingml/2006/main" xmlns:r="http://schemas.openxmlformats.org/officeDocument/2006/relationships" xmlns:p="http://schemas.openxmlformats.org/presentationml/2006/main">
   <p:cSld>
     <p:spTree>
@@ -3805,7 +4034,7 @@
           <p:cNvPr id="16" name="Group 15">
             <a:extLst>
               <a:ext uri="{FF2B5EF4-FFF2-40B4-BE49-F238E27FC236}">
-                <a16:creationId xmlns="" xmlns:a16="http://schemas.microsoft.com/office/drawing/2014/main" id="{FBB9A665-68B6-4A50-A463-D808E77EBC3A}"/>
+                <a16:creationId xmlns:a16="http://schemas.microsoft.com/office/drawing/2014/main" xmlns="" id="{FBB9A665-68B6-4A50-A463-D808E77EBC3A}"/>
               </a:ext>
             </a:extLst>
           </p:cNvPr>
@@ -3825,7 +4054,7 @@
             <p:cNvPr id="3" name="Rectangle: Rounded Corners 2">
               <a:extLst>
                 <a:ext uri="{FF2B5EF4-FFF2-40B4-BE49-F238E27FC236}">
-                  <a16:creationId xmlns="" xmlns:a16="http://schemas.microsoft.com/office/drawing/2014/main" id="{83DB1C8D-34C1-4F43-9AEF-3E14743EEFF9}"/>
+                  <a16:creationId xmlns:a16="http://schemas.microsoft.com/office/drawing/2014/main" xmlns="" id="{83DB1C8D-34C1-4F43-9AEF-3E14743EEFF9}"/>
                 </a:ext>
               </a:extLst>
             </p:cNvPr>
@@ -3879,7 +4108,7 @@
             <p:cNvPr id="13" name="Rectangle: Rounded Corners 12">
               <a:extLst>
                 <a:ext uri="{FF2B5EF4-FFF2-40B4-BE49-F238E27FC236}">
-                  <a16:creationId xmlns="" xmlns:a16="http://schemas.microsoft.com/office/drawing/2014/main" id="{DB98CEC5-767D-492A-A315-5BB4560B0615}"/>
+                  <a16:creationId xmlns:a16="http://schemas.microsoft.com/office/drawing/2014/main" xmlns="" id="{DB98CEC5-767D-492A-A315-5BB4560B0615}"/>
                 </a:ext>
               </a:extLst>
             </p:cNvPr>
@@ -3933,7 +4162,7 @@
             <p:cNvPr id="14" name="Rectangle: Rounded Corners 13">
               <a:extLst>
                 <a:ext uri="{FF2B5EF4-FFF2-40B4-BE49-F238E27FC236}">
-                  <a16:creationId xmlns="" xmlns:a16="http://schemas.microsoft.com/office/drawing/2014/main" id="{3EB5E80A-68F6-4147-BCFF-F74DA3DB3E46}"/>
+                  <a16:creationId xmlns:a16="http://schemas.microsoft.com/office/drawing/2014/main" xmlns="" id="{3EB5E80A-68F6-4147-BCFF-F74DA3DB3E46}"/>
                 </a:ext>
               </a:extLst>
             </p:cNvPr>
@@ -3987,7 +4216,7 @@
             <p:cNvPr id="4" name="Group 3">
               <a:extLst>
                 <a:ext uri="{FF2B5EF4-FFF2-40B4-BE49-F238E27FC236}">
-                  <a16:creationId xmlns="" xmlns:a16="http://schemas.microsoft.com/office/drawing/2014/main" id="{C09CA0B7-DD08-4A0C-8031-8221863EB4B6}"/>
+                  <a16:creationId xmlns:a16="http://schemas.microsoft.com/office/drawing/2014/main" xmlns="" id="{C09CA0B7-DD08-4A0C-8031-8221863EB4B6}"/>
                 </a:ext>
               </a:extLst>
             </p:cNvPr>
@@ -4007,7 +4236,7 @@
               <p:cNvPr id="7" name="Rectangle: Rounded Corners 6">
                 <a:extLst>
                   <a:ext uri="{FF2B5EF4-FFF2-40B4-BE49-F238E27FC236}">
-                    <a16:creationId xmlns="" xmlns:a16="http://schemas.microsoft.com/office/drawing/2014/main" id="{176F5D69-CC78-4939-AFF5-F034C6E99C75}"/>
+                    <a16:creationId xmlns:a16="http://schemas.microsoft.com/office/drawing/2014/main" xmlns="" id="{176F5D69-CC78-4939-AFF5-F034C6E99C75}"/>
                   </a:ext>
                 </a:extLst>
               </p:cNvPr>
@@ -4061,7 +4290,7 @@
               <p:cNvPr id="10" name="Rectangle: Rounded Corners 9">
                 <a:extLst>
                   <a:ext uri="{FF2B5EF4-FFF2-40B4-BE49-F238E27FC236}">
-                    <a16:creationId xmlns="" xmlns:a16="http://schemas.microsoft.com/office/drawing/2014/main" id="{1E96A16F-B596-4FBA-B592-5FC334CF80DF}"/>
+                    <a16:creationId xmlns:a16="http://schemas.microsoft.com/office/drawing/2014/main" xmlns="" id="{1E96A16F-B596-4FBA-B592-5FC334CF80DF}"/>
                   </a:ext>
                 </a:extLst>
               </p:cNvPr>
@@ -4115,7 +4344,7 @@
               <p:cNvPr id="15" name="Rectangle: Rounded Corners 14">
                 <a:extLst>
                   <a:ext uri="{FF2B5EF4-FFF2-40B4-BE49-F238E27FC236}">
-                    <a16:creationId xmlns="" xmlns:a16="http://schemas.microsoft.com/office/drawing/2014/main" id="{7EDBA7E2-0AE8-47A3-92EA-137D8F358368}"/>
+                    <a16:creationId xmlns:a16="http://schemas.microsoft.com/office/drawing/2014/main" xmlns="" id="{7EDBA7E2-0AE8-47A3-92EA-137D8F358368}"/>
                   </a:ext>
                 </a:extLst>
               </p:cNvPr>
@@ -4179,7 +4408,7 @@
 </p:sld>
 </file>
 
-<file path=ppt/slides/slide15.xml><?xml version="1.0" encoding="utf-8"?>
+<file path=ppt/slides/slide16.xml><?xml version="1.0" encoding="utf-8"?>
 <p:sld xmlns:a="http://schemas.openxmlformats.org/drawingml/2006/main" xmlns:r="http://schemas.openxmlformats.org/officeDocument/2006/relationships" xmlns:p="http://schemas.openxmlformats.org/presentationml/2006/main">
   <p:cSld>
     <p:spTree>
@@ -4201,7 +4430,7 @@
           <p:cNvPr id="4" name="Picture 3">
             <a:extLst>
               <a:ext uri="{FF2B5EF4-FFF2-40B4-BE49-F238E27FC236}">
-                <a16:creationId xmlns="" xmlns:a16="http://schemas.microsoft.com/office/drawing/2014/main" id="{893C1B8B-E02B-4818-96B2-9BF08A7E2397}"/>
+                <a16:creationId xmlns:a16="http://schemas.microsoft.com/office/drawing/2014/main" xmlns="" id="{893C1B8B-E02B-4818-96B2-9BF08A7E2397}"/>
               </a:ext>
             </a:extLst>
           </p:cNvPr>
@@ -4237,7 +4466,7 @@
           <p:cNvPr id="6" name="Rectangle: Rounded Corners 5">
             <a:extLst>
               <a:ext uri="{FF2B5EF4-FFF2-40B4-BE49-F238E27FC236}">
-                <a16:creationId xmlns="" xmlns:a16="http://schemas.microsoft.com/office/drawing/2014/main" id="{B678A86C-6BC7-45F6-8B5A-F11EAEB83302}"/>
+                <a16:creationId xmlns:a16="http://schemas.microsoft.com/office/drawing/2014/main" xmlns="" id="{B678A86C-6BC7-45F6-8B5A-F11EAEB83302}"/>
               </a:ext>
             </a:extLst>
           </p:cNvPr>
@@ -4293,7 +4522,7 @@
           <p:cNvPr id="8" name="Group 7">
             <a:extLst>
               <a:ext uri="{FF2B5EF4-FFF2-40B4-BE49-F238E27FC236}">
-                <a16:creationId xmlns="" xmlns:a16="http://schemas.microsoft.com/office/drawing/2014/main" id="{41D584BE-0950-4B76-BAF0-054E324A1ECE}"/>
+                <a16:creationId xmlns:a16="http://schemas.microsoft.com/office/drawing/2014/main" xmlns="" id="{41D584BE-0950-4B76-BAF0-054E324A1ECE}"/>
               </a:ext>
             </a:extLst>
           </p:cNvPr>
@@ -4320,7 +4549,7 @@
             <p:cNvPr id="9" name="Rectangle: Rounded Corners 8">
               <a:extLst>
                 <a:ext uri="{FF2B5EF4-FFF2-40B4-BE49-F238E27FC236}">
-                  <a16:creationId xmlns="" xmlns:a16="http://schemas.microsoft.com/office/drawing/2014/main" id="{7CF64681-4B56-48E5-8473-9C2EEF5315A1}"/>
+                  <a16:creationId xmlns:a16="http://schemas.microsoft.com/office/drawing/2014/main" xmlns="" id="{7CF64681-4B56-48E5-8473-9C2EEF5315A1}"/>
                 </a:ext>
               </a:extLst>
             </p:cNvPr>
@@ -4372,7 +4601,7 @@
             <p:cNvPr id="10" name="Rectangle: Rounded Corners 9">
               <a:extLst>
                 <a:ext uri="{FF2B5EF4-FFF2-40B4-BE49-F238E27FC236}">
-                  <a16:creationId xmlns="" xmlns:a16="http://schemas.microsoft.com/office/drawing/2014/main" id="{FEC3FF94-A7BD-49A1-9D72-854FC6DF720B}"/>
+                  <a16:creationId xmlns:a16="http://schemas.microsoft.com/office/drawing/2014/main" xmlns="" id="{FEC3FF94-A7BD-49A1-9D72-854FC6DF720B}"/>
                 </a:ext>
               </a:extLst>
             </p:cNvPr>
@@ -4429,7 +4658,7 @@
           <p:cNvPr id="11" name="Rectangle: Rounded Corners 10">
             <a:extLst>
               <a:ext uri="{FF2B5EF4-FFF2-40B4-BE49-F238E27FC236}">
-                <a16:creationId xmlns="" xmlns:a16="http://schemas.microsoft.com/office/drawing/2014/main" id="{39E6E6C5-8ECD-4AC2-9314-A0D9C7964A9D}"/>
+                <a16:creationId xmlns:a16="http://schemas.microsoft.com/office/drawing/2014/main" xmlns="" id="{39E6E6C5-8ECD-4AC2-9314-A0D9C7964A9D}"/>
               </a:ext>
             </a:extLst>
           </p:cNvPr>
@@ -4483,7 +4712,7 @@
           <p:cNvPr id="5" name="Group 4">
             <a:extLst>
               <a:ext uri="{FF2B5EF4-FFF2-40B4-BE49-F238E27FC236}">
-                <a16:creationId xmlns="" xmlns:a16="http://schemas.microsoft.com/office/drawing/2014/main" id="{00607648-5214-4A6A-9269-7EE828B6459D}"/>
+                <a16:creationId xmlns:a16="http://schemas.microsoft.com/office/drawing/2014/main" xmlns="" id="{00607648-5214-4A6A-9269-7EE828B6459D}"/>
               </a:ext>
             </a:extLst>
           </p:cNvPr>
@@ -4503,7 +4732,7 @@
             <p:cNvPr id="2" name="Flowchart: Off-page Connector 1">
               <a:extLst>
                 <a:ext uri="{FF2B5EF4-FFF2-40B4-BE49-F238E27FC236}">
-                  <a16:creationId xmlns="" xmlns:a16="http://schemas.microsoft.com/office/drawing/2014/main" id="{022A41D4-8D7D-4F11-AE22-07A76C42B5C5}"/>
+                  <a16:creationId xmlns:a16="http://schemas.microsoft.com/office/drawing/2014/main" xmlns="" id="{022A41D4-8D7D-4F11-AE22-07A76C42B5C5}"/>
                 </a:ext>
               </a:extLst>
             </p:cNvPr>
@@ -4557,7 +4786,7 @@
             <p:cNvPr id="12" name="Flowchart: Off-page Connector 11">
               <a:extLst>
                 <a:ext uri="{FF2B5EF4-FFF2-40B4-BE49-F238E27FC236}">
-                  <a16:creationId xmlns="" xmlns:a16="http://schemas.microsoft.com/office/drawing/2014/main" id="{BC8BA1D5-5BDD-451B-8FE5-5776D661984E}"/>
+                  <a16:creationId xmlns:a16="http://schemas.microsoft.com/office/drawing/2014/main" xmlns="" id="{BC8BA1D5-5BDD-451B-8FE5-5776D661984E}"/>
                 </a:ext>
               </a:extLst>
             </p:cNvPr>
@@ -4610,7 +4839,7 @@
             <p:cNvPr id="14" name="Flowchart: Off-page Connector 13">
               <a:extLst>
                 <a:ext uri="{FF2B5EF4-FFF2-40B4-BE49-F238E27FC236}">
-                  <a16:creationId xmlns="" xmlns:a16="http://schemas.microsoft.com/office/drawing/2014/main" id="{8EF4A54E-54C3-4523-AEA9-926E131C3E87}"/>
+                  <a16:creationId xmlns:a16="http://schemas.microsoft.com/office/drawing/2014/main" xmlns="" id="{8EF4A54E-54C3-4523-AEA9-926E131C3E87}"/>
                 </a:ext>
               </a:extLst>
             </p:cNvPr>
@@ -4663,7 +4892,7 @@
           <p:cNvPr id="17" name="Flowchart: Off-page Connector 16">
             <a:extLst>
               <a:ext uri="{FF2B5EF4-FFF2-40B4-BE49-F238E27FC236}">
-                <a16:creationId xmlns="" xmlns:a16="http://schemas.microsoft.com/office/drawing/2014/main" id="{135B49B5-57F3-46FC-A1B0-9359315003EB}"/>
+                <a16:creationId xmlns:a16="http://schemas.microsoft.com/office/drawing/2014/main" xmlns="" id="{135B49B5-57F3-46FC-A1B0-9359315003EB}"/>
               </a:ext>
             </a:extLst>
           </p:cNvPr>
@@ -4792,7 +5021,7 @@
           <p:cNvPr id="18" name="Flowchart: Off-page Connector 17">
             <a:extLst>
               <a:ext uri="{FF2B5EF4-FFF2-40B4-BE49-F238E27FC236}">
-                <a16:creationId xmlns="" xmlns:a16="http://schemas.microsoft.com/office/drawing/2014/main" id="{E737D2D3-78EF-4E68-B92A-064A22C23820}"/>
+                <a16:creationId xmlns:a16="http://schemas.microsoft.com/office/drawing/2014/main" xmlns="" id="{E737D2D3-78EF-4E68-B92A-064A22C23820}"/>
               </a:ext>
             </a:extLst>
           </p:cNvPr>
@@ -4920,7 +5149,7 @@
           <p:cNvPr id="19" name="Flowchart: Off-page Connector 18">
             <a:extLst>
               <a:ext uri="{FF2B5EF4-FFF2-40B4-BE49-F238E27FC236}">
-                <a16:creationId xmlns="" xmlns:a16="http://schemas.microsoft.com/office/drawing/2014/main" id="{6F2D6C6C-F6B2-4AD6-A355-88D152E7ABBE}"/>
+                <a16:creationId xmlns:a16="http://schemas.microsoft.com/office/drawing/2014/main" xmlns="" id="{6F2D6C6C-F6B2-4AD6-A355-88D152E7ABBE}"/>
               </a:ext>
             </a:extLst>
           </p:cNvPr>
@@ -5062,7 +5291,7 @@
 </p:sld>
 </file>
 
-<file path=ppt/slides/slide16.xml><?xml version="1.0" encoding="utf-8"?>
+<file path=ppt/slides/slide17.xml><?xml version="1.0" encoding="utf-8"?>
 <p:sld xmlns:a="http://schemas.openxmlformats.org/drawingml/2006/main" xmlns:r="http://schemas.openxmlformats.org/officeDocument/2006/relationships" xmlns:p="http://schemas.openxmlformats.org/presentationml/2006/main">
   <p:cSld>
     <p:spTree>
@@ -5084,7 +5313,7 @@
           <p:cNvPr id="3" name="Speech Bubble: Oval 2">
             <a:extLst>
               <a:ext uri="{FF2B5EF4-FFF2-40B4-BE49-F238E27FC236}">
-                <a16:creationId xmlns="" xmlns:a16="http://schemas.microsoft.com/office/drawing/2014/main" id="{79F1B147-DA1D-4AF8-951E-F8176B89679F}"/>
+                <a16:creationId xmlns:a16="http://schemas.microsoft.com/office/drawing/2014/main" xmlns="" id="{79F1B147-DA1D-4AF8-951E-F8176B89679F}"/>
               </a:ext>
             </a:extLst>
           </p:cNvPr>
@@ -5147,7 +5376,7 @@
 </p:sld>
 </file>
 
-<file path=ppt/slides/slide17.xml><?xml version="1.0" encoding="utf-8"?>
+<file path=ppt/slides/slide18.xml><?xml version="1.0" encoding="utf-8"?>
 <p:sld xmlns:a="http://schemas.openxmlformats.org/drawingml/2006/main" xmlns:r="http://schemas.openxmlformats.org/officeDocument/2006/relationships" xmlns:p="http://schemas.openxmlformats.org/presentationml/2006/main">
   <p:cSld>
     <p:spTree>
@@ -5169,7 +5398,7 @@
           <p:cNvPr id="4" name="Rectangle: Rounded Corners 3">
             <a:extLst>
               <a:ext uri="{FF2B5EF4-FFF2-40B4-BE49-F238E27FC236}">
-                <a16:creationId xmlns="" xmlns:a16="http://schemas.microsoft.com/office/drawing/2014/main" id="{532DB011-E88D-4B95-B5E6-96CC2D277837}"/>
+                <a16:creationId xmlns:a16="http://schemas.microsoft.com/office/drawing/2014/main" xmlns="" id="{532DB011-E88D-4B95-B5E6-96CC2D277837}"/>
               </a:ext>
             </a:extLst>
           </p:cNvPr>
@@ -5225,7 +5454,7 @@
           <p:cNvPr id="5" name="Rectangle: Rounded Corners 4">
             <a:extLst>
               <a:ext uri="{FF2B5EF4-FFF2-40B4-BE49-F238E27FC236}">
-                <a16:creationId xmlns="" xmlns:a16="http://schemas.microsoft.com/office/drawing/2014/main" id="{90B2765F-ADB7-44D8-940A-CB41C96B4176}"/>
+                <a16:creationId xmlns:a16="http://schemas.microsoft.com/office/drawing/2014/main" xmlns="" id="{90B2765F-ADB7-44D8-940A-CB41C96B4176}"/>
               </a:ext>
             </a:extLst>
           </p:cNvPr>
@@ -5289,7 +5518,7 @@
 </p:sld>
 </file>
 
-<file path=ppt/slides/slide18.xml><?xml version="1.0" encoding="utf-8"?>
+<file path=ppt/slides/slide19.xml><?xml version="1.0" encoding="utf-8"?>
 <p:sld xmlns:a="http://schemas.openxmlformats.org/drawingml/2006/main" xmlns:r="http://schemas.openxmlformats.org/officeDocument/2006/relationships" xmlns:p="http://schemas.openxmlformats.org/presentationml/2006/main">
   <p:cSld>
     <p:spTree>
@@ -5311,7 +5540,7 @@
           <p:cNvPr id="4" name="Picture 3">
             <a:extLst>
               <a:ext uri="{FF2B5EF4-FFF2-40B4-BE49-F238E27FC236}">
-                <a16:creationId xmlns="" xmlns:a16="http://schemas.microsoft.com/office/drawing/2014/main" id="{29C3914B-9583-47E8-B98E-4081628F9CF2}"/>
+                <a16:creationId xmlns:a16="http://schemas.microsoft.com/office/drawing/2014/main" xmlns="" id="{29C3914B-9583-47E8-B98E-4081628F9CF2}"/>
               </a:ext>
             </a:extLst>
           </p:cNvPr>
@@ -5347,7 +5576,7 @@
           <p:cNvPr id="5" name="Heart 4">
             <a:extLst>
               <a:ext uri="{FF2B5EF4-FFF2-40B4-BE49-F238E27FC236}">
-                <a16:creationId xmlns="" xmlns:a16="http://schemas.microsoft.com/office/drawing/2014/main" id="{A9CB7D6B-1111-45B7-9BE6-9F6A4DE67728}"/>
+                <a16:creationId xmlns:a16="http://schemas.microsoft.com/office/drawing/2014/main" xmlns="" id="{A9CB7D6B-1111-45B7-9BE6-9F6A4DE67728}"/>
               </a:ext>
             </a:extLst>
           </p:cNvPr>
@@ -5418,7 +5647,1725 @@
 </p:sld>
 </file>
 
-<file path=ppt/slides/slide19.xml><?xml version="1.0" encoding="utf-8"?>
+<file path=ppt/slides/slide2.xml><?xml version="1.0" encoding="utf-8"?>
+<p:sld xmlns:a="http://schemas.openxmlformats.org/drawingml/2006/main" xmlns:r="http://schemas.openxmlformats.org/officeDocument/2006/relationships" xmlns:p="http://schemas.openxmlformats.org/presentationml/2006/main">
+  <p:cSld>
+    <p:spTree>
+      <p:nvGrpSpPr>
+        <p:cNvPr id="1" name=""/>
+        <p:cNvGrpSpPr/>
+        <p:nvPr/>
+      </p:nvGrpSpPr>
+      <p:grpSpPr>
+        <a:xfrm>
+          <a:off x="0" y="0"/>
+          <a:ext cx="0" cy="0"/>
+          <a:chOff x="0" y="0"/>
+          <a:chExt cx="0" cy="0"/>
+        </a:xfrm>
+      </p:grpSpPr>
+      <p:pic>
+        <p:nvPicPr>
+          <p:cNvPr id="1026" name="Picture 2" descr="Cricket Logo Clip Art - Royalty Free - GoGraph"/>
+          <p:cNvPicPr>
+            <a:picLocks noChangeAspect="1" noChangeArrowheads="1"/>
+          </p:cNvPicPr>
+          <p:nvPr/>
+        </p:nvPicPr>
+        <p:blipFill>
+          <a:blip r:embed="rId2">
+            <a:extLst>
+              <a:ext uri="{28A0092B-C50C-407E-A947-70E740481C1C}">
+                <a14:useLocalDpi xmlns:a14="http://schemas.microsoft.com/office/drawing/2010/main" val="0"/>
+              </a:ext>
+            </a:extLst>
+          </a:blip>
+          <a:srcRect/>
+          <a:stretch>
+            <a:fillRect/>
+          </a:stretch>
+        </p:blipFill>
+        <p:spPr bwMode="auto">
+          <a:xfrm>
+            <a:off x="-3397705" y="-185005"/>
+            <a:ext cx="6301924" cy="6582012"/>
+          </a:xfrm>
+          <a:prstGeom prst="rect">
+            <a:avLst/>
+          </a:prstGeom>
+          <a:noFill/>
+          <a:extLst>
+            <a:ext uri="{909E8E84-426E-40DD-AFC4-6F175D3DCCD1}">
+              <a14:hiddenFill xmlns:a14="http://schemas.microsoft.com/office/drawing/2010/main">
+                <a:solidFill>
+                  <a:srgbClr val="FFFFFF"/>
+                </a:solidFill>
+              </a14:hiddenFill>
+            </a:ext>
+          </a:extLst>
+        </p:spPr>
+      </p:pic>
+      <p:sp>
+        <p:nvSpPr>
+          <p:cNvPr id="14" name="Oval 10"/>
+          <p:cNvSpPr/>
+          <p:nvPr/>
+        </p:nvSpPr>
+        <p:spPr>
+          <a:xfrm>
+            <a:off x="2017201" y="976326"/>
+            <a:ext cx="4920855" cy="4905345"/>
+          </a:xfrm>
+          <a:custGeom>
+            <a:avLst/>
+            <a:gdLst>
+              <a:gd name="connsiteX0" fmla="*/ 0 w 3600450"/>
+              <a:gd name="connsiteY0" fmla="*/ 1800225 h 3600450"/>
+              <a:gd name="connsiteX1" fmla="*/ 1800225 w 3600450"/>
+              <a:gd name="connsiteY1" fmla="*/ 0 h 3600450"/>
+              <a:gd name="connsiteX2" fmla="*/ 3600450 w 3600450"/>
+              <a:gd name="connsiteY2" fmla="*/ 1800225 h 3600450"/>
+              <a:gd name="connsiteX3" fmla="*/ 1800225 w 3600450"/>
+              <a:gd name="connsiteY3" fmla="*/ 3600450 h 3600450"/>
+              <a:gd name="connsiteX4" fmla="*/ 0 w 3600450"/>
+              <a:gd name="connsiteY4" fmla="*/ 1800225 h 3600450"/>
+              <a:gd name="connsiteX0" fmla="*/ 0 w 3607087"/>
+              <a:gd name="connsiteY0" fmla="*/ 1980882 h 3781107"/>
+              <a:gd name="connsiteX1" fmla="*/ 1800225 w 3607087"/>
+              <a:gd name="connsiteY1" fmla="*/ 180657 h 3781107"/>
+              <a:gd name="connsiteX2" fmla="*/ 2387150 w 3607087"/>
+              <a:gd name="connsiteY2" fmla="*/ 266521 h 3781107"/>
+              <a:gd name="connsiteX3" fmla="*/ 3600450 w 3607087"/>
+              <a:gd name="connsiteY3" fmla="*/ 1980882 h 3781107"/>
+              <a:gd name="connsiteX4" fmla="*/ 1800225 w 3607087"/>
+              <a:gd name="connsiteY4" fmla="*/ 3781107 h 3781107"/>
+              <a:gd name="connsiteX5" fmla="*/ 0 w 3607087"/>
+              <a:gd name="connsiteY5" fmla="*/ 1980882 h 3781107"/>
+              <a:gd name="connsiteX0" fmla="*/ 0 w 3811651"/>
+              <a:gd name="connsiteY0" fmla="*/ 1980882 h 3781394"/>
+              <a:gd name="connsiteX1" fmla="*/ 1800225 w 3811651"/>
+              <a:gd name="connsiteY1" fmla="*/ 180657 h 3781394"/>
+              <a:gd name="connsiteX2" fmla="*/ 2387150 w 3811651"/>
+              <a:gd name="connsiteY2" fmla="*/ 266521 h 3781394"/>
+              <a:gd name="connsiteX3" fmla="*/ 3806071 w 3811651"/>
+              <a:gd name="connsiteY3" fmla="*/ 2105501 h 3781394"/>
+              <a:gd name="connsiteX4" fmla="*/ 1800225 w 3811651"/>
+              <a:gd name="connsiteY4" fmla="*/ 3781107 h 3781394"/>
+              <a:gd name="connsiteX5" fmla="*/ 0 w 3811651"/>
+              <a:gd name="connsiteY5" fmla="*/ 1980882 h 3781394"/>
+              <a:gd name="connsiteX0" fmla="*/ 0 w 3811651"/>
+              <a:gd name="connsiteY0" fmla="*/ 1980882 h 3783520"/>
+              <a:gd name="connsiteX1" fmla="*/ 1800225 w 3811651"/>
+              <a:gd name="connsiteY1" fmla="*/ 180657 h 3783520"/>
+              <a:gd name="connsiteX2" fmla="*/ 2387150 w 3811651"/>
+              <a:gd name="connsiteY2" fmla="*/ 266521 h 3783520"/>
+              <a:gd name="connsiteX3" fmla="*/ 3806071 w 3811651"/>
+              <a:gd name="connsiteY3" fmla="*/ 2105501 h 3783520"/>
+              <a:gd name="connsiteX4" fmla="*/ 1800225 w 3811651"/>
+              <a:gd name="connsiteY4" fmla="*/ 3781107 h 3783520"/>
+              <a:gd name="connsiteX5" fmla="*/ 0 w 3811651"/>
+              <a:gd name="connsiteY5" fmla="*/ 1980882 h 3783520"/>
+              <a:gd name="connsiteX0" fmla="*/ 0 w 3811651"/>
+              <a:gd name="connsiteY0" fmla="*/ 1980882 h 3781122"/>
+              <a:gd name="connsiteX1" fmla="*/ 1800225 w 3811651"/>
+              <a:gd name="connsiteY1" fmla="*/ 180657 h 3781122"/>
+              <a:gd name="connsiteX2" fmla="*/ 2387150 w 3811651"/>
+              <a:gd name="connsiteY2" fmla="*/ 266521 h 3781122"/>
+              <a:gd name="connsiteX3" fmla="*/ 3806071 w 3811651"/>
+              <a:gd name="connsiteY3" fmla="*/ 2105501 h 3781122"/>
+              <a:gd name="connsiteX4" fmla="*/ 1800225 w 3811651"/>
+              <a:gd name="connsiteY4" fmla="*/ 3781107 h 3781122"/>
+              <a:gd name="connsiteX5" fmla="*/ 0 w 3811651"/>
+              <a:gd name="connsiteY5" fmla="*/ 1980882 h 3781122"/>
+              <a:gd name="connsiteX0" fmla="*/ 0 w 3811651"/>
+              <a:gd name="connsiteY0" fmla="*/ 2181114 h 3981350"/>
+              <a:gd name="connsiteX1" fmla="*/ 1800225 w 3811651"/>
+              <a:gd name="connsiteY1" fmla="*/ 106728 h 3981350"/>
+              <a:gd name="connsiteX2" fmla="*/ 2387150 w 3811651"/>
+              <a:gd name="connsiteY2" fmla="*/ 466753 h 3981350"/>
+              <a:gd name="connsiteX3" fmla="*/ 3806071 w 3811651"/>
+              <a:gd name="connsiteY3" fmla="*/ 2305733 h 3981350"/>
+              <a:gd name="connsiteX4" fmla="*/ 1800225 w 3811651"/>
+              <a:gd name="connsiteY4" fmla="*/ 3981339 h 3981350"/>
+              <a:gd name="connsiteX5" fmla="*/ 0 w 3811651"/>
+              <a:gd name="connsiteY5" fmla="*/ 2181114 h 3981350"/>
+              <a:gd name="connsiteX0" fmla="*/ 0 w 3811651"/>
+              <a:gd name="connsiteY0" fmla="*/ 2181114 h 3981350"/>
+              <a:gd name="connsiteX1" fmla="*/ 1800225 w 3811651"/>
+              <a:gd name="connsiteY1" fmla="*/ 106728 h 3981350"/>
+              <a:gd name="connsiteX2" fmla="*/ 2387150 w 3811651"/>
+              <a:gd name="connsiteY2" fmla="*/ 466753 h 3981350"/>
+              <a:gd name="connsiteX3" fmla="*/ 3806071 w 3811651"/>
+              <a:gd name="connsiteY3" fmla="*/ 2305733 h 3981350"/>
+              <a:gd name="connsiteX4" fmla="*/ 1800225 w 3811651"/>
+              <a:gd name="connsiteY4" fmla="*/ 3981339 h 3981350"/>
+              <a:gd name="connsiteX5" fmla="*/ 0 w 3811651"/>
+              <a:gd name="connsiteY5" fmla="*/ 2181114 h 3981350"/>
+              <a:gd name="connsiteX0" fmla="*/ 0 w 3811651"/>
+              <a:gd name="connsiteY0" fmla="*/ 2126036 h 3926272"/>
+              <a:gd name="connsiteX1" fmla="*/ 1800225 w 3811651"/>
+              <a:gd name="connsiteY1" fmla="*/ 51650 h 3926272"/>
+              <a:gd name="connsiteX2" fmla="*/ 2387150 w 3811651"/>
+              <a:gd name="connsiteY2" fmla="*/ 411675 h 3926272"/>
+              <a:gd name="connsiteX3" fmla="*/ 3806071 w 3811651"/>
+              <a:gd name="connsiteY3" fmla="*/ 2250655 h 3926272"/>
+              <a:gd name="connsiteX4" fmla="*/ 1800225 w 3811651"/>
+              <a:gd name="connsiteY4" fmla="*/ 3926261 h 3926272"/>
+              <a:gd name="connsiteX5" fmla="*/ 0 w 3811651"/>
+              <a:gd name="connsiteY5" fmla="*/ 2126036 h 3926272"/>
+              <a:gd name="connsiteX0" fmla="*/ 0 w 3820724"/>
+              <a:gd name="connsiteY0" fmla="*/ 2532934 h 4333170"/>
+              <a:gd name="connsiteX1" fmla="*/ 1800225 w 3820724"/>
+              <a:gd name="connsiteY1" fmla="*/ 458548 h 4333170"/>
+              <a:gd name="connsiteX2" fmla="*/ 3190940 w 3820724"/>
+              <a:gd name="connsiteY2" fmla="*/ 139402 h 4333170"/>
+              <a:gd name="connsiteX3" fmla="*/ 3806071 w 3820724"/>
+              <a:gd name="connsiteY3" fmla="*/ 2657553 h 4333170"/>
+              <a:gd name="connsiteX4" fmla="*/ 1800225 w 3820724"/>
+              <a:gd name="connsiteY4" fmla="*/ 4333159 h 4333170"/>
+              <a:gd name="connsiteX5" fmla="*/ 0 w 3820724"/>
+              <a:gd name="connsiteY5" fmla="*/ 2532934 h 4333170"/>
+              <a:gd name="connsiteX0" fmla="*/ 0 w 3820724"/>
+              <a:gd name="connsiteY0" fmla="*/ 2598048 h 4398284"/>
+              <a:gd name="connsiteX1" fmla="*/ 1800225 w 3820724"/>
+              <a:gd name="connsiteY1" fmla="*/ 523662 h 4398284"/>
+              <a:gd name="connsiteX2" fmla="*/ 3190940 w 3820724"/>
+              <a:gd name="connsiteY2" fmla="*/ 204516 h 4398284"/>
+              <a:gd name="connsiteX3" fmla="*/ 3806071 w 3820724"/>
+              <a:gd name="connsiteY3" fmla="*/ 2722667 h 4398284"/>
+              <a:gd name="connsiteX4" fmla="*/ 1800225 w 3820724"/>
+              <a:gd name="connsiteY4" fmla="*/ 4398273 h 4398284"/>
+              <a:gd name="connsiteX5" fmla="*/ 0 w 3820724"/>
+              <a:gd name="connsiteY5" fmla="*/ 2598048 h 4398284"/>
+              <a:gd name="connsiteX0" fmla="*/ 1233 w 3821957"/>
+              <a:gd name="connsiteY0" fmla="*/ 2598048 h 4398287"/>
+              <a:gd name="connsiteX1" fmla="*/ 1801458 w 3821957"/>
+              <a:gd name="connsiteY1" fmla="*/ 523662 h 4398287"/>
+              <a:gd name="connsiteX2" fmla="*/ 3192173 w 3821957"/>
+              <a:gd name="connsiteY2" fmla="*/ 204516 h 4398287"/>
+              <a:gd name="connsiteX3" fmla="*/ 3807304 w 3821957"/>
+              <a:gd name="connsiteY3" fmla="*/ 2722667 h 4398287"/>
+              <a:gd name="connsiteX4" fmla="*/ 1801458 w 3821957"/>
+              <a:gd name="connsiteY4" fmla="*/ 4398273 h 4398287"/>
+              <a:gd name="connsiteX5" fmla="*/ 1233 w 3821957"/>
+              <a:gd name="connsiteY5" fmla="*/ 2598048 h 4398287"/>
+              <a:gd name="connsiteX0" fmla="*/ 1233 w 3821957"/>
+              <a:gd name="connsiteY0" fmla="*/ 2572526 h 4372765"/>
+              <a:gd name="connsiteX1" fmla="*/ 1801458 w 3821957"/>
+              <a:gd name="connsiteY1" fmla="*/ 498140 h 4372765"/>
+              <a:gd name="connsiteX2" fmla="*/ 3192173 w 3821957"/>
+              <a:gd name="connsiteY2" fmla="*/ 178994 h 4372765"/>
+              <a:gd name="connsiteX3" fmla="*/ 3807304 w 3821957"/>
+              <a:gd name="connsiteY3" fmla="*/ 2697145 h 4372765"/>
+              <a:gd name="connsiteX4" fmla="*/ 1801458 w 3821957"/>
+              <a:gd name="connsiteY4" fmla="*/ 4372751 h 4372765"/>
+              <a:gd name="connsiteX5" fmla="*/ 1233 w 3821957"/>
+              <a:gd name="connsiteY5" fmla="*/ 2572526 h 4372765"/>
+              <a:gd name="connsiteX0" fmla="*/ 1233 w 3887009"/>
+              <a:gd name="connsiteY0" fmla="*/ 2459003 h 4259242"/>
+              <a:gd name="connsiteX1" fmla="*/ 1801458 w 3887009"/>
+              <a:gd name="connsiteY1" fmla="*/ 384617 h 4259242"/>
+              <a:gd name="connsiteX2" fmla="*/ 3192173 w 3887009"/>
+              <a:gd name="connsiteY2" fmla="*/ 65471 h 4259242"/>
+              <a:gd name="connsiteX3" fmla="*/ 3458778 w 3887009"/>
+              <a:gd name="connsiteY3" fmla="*/ 586894 h 4259242"/>
+              <a:gd name="connsiteX4" fmla="*/ 3807304 w 3887009"/>
+              <a:gd name="connsiteY4" fmla="*/ 2583622 h 4259242"/>
+              <a:gd name="connsiteX5" fmla="*/ 1801458 w 3887009"/>
+              <a:gd name="connsiteY5" fmla="*/ 4259228 h 4259242"/>
+              <a:gd name="connsiteX6" fmla="*/ 1233 w 3887009"/>
+              <a:gd name="connsiteY6" fmla="*/ 2459003 h 4259242"/>
+              <a:gd name="connsiteX0" fmla="*/ 1233 w 3885495"/>
+              <a:gd name="connsiteY0" fmla="*/ 2436671 h 4236910"/>
+              <a:gd name="connsiteX1" fmla="*/ 1801458 w 3885495"/>
+              <a:gd name="connsiteY1" fmla="*/ 362285 h 4236910"/>
+              <a:gd name="connsiteX2" fmla="*/ 3192173 w 3885495"/>
+              <a:gd name="connsiteY2" fmla="*/ 43139 h 4236910"/>
+              <a:gd name="connsiteX3" fmla="*/ 3284311 w 3885495"/>
+              <a:gd name="connsiteY3" fmla="*/ 59856 h 4236910"/>
+              <a:gd name="connsiteX4" fmla="*/ 3458778 w 3885495"/>
+              <a:gd name="connsiteY4" fmla="*/ 564562 h 4236910"/>
+              <a:gd name="connsiteX5" fmla="*/ 3807304 w 3885495"/>
+              <a:gd name="connsiteY5" fmla="*/ 2561290 h 4236910"/>
+              <a:gd name="connsiteX6" fmla="*/ 1801458 w 3885495"/>
+              <a:gd name="connsiteY6" fmla="*/ 4236896 h 4236910"/>
+              <a:gd name="connsiteX7" fmla="*/ 1233 w 3885495"/>
+              <a:gd name="connsiteY7" fmla="*/ 2436671 h 4236910"/>
+              <a:gd name="connsiteX0" fmla="*/ 1233 w 3885495"/>
+              <a:gd name="connsiteY0" fmla="*/ 2809235 h 4609474"/>
+              <a:gd name="connsiteX1" fmla="*/ 1801458 w 3885495"/>
+              <a:gd name="connsiteY1" fmla="*/ 734849 h 4609474"/>
+              <a:gd name="connsiteX2" fmla="*/ 3447641 w 3885495"/>
+              <a:gd name="connsiteY2" fmla="*/ 4461 h 4609474"/>
+              <a:gd name="connsiteX3" fmla="*/ 3284311 w 3885495"/>
+              <a:gd name="connsiteY3" fmla="*/ 432420 h 4609474"/>
+              <a:gd name="connsiteX4" fmla="*/ 3458778 w 3885495"/>
+              <a:gd name="connsiteY4" fmla="*/ 937126 h 4609474"/>
+              <a:gd name="connsiteX5" fmla="*/ 3807304 w 3885495"/>
+              <a:gd name="connsiteY5" fmla="*/ 2933854 h 4609474"/>
+              <a:gd name="connsiteX6" fmla="*/ 1801458 w 3885495"/>
+              <a:gd name="connsiteY6" fmla="*/ 4609460 h 4609474"/>
+              <a:gd name="connsiteX7" fmla="*/ 1233 w 3885495"/>
+              <a:gd name="connsiteY7" fmla="*/ 2809235 h 4609474"/>
+              <a:gd name="connsiteX0" fmla="*/ 1233 w 3885495"/>
+              <a:gd name="connsiteY0" fmla="*/ 2809173 h 4609412"/>
+              <a:gd name="connsiteX1" fmla="*/ 1801458 w 3885495"/>
+              <a:gd name="connsiteY1" fmla="*/ 734787 h 4609412"/>
+              <a:gd name="connsiteX2" fmla="*/ 3447641 w 3885495"/>
+              <a:gd name="connsiteY2" fmla="*/ 4399 h 4609412"/>
+              <a:gd name="connsiteX3" fmla="*/ 3097383 w 3885495"/>
+              <a:gd name="connsiteY3" fmla="*/ 438589 h 4609412"/>
+              <a:gd name="connsiteX4" fmla="*/ 3458778 w 3885495"/>
+              <a:gd name="connsiteY4" fmla="*/ 937064 h 4609412"/>
+              <a:gd name="connsiteX5" fmla="*/ 3807304 w 3885495"/>
+              <a:gd name="connsiteY5" fmla="*/ 2933792 h 4609412"/>
+              <a:gd name="connsiteX6" fmla="*/ 1801458 w 3885495"/>
+              <a:gd name="connsiteY6" fmla="*/ 4609398 h 4609412"/>
+              <a:gd name="connsiteX7" fmla="*/ 1233 w 3885495"/>
+              <a:gd name="connsiteY7" fmla="*/ 2809173 h 4609412"/>
+              <a:gd name="connsiteX0" fmla="*/ 1233 w 3886206"/>
+              <a:gd name="connsiteY0" fmla="*/ 2809213 h 4609452"/>
+              <a:gd name="connsiteX1" fmla="*/ 1801458 w 3886206"/>
+              <a:gd name="connsiteY1" fmla="*/ 734827 h 4609452"/>
+              <a:gd name="connsiteX2" fmla="*/ 3447641 w 3886206"/>
+              <a:gd name="connsiteY2" fmla="*/ 4439 h 4609452"/>
+              <a:gd name="connsiteX3" fmla="*/ 3097383 w 3886206"/>
+              <a:gd name="connsiteY3" fmla="*/ 438629 h 4609452"/>
+              <a:gd name="connsiteX4" fmla="*/ 3240695 w 3886206"/>
+              <a:gd name="connsiteY4" fmla="*/ 550785 h 4609452"/>
+              <a:gd name="connsiteX5" fmla="*/ 3458778 w 3886206"/>
+              <a:gd name="connsiteY5" fmla="*/ 937104 h 4609452"/>
+              <a:gd name="connsiteX6" fmla="*/ 3807304 w 3886206"/>
+              <a:gd name="connsiteY6" fmla="*/ 2933832 h 4609452"/>
+              <a:gd name="connsiteX7" fmla="*/ 1801458 w 3886206"/>
+              <a:gd name="connsiteY7" fmla="*/ 4609438 h 4609452"/>
+              <a:gd name="connsiteX8" fmla="*/ 1233 w 3886206"/>
+              <a:gd name="connsiteY8" fmla="*/ 2809213 h 4609452"/>
+              <a:gd name="connsiteX0" fmla="*/ 1233 w 5011838"/>
+              <a:gd name="connsiteY0" fmla="*/ 3173189 h 4973428"/>
+              <a:gd name="connsiteX1" fmla="*/ 1801458 w 5011838"/>
+              <a:gd name="connsiteY1" fmla="*/ 1098803 h 4973428"/>
+              <a:gd name="connsiteX2" fmla="*/ 3447641 w 5011838"/>
+              <a:gd name="connsiteY2" fmla="*/ 368415 h 4973428"/>
+              <a:gd name="connsiteX3" fmla="*/ 3097383 w 5011838"/>
+              <a:gd name="connsiteY3" fmla="*/ 802605 h 4973428"/>
+              <a:gd name="connsiteX4" fmla="*/ 5010280 w 5011838"/>
+              <a:gd name="connsiteY4" fmla="*/ 5045 h 4973428"/>
+              <a:gd name="connsiteX5" fmla="*/ 3458778 w 5011838"/>
+              <a:gd name="connsiteY5" fmla="*/ 1301080 h 4973428"/>
+              <a:gd name="connsiteX6" fmla="*/ 3807304 w 5011838"/>
+              <a:gd name="connsiteY6" fmla="*/ 3297808 h 4973428"/>
+              <a:gd name="connsiteX7" fmla="*/ 1801458 w 5011838"/>
+              <a:gd name="connsiteY7" fmla="*/ 4973414 h 4973428"/>
+              <a:gd name="connsiteX8" fmla="*/ 1233 w 5011838"/>
+              <a:gd name="connsiteY8" fmla="*/ 3173189 h 4973428"/>
+              <a:gd name="connsiteX0" fmla="*/ 1233 w 5016106"/>
+              <a:gd name="connsiteY0" fmla="*/ 3173189 h 4973428"/>
+              <a:gd name="connsiteX1" fmla="*/ 1801458 w 5016106"/>
+              <a:gd name="connsiteY1" fmla="*/ 1098803 h 4973428"/>
+              <a:gd name="connsiteX2" fmla="*/ 3447641 w 5016106"/>
+              <a:gd name="connsiteY2" fmla="*/ 368415 h 4973428"/>
+              <a:gd name="connsiteX3" fmla="*/ 3097383 w 5016106"/>
+              <a:gd name="connsiteY3" fmla="*/ 802605 h 4973428"/>
+              <a:gd name="connsiteX4" fmla="*/ 5010280 w 5016106"/>
+              <a:gd name="connsiteY4" fmla="*/ 5045 h 4973428"/>
+              <a:gd name="connsiteX5" fmla="*/ 4736119 w 5016106"/>
+              <a:gd name="connsiteY5" fmla="*/ 777681 h 4973428"/>
+              <a:gd name="connsiteX6" fmla="*/ 3807304 w 5016106"/>
+              <a:gd name="connsiteY6" fmla="*/ 3297808 h 4973428"/>
+              <a:gd name="connsiteX7" fmla="*/ 1801458 w 5016106"/>
+              <a:gd name="connsiteY7" fmla="*/ 4973414 h 4973428"/>
+              <a:gd name="connsiteX8" fmla="*/ 1233 w 5016106"/>
+              <a:gd name="connsiteY8" fmla="*/ 3173189 h 4973428"/>
+              <a:gd name="connsiteX0" fmla="*/ 1233 w 5091254"/>
+              <a:gd name="connsiteY0" fmla="*/ 3169952 h 4970191"/>
+              <a:gd name="connsiteX1" fmla="*/ 1801458 w 5091254"/>
+              <a:gd name="connsiteY1" fmla="*/ 1095566 h 4970191"/>
+              <a:gd name="connsiteX2" fmla="*/ 3447641 w 5091254"/>
+              <a:gd name="connsiteY2" fmla="*/ 365178 h 4970191"/>
+              <a:gd name="connsiteX3" fmla="*/ 3097383 w 5091254"/>
+              <a:gd name="connsiteY3" fmla="*/ 799368 h 4970191"/>
+              <a:gd name="connsiteX4" fmla="*/ 5010280 w 5091254"/>
+              <a:gd name="connsiteY4" fmla="*/ 1808 h 4970191"/>
+              <a:gd name="connsiteX5" fmla="*/ 4736117 w 5091254"/>
+              <a:gd name="connsiteY5" fmla="*/ 587516 h 4970191"/>
+              <a:gd name="connsiteX6" fmla="*/ 4736119 w 5091254"/>
+              <a:gd name="connsiteY6" fmla="*/ 774444 h 4970191"/>
+              <a:gd name="connsiteX7" fmla="*/ 3807304 w 5091254"/>
+              <a:gd name="connsiteY7" fmla="*/ 3294571 h 4970191"/>
+              <a:gd name="connsiteX8" fmla="*/ 1801458 w 5091254"/>
+              <a:gd name="connsiteY8" fmla="*/ 4970177 h 4970191"/>
+              <a:gd name="connsiteX9" fmla="*/ 1233 w 5091254"/>
+              <a:gd name="connsiteY9" fmla="*/ 3169952 h 4970191"/>
+              <a:gd name="connsiteX0" fmla="*/ 1233 w 5047973"/>
+              <a:gd name="connsiteY0" fmla="*/ 3168856 h 4969095"/>
+              <a:gd name="connsiteX1" fmla="*/ 1801458 w 5047973"/>
+              <a:gd name="connsiteY1" fmla="*/ 1094470 h 4969095"/>
+              <a:gd name="connsiteX2" fmla="*/ 3447641 w 5047973"/>
+              <a:gd name="connsiteY2" fmla="*/ 364082 h 4969095"/>
+              <a:gd name="connsiteX3" fmla="*/ 3097383 w 5047973"/>
+              <a:gd name="connsiteY3" fmla="*/ 798272 h 4969095"/>
+              <a:gd name="connsiteX4" fmla="*/ 5010280 w 5047973"/>
+              <a:gd name="connsiteY4" fmla="*/ 712 h 4969095"/>
+              <a:gd name="connsiteX5" fmla="*/ 3938558 w 5047973"/>
+              <a:gd name="connsiteY5" fmla="*/ 1383980 h 4969095"/>
+              <a:gd name="connsiteX6" fmla="*/ 4736119 w 5047973"/>
+              <a:gd name="connsiteY6" fmla="*/ 773348 h 4969095"/>
+              <a:gd name="connsiteX7" fmla="*/ 3807304 w 5047973"/>
+              <a:gd name="connsiteY7" fmla="*/ 3293475 h 4969095"/>
+              <a:gd name="connsiteX8" fmla="*/ 1801458 w 5047973"/>
+              <a:gd name="connsiteY8" fmla="*/ 4969081 h 4969095"/>
+              <a:gd name="connsiteX9" fmla="*/ 1233 w 5047973"/>
+              <a:gd name="connsiteY9" fmla="*/ 3168856 h 4969095"/>
+              <a:gd name="connsiteX0" fmla="*/ 858 w 5047598"/>
+              <a:gd name="connsiteY0" fmla="*/ 3168856 h 4969406"/>
+              <a:gd name="connsiteX1" fmla="*/ 1801083 w 5047598"/>
+              <a:gd name="connsiteY1" fmla="*/ 1094470 h 4969406"/>
+              <a:gd name="connsiteX2" fmla="*/ 3447266 w 5047598"/>
+              <a:gd name="connsiteY2" fmla="*/ 364082 h 4969406"/>
+              <a:gd name="connsiteX3" fmla="*/ 3097008 w 5047598"/>
+              <a:gd name="connsiteY3" fmla="*/ 798272 h 4969406"/>
+              <a:gd name="connsiteX4" fmla="*/ 5009905 w 5047598"/>
+              <a:gd name="connsiteY4" fmla="*/ 712 h 4969406"/>
+              <a:gd name="connsiteX5" fmla="*/ 3938183 w 5047598"/>
+              <a:gd name="connsiteY5" fmla="*/ 1383980 h 4969406"/>
+              <a:gd name="connsiteX6" fmla="*/ 4735744 w 5047598"/>
+              <a:gd name="connsiteY6" fmla="*/ 773348 h 4969406"/>
+              <a:gd name="connsiteX7" fmla="*/ 3863008 w 5047598"/>
+              <a:gd name="connsiteY7" fmla="*/ 3299706 h 4969406"/>
+              <a:gd name="connsiteX8" fmla="*/ 1801083 w 5047598"/>
+              <a:gd name="connsiteY8" fmla="*/ 4969081 h 4969406"/>
+              <a:gd name="connsiteX9" fmla="*/ 858 w 5047598"/>
+              <a:gd name="connsiteY9" fmla="*/ 3168856 h 4969406"/>
+              <a:gd name="connsiteX0" fmla="*/ 209 w 5046949"/>
+              <a:gd name="connsiteY0" fmla="*/ 3168856 h 4969406"/>
+              <a:gd name="connsiteX1" fmla="*/ 1800434 w 5046949"/>
+              <a:gd name="connsiteY1" fmla="*/ 1094470 h 4969406"/>
+              <a:gd name="connsiteX2" fmla="*/ 3446617 w 5046949"/>
+              <a:gd name="connsiteY2" fmla="*/ 364082 h 4969406"/>
+              <a:gd name="connsiteX3" fmla="*/ 3096359 w 5046949"/>
+              <a:gd name="connsiteY3" fmla="*/ 798272 h 4969406"/>
+              <a:gd name="connsiteX4" fmla="*/ 5009256 w 5046949"/>
+              <a:gd name="connsiteY4" fmla="*/ 712 h 4969406"/>
+              <a:gd name="connsiteX5" fmla="*/ 3937534 w 5046949"/>
+              <a:gd name="connsiteY5" fmla="*/ 1383980 h 4969406"/>
+              <a:gd name="connsiteX6" fmla="*/ 4735095 w 5046949"/>
+              <a:gd name="connsiteY6" fmla="*/ 773348 h 4969406"/>
+              <a:gd name="connsiteX7" fmla="*/ 3862359 w 5046949"/>
+              <a:gd name="connsiteY7" fmla="*/ 3299706 h 4969406"/>
+              <a:gd name="connsiteX8" fmla="*/ 1800434 w 5046949"/>
+              <a:gd name="connsiteY8" fmla="*/ 4969081 h 4969406"/>
+              <a:gd name="connsiteX9" fmla="*/ 209 w 5046949"/>
+              <a:gd name="connsiteY9" fmla="*/ 3168856 h 4969406"/>
+              <a:gd name="connsiteX0" fmla="*/ 209 w 5046949"/>
+              <a:gd name="connsiteY0" fmla="*/ 3168856 h 4969650"/>
+              <a:gd name="connsiteX1" fmla="*/ 1800434 w 5046949"/>
+              <a:gd name="connsiteY1" fmla="*/ 1094470 h 4969650"/>
+              <a:gd name="connsiteX2" fmla="*/ 3446617 w 5046949"/>
+              <a:gd name="connsiteY2" fmla="*/ 364082 h 4969650"/>
+              <a:gd name="connsiteX3" fmla="*/ 3096359 w 5046949"/>
+              <a:gd name="connsiteY3" fmla="*/ 798272 h 4969650"/>
+              <a:gd name="connsiteX4" fmla="*/ 5009256 w 5046949"/>
+              <a:gd name="connsiteY4" fmla="*/ 712 h 4969650"/>
+              <a:gd name="connsiteX5" fmla="*/ 3937534 w 5046949"/>
+              <a:gd name="connsiteY5" fmla="*/ 1383980 h 4969650"/>
+              <a:gd name="connsiteX6" fmla="*/ 4735095 w 5046949"/>
+              <a:gd name="connsiteY6" fmla="*/ 773348 h 4969650"/>
+              <a:gd name="connsiteX7" fmla="*/ 3862359 w 5046949"/>
+              <a:gd name="connsiteY7" fmla="*/ 3299706 h 4969650"/>
+              <a:gd name="connsiteX8" fmla="*/ 1800434 w 5046949"/>
+              <a:gd name="connsiteY8" fmla="*/ 4969081 h 4969650"/>
+              <a:gd name="connsiteX9" fmla="*/ 209 w 5046949"/>
+              <a:gd name="connsiteY9" fmla="*/ 3168856 h 4969650"/>
+              <a:gd name="connsiteX0" fmla="*/ 209 w 5046949"/>
+              <a:gd name="connsiteY0" fmla="*/ 3168856 h 4969650"/>
+              <a:gd name="connsiteX1" fmla="*/ 1800434 w 5046949"/>
+              <a:gd name="connsiteY1" fmla="*/ 1094470 h 4969650"/>
+              <a:gd name="connsiteX2" fmla="*/ 3446617 w 5046949"/>
+              <a:gd name="connsiteY2" fmla="*/ 364082 h 4969650"/>
+              <a:gd name="connsiteX3" fmla="*/ 3096359 w 5046949"/>
+              <a:gd name="connsiteY3" fmla="*/ 798272 h 4969650"/>
+              <a:gd name="connsiteX4" fmla="*/ 5009256 w 5046949"/>
+              <a:gd name="connsiteY4" fmla="*/ 712 h 4969650"/>
+              <a:gd name="connsiteX5" fmla="*/ 3937534 w 5046949"/>
+              <a:gd name="connsiteY5" fmla="*/ 1383980 h 4969650"/>
+              <a:gd name="connsiteX6" fmla="*/ 4735095 w 5046949"/>
+              <a:gd name="connsiteY6" fmla="*/ 773348 h 4969650"/>
+              <a:gd name="connsiteX7" fmla="*/ 3862359 w 5046949"/>
+              <a:gd name="connsiteY7" fmla="*/ 3299706 h 4969650"/>
+              <a:gd name="connsiteX8" fmla="*/ 1800434 w 5046949"/>
+              <a:gd name="connsiteY8" fmla="*/ 4969081 h 4969650"/>
+              <a:gd name="connsiteX9" fmla="*/ 209 w 5046949"/>
+              <a:gd name="connsiteY9" fmla="*/ 3168856 h 4969650"/>
+              <a:gd name="connsiteX0" fmla="*/ 209 w 5046949"/>
+              <a:gd name="connsiteY0" fmla="*/ 3168856 h 4969853"/>
+              <a:gd name="connsiteX1" fmla="*/ 1800434 w 5046949"/>
+              <a:gd name="connsiteY1" fmla="*/ 1094470 h 4969853"/>
+              <a:gd name="connsiteX2" fmla="*/ 3446617 w 5046949"/>
+              <a:gd name="connsiteY2" fmla="*/ 364082 h 4969853"/>
+              <a:gd name="connsiteX3" fmla="*/ 3096359 w 5046949"/>
+              <a:gd name="connsiteY3" fmla="*/ 798272 h 4969853"/>
+              <a:gd name="connsiteX4" fmla="*/ 5009256 w 5046949"/>
+              <a:gd name="connsiteY4" fmla="*/ 712 h 4969853"/>
+              <a:gd name="connsiteX5" fmla="*/ 3937534 w 5046949"/>
+              <a:gd name="connsiteY5" fmla="*/ 1383980 h 4969853"/>
+              <a:gd name="connsiteX6" fmla="*/ 4735095 w 5046949"/>
+              <a:gd name="connsiteY6" fmla="*/ 773348 h 4969853"/>
+              <a:gd name="connsiteX7" fmla="*/ 3862359 w 5046949"/>
+              <a:gd name="connsiteY7" fmla="*/ 3299706 h 4969853"/>
+              <a:gd name="connsiteX8" fmla="*/ 1800434 w 5046949"/>
+              <a:gd name="connsiteY8" fmla="*/ 4969081 h 4969853"/>
+              <a:gd name="connsiteX9" fmla="*/ 209 w 5046949"/>
+              <a:gd name="connsiteY9" fmla="*/ 3168856 h 4969853"/>
+              <a:gd name="connsiteX0" fmla="*/ 209 w 5046949"/>
+              <a:gd name="connsiteY0" fmla="*/ 3168856 h 4969853"/>
+              <a:gd name="connsiteX1" fmla="*/ 1800434 w 5046949"/>
+              <a:gd name="connsiteY1" fmla="*/ 1094470 h 4969853"/>
+              <a:gd name="connsiteX2" fmla="*/ 3446617 w 5046949"/>
+              <a:gd name="connsiteY2" fmla="*/ 364082 h 4969853"/>
+              <a:gd name="connsiteX3" fmla="*/ 3096359 w 5046949"/>
+              <a:gd name="connsiteY3" fmla="*/ 798272 h 4969853"/>
+              <a:gd name="connsiteX4" fmla="*/ 5009256 w 5046949"/>
+              <a:gd name="connsiteY4" fmla="*/ 712 h 4969853"/>
+              <a:gd name="connsiteX5" fmla="*/ 3937534 w 5046949"/>
+              <a:gd name="connsiteY5" fmla="*/ 1383980 h 4969853"/>
+              <a:gd name="connsiteX6" fmla="*/ 4735095 w 5046949"/>
+              <a:gd name="connsiteY6" fmla="*/ 773348 h 4969853"/>
+              <a:gd name="connsiteX7" fmla="*/ 3862359 w 5046949"/>
+              <a:gd name="connsiteY7" fmla="*/ 3299706 h 4969853"/>
+              <a:gd name="connsiteX8" fmla="*/ 1800434 w 5046949"/>
+              <a:gd name="connsiteY8" fmla="*/ 4969081 h 4969853"/>
+              <a:gd name="connsiteX9" fmla="*/ 209 w 5046949"/>
+              <a:gd name="connsiteY9" fmla="*/ 3168856 h 4969853"/>
+              <a:gd name="connsiteX0" fmla="*/ 209 w 5046949"/>
+              <a:gd name="connsiteY0" fmla="*/ 3168856 h 4969853"/>
+              <a:gd name="connsiteX1" fmla="*/ 1800434 w 5046949"/>
+              <a:gd name="connsiteY1" fmla="*/ 1094470 h 4969853"/>
+              <a:gd name="connsiteX2" fmla="*/ 3446617 w 5046949"/>
+              <a:gd name="connsiteY2" fmla="*/ 364082 h 4969853"/>
+              <a:gd name="connsiteX3" fmla="*/ 3096359 w 5046949"/>
+              <a:gd name="connsiteY3" fmla="*/ 798272 h 4969853"/>
+              <a:gd name="connsiteX4" fmla="*/ 5009256 w 5046949"/>
+              <a:gd name="connsiteY4" fmla="*/ 712 h 4969853"/>
+              <a:gd name="connsiteX5" fmla="*/ 3937534 w 5046949"/>
+              <a:gd name="connsiteY5" fmla="*/ 1383980 h 4969853"/>
+              <a:gd name="connsiteX6" fmla="*/ 4735095 w 5046949"/>
+              <a:gd name="connsiteY6" fmla="*/ 773348 h 4969853"/>
+              <a:gd name="connsiteX7" fmla="*/ 3862359 w 5046949"/>
+              <a:gd name="connsiteY7" fmla="*/ 3299706 h 4969853"/>
+              <a:gd name="connsiteX8" fmla="*/ 1800434 w 5046949"/>
+              <a:gd name="connsiteY8" fmla="*/ 4969081 h 4969853"/>
+              <a:gd name="connsiteX9" fmla="*/ 209 w 5046949"/>
+              <a:gd name="connsiteY9" fmla="*/ 3168856 h 4969853"/>
+              <a:gd name="connsiteX0" fmla="*/ 209 w 5046949"/>
+              <a:gd name="connsiteY0" fmla="*/ 3168856 h 4969853"/>
+              <a:gd name="connsiteX1" fmla="*/ 1800434 w 5046949"/>
+              <a:gd name="connsiteY1" fmla="*/ 1094470 h 4969853"/>
+              <a:gd name="connsiteX2" fmla="*/ 3446617 w 5046949"/>
+              <a:gd name="connsiteY2" fmla="*/ 364082 h 4969853"/>
+              <a:gd name="connsiteX3" fmla="*/ 3096359 w 5046949"/>
+              <a:gd name="connsiteY3" fmla="*/ 798272 h 4969853"/>
+              <a:gd name="connsiteX4" fmla="*/ 5009256 w 5046949"/>
+              <a:gd name="connsiteY4" fmla="*/ 712 h 4969853"/>
+              <a:gd name="connsiteX5" fmla="*/ 3937534 w 5046949"/>
+              <a:gd name="connsiteY5" fmla="*/ 1383980 h 4969853"/>
+              <a:gd name="connsiteX6" fmla="*/ 4735095 w 5046949"/>
+              <a:gd name="connsiteY6" fmla="*/ 773348 h 4969853"/>
+              <a:gd name="connsiteX7" fmla="*/ 3862359 w 5046949"/>
+              <a:gd name="connsiteY7" fmla="*/ 3299706 h 4969853"/>
+              <a:gd name="connsiteX8" fmla="*/ 1800434 w 5046949"/>
+              <a:gd name="connsiteY8" fmla="*/ 4969081 h 4969853"/>
+              <a:gd name="connsiteX9" fmla="*/ 209 w 5046949"/>
+              <a:gd name="connsiteY9" fmla="*/ 3168856 h 4969853"/>
+              <a:gd name="connsiteX0" fmla="*/ 209 w 5046949"/>
+              <a:gd name="connsiteY0" fmla="*/ 3168856 h 4969853"/>
+              <a:gd name="connsiteX1" fmla="*/ 1800434 w 5046949"/>
+              <a:gd name="connsiteY1" fmla="*/ 1094470 h 4969853"/>
+              <a:gd name="connsiteX2" fmla="*/ 3446617 w 5046949"/>
+              <a:gd name="connsiteY2" fmla="*/ 364082 h 4969853"/>
+              <a:gd name="connsiteX3" fmla="*/ 3096359 w 5046949"/>
+              <a:gd name="connsiteY3" fmla="*/ 798272 h 4969853"/>
+              <a:gd name="connsiteX4" fmla="*/ 5009256 w 5046949"/>
+              <a:gd name="connsiteY4" fmla="*/ 712 h 4969853"/>
+              <a:gd name="connsiteX5" fmla="*/ 3937534 w 5046949"/>
+              <a:gd name="connsiteY5" fmla="*/ 1383980 h 4969853"/>
+              <a:gd name="connsiteX6" fmla="*/ 4735095 w 5046949"/>
+              <a:gd name="connsiteY6" fmla="*/ 773348 h 4969853"/>
+              <a:gd name="connsiteX7" fmla="*/ 3862359 w 5046949"/>
+              <a:gd name="connsiteY7" fmla="*/ 3299706 h 4969853"/>
+              <a:gd name="connsiteX8" fmla="*/ 1800434 w 5046949"/>
+              <a:gd name="connsiteY8" fmla="*/ 4969081 h 4969853"/>
+              <a:gd name="connsiteX9" fmla="*/ 209 w 5046949"/>
+              <a:gd name="connsiteY9" fmla="*/ 3168856 h 4969853"/>
+              <a:gd name="connsiteX0" fmla="*/ 209 w 5009256"/>
+              <a:gd name="connsiteY0" fmla="*/ 3168144 h 4969141"/>
+              <a:gd name="connsiteX1" fmla="*/ 1800434 w 5009256"/>
+              <a:gd name="connsiteY1" fmla="*/ 1093758 h 4969141"/>
+              <a:gd name="connsiteX2" fmla="*/ 3446617 w 5009256"/>
+              <a:gd name="connsiteY2" fmla="*/ 363370 h 4969141"/>
+              <a:gd name="connsiteX3" fmla="*/ 3096359 w 5009256"/>
+              <a:gd name="connsiteY3" fmla="*/ 797560 h 4969141"/>
+              <a:gd name="connsiteX4" fmla="*/ 5009256 w 5009256"/>
+              <a:gd name="connsiteY4" fmla="*/ 0 h 4969141"/>
+              <a:gd name="connsiteX5" fmla="*/ 3937534 w 5009256"/>
+              <a:gd name="connsiteY5" fmla="*/ 1383268 h 4969141"/>
+              <a:gd name="connsiteX6" fmla="*/ 4735095 w 5009256"/>
+              <a:gd name="connsiteY6" fmla="*/ 772636 h 4969141"/>
+              <a:gd name="connsiteX7" fmla="*/ 3862359 w 5009256"/>
+              <a:gd name="connsiteY7" fmla="*/ 3298994 h 4969141"/>
+              <a:gd name="connsiteX8" fmla="*/ 1800434 w 5009256"/>
+              <a:gd name="connsiteY8" fmla="*/ 4968369 h 4969141"/>
+              <a:gd name="connsiteX9" fmla="*/ 209 w 5009256"/>
+              <a:gd name="connsiteY9" fmla="*/ 3168144 h 4969141"/>
+              <a:gd name="connsiteX0" fmla="*/ 209 w 5009256"/>
+              <a:gd name="connsiteY0" fmla="*/ 3168144 h 4969141"/>
+              <a:gd name="connsiteX1" fmla="*/ 1800434 w 5009256"/>
+              <a:gd name="connsiteY1" fmla="*/ 1093758 h 4969141"/>
+              <a:gd name="connsiteX2" fmla="*/ 3446617 w 5009256"/>
+              <a:gd name="connsiteY2" fmla="*/ 363370 h 4969141"/>
+              <a:gd name="connsiteX3" fmla="*/ 3096359 w 5009256"/>
+              <a:gd name="connsiteY3" fmla="*/ 797560 h 4969141"/>
+              <a:gd name="connsiteX4" fmla="*/ 5009256 w 5009256"/>
+              <a:gd name="connsiteY4" fmla="*/ 0 h 4969141"/>
+              <a:gd name="connsiteX5" fmla="*/ 3937534 w 5009256"/>
+              <a:gd name="connsiteY5" fmla="*/ 1383268 h 4969141"/>
+              <a:gd name="connsiteX6" fmla="*/ 4735095 w 5009256"/>
+              <a:gd name="connsiteY6" fmla="*/ 772636 h 4969141"/>
+              <a:gd name="connsiteX7" fmla="*/ 3862359 w 5009256"/>
+              <a:gd name="connsiteY7" fmla="*/ 3298994 h 4969141"/>
+              <a:gd name="connsiteX8" fmla="*/ 1800434 w 5009256"/>
+              <a:gd name="connsiteY8" fmla="*/ 4968369 h 4969141"/>
+              <a:gd name="connsiteX9" fmla="*/ 209 w 5009256"/>
+              <a:gd name="connsiteY9" fmla="*/ 3168144 h 4969141"/>
+              <a:gd name="connsiteX0" fmla="*/ 209 w 5009256"/>
+              <a:gd name="connsiteY0" fmla="*/ 3168144 h 4969141"/>
+              <a:gd name="connsiteX1" fmla="*/ 1800434 w 5009256"/>
+              <a:gd name="connsiteY1" fmla="*/ 1093758 h 4969141"/>
+              <a:gd name="connsiteX2" fmla="*/ 3446617 w 5009256"/>
+              <a:gd name="connsiteY2" fmla="*/ 363370 h 4969141"/>
+              <a:gd name="connsiteX3" fmla="*/ 3096359 w 5009256"/>
+              <a:gd name="connsiteY3" fmla="*/ 797560 h 4969141"/>
+              <a:gd name="connsiteX4" fmla="*/ 5009256 w 5009256"/>
+              <a:gd name="connsiteY4" fmla="*/ 0 h 4969141"/>
+              <a:gd name="connsiteX5" fmla="*/ 3937534 w 5009256"/>
+              <a:gd name="connsiteY5" fmla="*/ 1383268 h 4969141"/>
+              <a:gd name="connsiteX6" fmla="*/ 4735095 w 5009256"/>
+              <a:gd name="connsiteY6" fmla="*/ 772636 h 4969141"/>
+              <a:gd name="connsiteX7" fmla="*/ 3862359 w 5009256"/>
+              <a:gd name="connsiteY7" fmla="*/ 3298994 h 4969141"/>
+              <a:gd name="connsiteX8" fmla="*/ 1800434 w 5009256"/>
+              <a:gd name="connsiteY8" fmla="*/ 4968369 h 4969141"/>
+              <a:gd name="connsiteX9" fmla="*/ 209 w 5009256"/>
+              <a:gd name="connsiteY9" fmla="*/ 3168144 h 4969141"/>
+              <a:gd name="connsiteX0" fmla="*/ 226 w 5009273"/>
+              <a:gd name="connsiteY0" fmla="*/ 3168144 h 4969141"/>
+              <a:gd name="connsiteX1" fmla="*/ 1800451 w 5009273"/>
+              <a:gd name="connsiteY1" fmla="*/ 1093758 h 4969141"/>
+              <a:gd name="connsiteX2" fmla="*/ 3446634 w 5009273"/>
+              <a:gd name="connsiteY2" fmla="*/ 363370 h 4969141"/>
+              <a:gd name="connsiteX3" fmla="*/ 3096376 w 5009273"/>
+              <a:gd name="connsiteY3" fmla="*/ 797560 h 4969141"/>
+              <a:gd name="connsiteX4" fmla="*/ 5009273 w 5009273"/>
+              <a:gd name="connsiteY4" fmla="*/ 0 h 4969141"/>
+              <a:gd name="connsiteX5" fmla="*/ 3937551 w 5009273"/>
+              <a:gd name="connsiteY5" fmla="*/ 1383268 h 4969141"/>
+              <a:gd name="connsiteX6" fmla="*/ 4735112 w 5009273"/>
+              <a:gd name="connsiteY6" fmla="*/ 772636 h 4969141"/>
+              <a:gd name="connsiteX7" fmla="*/ 3862376 w 5009273"/>
+              <a:gd name="connsiteY7" fmla="*/ 3298994 h 4969141"/>
+              <a:gd name="connsiteX8" fmla="*/ 1800451 w 5009273"/>
+              <a:gd name="connsiteY8" fmla="*/ 4968369 h 4969141"/>
+              <a:gd name="connsiteX9" fmla="*/ 226 w 5009273"/>
+              <a:gd name="connsiteY9" fmla="*/ 3168144 h 4969141"/>
+              <a:gd name="connsiteX0" fmla="*/ 226 w 5009273"/>
+              <a:gd name="connsiteY0" fmla="*/ 3168144 h 4969141"/>
+              <a:gd name="connsiteX1" fmla="*/ 1800451 w 5009273"/>
+              <a:gd name="connsiteY1" fmla="*/ 1093758 h 4969141"/>
+              <a:gd name="connsiteX2" fmla="*/ 3446634 w 5009273"/>
+              <a:gd name="connsiteY2" fmla="*/ 363370 h 4969141"/>
+              <a:gd name="connsiteX3" fmla="*/ 2523131 w 5009273"/>
+              <a:gd name="connsiteY3" fmla="*/ 1327189 h 4969141"/>
+              <a:gd name="connsiteX4" fmla="*/ 5009273 w 5009273"/>
+              <a:gd name="connsiteY4" fmla="*/ 0 h 4969141"/>
+              <a:gd name="connsiteX5" fmla="*/ 3937551 w 5009273"/>
+              <a:gd name="connsiteY5" fmla="*/ 1383268 h 4969141"/>
+              <a:gd name="connsiteX6" fmla="*/ 4735112 w 5009273"/>
+              <a:gd name="connsiteY6" fmla="*/ 772636 h 4969141"/>
+              <a:gd name="connsiteX7" fmla="*/ 3862376 w 5009273"/>
+              <a:gd name="connsiteY7" fmla="*/ 3298994 h 4969141"/>
+              <a:gd name="connsiteX8" fmla="*/ 1800451 w 5009273"/>
+              <a:gd name="connsiteY8" fmla="*/ 4968369 h 4969141"/>
+              <a:gd name="connsiteX9" fmla="*/ 226 w 5009273"/>
+              <a:gd name="connsiteY9" fmla="*/ 3168144 h 4969141"/>
+              <a:gd name="connsiteX0" fmla="*/ 226 w 5009273"/>
+              <a:gd name="connsiteY0" fmla="*/ 3168144 h 4969141"/>
+              <a:gd name="connsiteX1" fmla="*/ 1800451 w 5009273"/>
+              <a:gd name="connsiteY1" fmla="*/ 1093758 h 4969141"/>
+              <a:gd name="connsiteX2" fmla="*/ 3446634 w 5009273"/>
+              <a:gd name="connsiteY2" fmla="*/ 363370 h 4969141"/>
+              <a:gd name="connsiteX3" fmla="*/ 2523131 w 5009273"/>
+              <a:gd name="connsiteY3" fmla="*/ 1327189 h 4969141"/>
+              <a:gd name="connsiteX4" fmla="*/ 5009273 w 5009273"/>
+              <a:gd name="connsiteY4" fmla="*/ 0 h 4969141"/>
+              <a:gd name="connsiteX5" fmla="*/ 3389229 w 5009273"/>
+              <a:gd name="connsiteY5" fmla="*/ 1962745 h 4969141"/>
+              <a:gd name="connsiteX6" fmla="*/ 4735112 w 5009273"/>
+              <a:gd name="connsiteY6" fmla="*/ 772636 h 4969141"/>
+              <a:gd name="connsiteX7" fmla="*/ 3862376 w 5009273"/>
+              <a:gd name="connsiteY7" fmla="*/ 3298994 h 4969141"/>
+              <a:gd name="connsiteX8" fmla="*/ 1800451 w 5009273"/>
+              <a:gd name="connsiteY8" fmla="*/ 4968369 h 4969141"/>
+              <a:gd name="connsiteX9" fmla="*/ 226 w 5009273"/>
+              <a:gd name="connsiteY9" fmla="*/ 3168144 h 4969141"/>
+              <a:gd name="connsiteX0" fmla="*/ 226 w 5009273"/>
+              <a:gd name="connsiteY0" fmla="*/ 3168144 h 4969141"/>
+              <a:gd name="connsiteX1" fmla="*/ 1800451 w 5009273"/>
+              <a:gd name="connsiteY1" fmla="*/ 1093758 h 4969141"/>
+              <a:gd name="connsiteX2" fmla="*/ 3446634 w 5009273"/>
+              <a:gd name="connsiteY2" fmla="*/ 363370 h 4969141"/>
+              <a:gd name="connsiteX3" fmla="*/ 2523131 w 5009273"/>
+              <a:gd name="connsiteY3" fmla="*/ 1327189 h 4969141"/>
+              <a:gd name="connsiteX4" fmla="*/ 5009273 w 5009273"/>
+              <a:gd name="connsiteY4" fmla="*/ 0 h 4969141"/>
+              <a:gd name="connsiteX5" fmla="*/ 3389229 w 5009273"/>
+              <a:gd name="connsiteY5" fmla="*/ 1962745 h 4969141"/>
+              <a:gd name="connsiteX6" fmla="*/ 4735112 w 5009273"/>
+              <a:gd name="connsiteY6" fmla="*/ 772636 h 4969141"/>
+              <a:gd name="connsiteX7" fmla="*/ 3862376 w 5009273"/>
+              <a:gd name="connsiteY7" fmla="*/ 3298994 h 4969141"/>
+              <a:gd name="connsiteX8" fmla="*/ 1800451 w 5009273"/>
+              <a:gd name="connsiteY8" fmla="*/ 4968369 h 4969141"/>
+              <a:gd name="connsiteX9" fmla="*/ 226 w 5009273"/>
+              <a:gd name="connsiteY9" fmla="*/ 3168144 h 4969141"/>
+              <a:gd name="connsiteX0" fmla="*/ 226 w 5009273"/>
+              <a:gd name="connsiteY0" fmla="*/ 3168144 h 4969141"/>
+              <a:gd name="connsiteX1" fmla="*/ 1800451 w 5009273"/>
+              <a:gd name="connsiteY1" fmla="*/ 1093758 h 4969141"/>
+              <a:gd name="connsiteX2" fmla="*/ 3446634 w 5009273"/>
+              <a:gd name="connsiteY2" fmla="*/ 363370 h 4969141"/>
+              <a:gd name="connsiteX3" fmla="*/ 2523131 w 5009273"/>
+              <a:gd name="connsiteY3" fmla="*/ 1327189 h 4969141"/>
+              <a:gd name="connsiteX4" fmla="*/ 5009273 w 5009273"/>
+              <a:gd name="connsiteY4" fmla="*/ 0 h 4969141"/>
+              <a:gd name="connsiteX5" fmla="*/ 3389229 w 5009273"/>
+              <a:gd name="connsiteY5" fmla="*/ 1962745 h 4969141"/>
+              <a:gd name="connsiteX6" fmla="*/ 4735112 w 5009273"/>
+              <a:gd name="connsiteY6" fmla="*/ 772636 h 4969141"/>
+              <a:gd name="connsiteX7" fmla="*/ 3862376 w 5009273"/>
+              <a:gd name="connsiteY7" fmla="*/ 3298994 h 4969141"/>
+              <a:gd name="connsiteX8" fmla="*/ 1800451 w 5009273"/>
+              <a:gd name="connsiteY8" fmla="*/ 4968369 h 4969141"/>
+              <a:gd name="connsiteX9" fmla="*/ 226 w 5009273"/>
+              <a:gd name="connsiteY9" fmla="*/ 3168144 h 4969141"/>
+              <a:gd name="connsiteX0" fmla="*/ 226 w 5009273"/>
+              <a:gd name="connsiteY0" fmla="*/ 3168144 h 4969141"/>
+              <a:gd name="connsiteX1" fmla="*/ 1800451 w 5009273"/>
+              <a:gd name="connsiteY1" fmla="*/ 1093758 h 4969141"/>
+              <a:gd name="connsiteX2" fmla="*/ 3446634 w 5009273"/>
+              <a:gd name="connsiteY2" fmla="*/ 363370 h 4969141"/>
+              <a:gd name="connsiteX3" fmla="*/ 2523131 w 5009273"/>
+              <a:gd name="connsiteY3" fmla="*/ 1327189 h 4969141"/>
+              <a:gd name="connsiteX4" fmla="*/ 5009273 w 5009273"/>
+              <a:gd name="connsiteY4" fmla="*/ 0 h 4969141"/>
+              <a:gd name="connsiteX5" fmla="*/ 3389229 w 5009273"/>
+              <a:gd name="connsiteY5" fmla="*/ 1962745 h 4969141"/>
+              <a:gd name="connsiteX6" fmla="*/ 4735112 w 5009273"/>
+              <a:gd name="connsiteY6" fmla="*/ 772636 h 4969141"/>
+              <a:gd name="connsiteX7" fmla="*/ 3862376 w 5009273"/>
+              <a:gd name="connsiteY7" fmla="*/ 3298994 h 4969141"/>
+              <a:gd name="connsiteX8" fmla="*/ 1800451 w 5009273"/>
+              <a:gd name="connsiteY8" fmla="*/ 4968369 h 4969141"/>
+              <a:gd name="connsiteX9" fmla="*/ 226 w 5009273"/>
+              <a:gd name="connsiteY9" fmla="*/ 3168144 h 4969141"/>
+              <a:gd name="connsiteX0" fmla="*/ 226 w 5009273"/>
+              <a:gd name="connsiteY0" fmla="*/ 3168144 h 4969141"/>
+              <a:gd name="connsiteX1" fmla="*/ 1800451 w 5009273"/>
+              <a:gd name="connsiteY1" fmla="*/ 1093758 h 4969141"/>
+              <a:gd name="connsiteX2" fmla="*/ 3446634 w 5009273"/>
+              <a:gd name="connsiteY2" fmla="*/ 363370 h 4969141"/>
+              <a:gd name="connsiteX3" fmla="*/ 2523131 w 5009273"/>
+              <a:gd name="connsiteY3" fmla="*/ 1327189 h 4969141"/>
+              <a:gd name="connsiteX4" fmla="*/ 5009273 w 5009273"/>
+              <a:gd name="connsiteY4" fmla="*/ 0 h 4969141"/>
+              <a:gd name="connsiteX5" fmla="*/ 3389229 w 5009273"/>
+              <a:gd name="connsiteY5" fmla="*/ 1962745 h 4969141"/>
+              <a:gd name="connsiteX6" fmla="*/ 4735112 w 5009273"/>
+              <a:gd name="connsiteY6" fmla="*/ 772636 h 4969141"/>
+              <a:gd name="connsiteX7" fmla="*/ 3862376 w 5009273"/>
+              <a:gd name="connsiteY7" fmla="*/ 3298994 h 4969141"/>
+              <a:gd name="connsiteX8" fmla="*/ 1800451 w 5009273"/>
+              <a:gd name="connsiteY8" fmla="*/ 4968369 h 4969141"/>
+              <a:gd name="connsiteX9" fmla="*/ 226 w 5009273"/>
+              <a:gd name="connsiteY9" fmla="*/ 3168144 h 4969141"/>
+              <a:gd name="connsiteX0" fmla="*/ 226 w 5009273"/>
+              <a:gd name="connsiteY0" fmla="*/ 3168144 h 4969141"/>
+              <a:gd name="connsiteX1" fmla="*/ 1800451 w 5009273"/>
+              <a:gd name="connsiteY1" fmla="*/ 1093758 h 4969141"/>
+              <a:gd name="connsiteX2" fmla="*/ 3446634 w 5009273"/>
+              <a:gd name="connsiteY2" fmla="*/ 363370 h 4969141"/>
+              <a:gd name="connsiteX3" fmla="*/ 2523131 w 5009273"/>
+              <a:gd name="connsiteY3" fmla="*/ 1327189 h 4969141"/>
+              <a:gd name="connsiteX4" fmla="*/ 5009273 w 5009273"/>
+              <a:gd name="connsiteY4" fmla="*/ 0 h 4969141"/>
+              <a:gd name="connsiteX5" fmla="*/ 3389229 w 5009273"/>
+              <a:gd name="connsiteY5" fmla="*/ 1962745 h 4969141"/>
+              <a:gd name="connsiteX6" fmla="*/ 4735112 w 5009273"/>
+              <a:gd name="connsiteY6" fmla="*/ 772636 h 4969141"/>
+              <a:gd name="connsiteX7" fmla="*/ 3862376 w 5009273"/>
+              <a:gd name="connsiteY7" fmla="*/ 3298994 h 4969141"/>
+              <a:gd name="connsiteX8" fmla="*/ 1800451 w 5009273"/>
+              <a:gd name="connsiteY8" fmla="*/ 4968369 h 4969141"/>
+              <a:gd name="connsiteX9" fmla="*/ 226 w 5009273"/>
+              <a:gd name="connsiteY9" fmla="*/ 3168144 h 4969141"/>
+              <a:gd name="connsiteX0" fmla="*/ 226 w 5009273"/>
+              <a:gd name="connsiteY0" fmla="*/ 3168144 h 4969141"/>
+              <a:gd name="connsiteX1" fmla="*/ 1800451 w 5009273"/>
+              <a:gd name="connsiteY1" fmla="*/ 1093758 h 4969141"/>
+              <a:gd name="connsiteX2" fmla="*/ 3446634 w 5009273"/>
+              <a:gd name="connsiteY2" fmla="*/ 363370 h 4969141"/>
+              <a:gd name="connsiteX3" fmla="*/ 2523131 w 5009273"/>
+              <a:gd name="connsiteY3" fmla="*/ 1327189 h 4969141"/>
+              <a:gd name="connsiteX4" fmla="*/ 5009273 w 5009273"/>
+              <a:gd name="connsiteY4" fmla="*/ 0 h 4969141"/>
+              <a:gd name="connsiteX5" fmla="*/ 3389229 w 5009273"/>
+              <a:gd name="connsiteY5" fmla="*/ 1962745 h 4969141"/>
+              <a:gd name="connsiteX6" fmla="*/ 4735112 w 5009273"/>
+              <a:gd name="connsiteY6" fmla="*/ 772636 h 4969141"/>
+              <a:gd name="connsiteX7" fmla="*/ 3862376 w 5009273"/>
+              <a:gd name="connsiteY7" fmla="*/ 3298994 h 4969141"/>
+              <a:gd name="connsiteX8" fmla="*/ 1800451 w 5009273"/>
+              <a:gd name="connsiteY8" fmla="*/ 4968369 h 4969141"/>
+              <a:gd name="connsiteX9" fmla="*/ 226 w 5009273"/>
+              <a:gd name="connsiteY9" fmla="*/ 3168144 h 4969141"/>
+              <a:gd name="connsiteX0" fmla="*/ 226 w 4828576"/>
+              <a:gd name="connsiteY0" fmla="*/ 3012371 h 4813368"/>
+              <a:gd name="connsiteX1" fmla="*/ 1800451 w 4828576"/>
+              <a:gd name="connsiteY1" fmla="*/ 937985 h 4813368"/>
+              <a:gd name="connsiteX2" fmla="*/ 3446634 w 4828576"/>
+              <a:gd name="connsiteY2" fmla="*/ 207597 h 4813368"/>
+              <a:gd name="connsiteX3" fmla="*/ 2523131 w 4828576"/>
+              <a:gd name="connsiteY3" fmla="*/ 1171416 h 4813368"/>
+              <a:gd name="connsiteX4" fmla="*/ 4828576 w 4828576"/>
+              <a:gd name="connsiteY4" fmla="*/ 0 h 4813368"/>
+              <a:gd name="connsiteX5" fmla="*/ 3389229 w 4828576"/>
+              <a:gd name="connsiteY5" fmla="*/ 1806972 h 4813368"/>
+              <a:gd name="connsiteX6" fmla="*/ 4735112 w 4828576"/>
+              <a:gd name="connsiteY6" fmla="*/ 616863 h 4813368"/>
+              <a:gd name="connsiteX7" fmla="*/ 3862376 w 4828576"/>
+              <a:gd name="connsiteY7" fmla="*/ 3143221 h 4813368"/>
+              <a:gd name="connsiteX8" fmla="*/ 1800451 w 4828576"/>
+              <a:gd name="connsiteY8" fmla="*/ 4812596 h 4813368"/>
+              <a:gd name="connsiteX9" fmla="*/ 226 w 4828576"/>
+              <a:gd name="connsiteY9" fmla="*/ 3012371 h 4813368"/>
+              <a:gd name="connsiteX0" fmla="*/ 234 w 4828584"/>
+              <a:gd name="connsiteY0" fmla="*/ 3012371 h 4813368"/>
+              <a:gd name="connsiteX1" fmla="*/ 1800459 w 4828584"/>
+              <a:gd name="connsiteY1" fmla="*/ 937985 h 4813368"/>
+              <a:gd name="connsiteX2" fmla="*/ 3446642 w 4828584"/>
+              <a:gd name="connsiteY2" fmla="*/ 207597 h 4813368"/>
+              <a:gd name="connsiteX3" fmla="*/ 2523139 w 4828584"/>
+              <a:gd name="connsiteY3" fmla="*/ 1171416 h 4813368"/>
+              <a:gd name="connsiteX4" fmla="*/ 4828584 w 4828584"/>
+              <a:gd name="connsiteY4" fmla="*/ 0 h 4813368"/>
+              <a:gd name="connsiteX5" fmla="*/ 3389237 w 4828584"/>
+              <a:gd name="connsiteY5" fmla="*/ 1806972 h 4813368"/>
+              <a:gd name="connsiteX6" fmla="*/ 4735120 w 4828584"/>
+              <a:gd name="connsiteY6" fmla="*/ 616863 h 4813368"/>
+              <a:gd name="connsiteX7" fmla="*/ 3862384 w 4828584"/>
+              <a:gd name="connsiteY7" fmla="*/ 3143221 h 4813368"/>
+              <a:gd name="connsiteX8" fmla="*/ 1800459 w 4828584"/>
+              <a:gd name="connsiteY8" fmla="*/ 4812596 h 4813368"/>
+              <a:gd name="connsiteX9" fmla="*/ 234 w 4828584"/>
+              <a:gd name="connsiteY9" fmla="*/ 3012371 h 4813368"/>
+              <a:gd name="connsiteX0" fmla="*/ 234 w 4828584"/>
+              <a:gd name="connsiteY0" fmla="*/ 3012371 h 4813368"/>
+              <a:gd name="connsiteX1" fmla="*/ 1800459 w 4828584"/>
+              <a:gd name="connsiteY1" fmla="*/ 937985 h 4813368"/>
+              <a:gd name="connsiteX2" fmla="*/ 3446642 w 4828584"/>
+              <a:gd name="connsiteY2" fmla="*/ 207597 h 4813368"/>
+              <a:gd name="connsiteX3" fmla="*/ 2523139 w 4828584"/>
+              <a:gd name="connsiteY3" fmla="*/ 1171416 h 4813368"/>
+              <a:gd name="connsiteX4" fmla="*/ 4828584 w 4828584"/>
+              <a:gd name="connsiteY4" fmla="*/ 0 h 4813368"/>
+              <a:gd name="connsiteX5" fmla="*/ 3389237 w 4828584"/>
+              <a:gd name="connsiteY5" fmla="*/ 1806972 h 4813368"/>
+              <a:gd name="connsiteX6" fmla="*/ 4735120 w 4828584"/>
+              <a:gd name="connsiteY6" fmla="*/ 616863 h 4813368"/>
+              <a:gd name="connsiteX7" fmla="*/ 3862384 w 4828584"/>
+              <a:gd name="connsiteY7" fmla="*/ 3143221 h 4813368"/>
+              <a:gd name="connsiteX8" fmla="*/ 1800459 w 4828584"/>
+              <a:gd name="connsiteY8" fmla="*/ 4812596 h 4813368"/>
+              <a:gd name="connsiteX9" fmla="*/ 234 w 4828584"/>
+              <a:gd name="connsiteY9" fmla="*/ 3012371 h 4813368"/>
+              <a:gd name="connsiteX0" fmla="*/ 234 w 4828584"/>
+              <a:gd name="connsiteY0" fmla="*/ 3012371 h 4813368"/>
+              <a:gd name="connsiteX1" fmla="*/ 1800459 w 4828584"/>
+              <a:gd name="connsiteY1" fmla="*/ 937985 h 4813368"/>
+              <a:gd name="connsiteX2" fmla="*/ 3446642 w 4828584"/>
+              <a:gd name="connsiteY2" fmla="*/ 207597 h 4813368"/>
+              <a:gd name="connsiteX3" fmla="*/ 2523139 w 4828584"/>
+              <a:gd name="connsiteY3" fmla="*/ 1171416 h 4813368"/>
+              <a:gd name="connsiteX4" fmla="*/ 4828584 w 4828584"/>
+              <a:gd name="connsiteY4" fmla="*/ 0 h 4813368"/>
+              <a:gd name="connsiteX5" fmla="*/ 3389237 w 4828584"/>
+              <a:gd name="connsiteY5" fmla="*/ 1806972 h 4813368"/>
+              <a:gd name="connsiteX6" fmla="*/ 4735120 w 4828584"/>
+              <a:gd name="connsiteY6" fmla="*/ 616863 h 4813368"/>
+              <a:gd name="connsiteX7" fmla="*/ 3862384 w 4828584"/>
+              <a:gd name="connsiteY7" fmla="*/ 3143221 h 4813368"/>
+              <a:gd name="connsiteX8" fmla="*/ 1800459 w 4828584"/>
+              <a:gd name="connsiteY8" fmla="*/ 4812596 h 4813368"/>
+              <a:gd name="connsiteX9" fmla="*/ 234 w 4828584"/>
+              <a:gd name="connsiteY9" fmla="*/ 3012371 h 4813368"/>
+            </a:gdLst>
+            <a:ahLst/>
+            <a:cxnLst>
+              <a:cxn ang="0">
+                <a:pos x="connsiteX0" y="connsiteY0"/>
+              </a:cxn>
+              <a:cxn ang="0">
+                <a:pos x="connsiteX1" y="connsiteY1"/>
+              </a:cxn>
+              <a:cxn ang="0">
+                <a:pos x="connsiteX2" y="connsiteY2"/>
+              </a:cxn>
+              <a:cxn ang="0">
+                <a:pos x="connsiteX3" y="connsiteY3"/>
+              </a:cxn>
+              <a:cxn ang="0">
+                <a:pos x="connsiteX4" y="connsiteY4"/>
+              </a:cxn>
+              <a:cxn ang="0">
+                <a:pos x="connsiteX5" y="connsiteY5"/>
+              </a:cxn>
+              <a:cxn ang="0">
+                <a:pos x="connsiteX6" y="connsiteY6"/>
+              </a:cxn>
+              <a:cxn ang="0">
+                <a:pos x="connsiteX7" y="connsiteY7"/>
+              </a:cxn>
+              <a:cxn ang="0">
+                <a:pos x="connsiteX8" y="connsiteY8"/>
+              </a:cxn>
+              <a:cxn ang="0">
+                <a:pos x="connsiteX9" y="connsiteY9"/>
+              </a:cxn>
+            </a:cxnLst>
+            <a:rect l="l" t="t" r="r" b="b"/>
+            <a:pathLst>
+              <a:path w="4828584" h="4813368">
+                <a:moveTo>
+                  <a:pt x="234" y="3012371"/>
+                </a:moveTo>
+                <a:cubicBezTo>
+                  <a:pt x="-18458" y="1643815"/>
+                  <a:pt x="1082746" y="1330676"/>
+                  <a:pt x="1800459" y="937985"/>
+                </a:cubicBezTo>
+                <a:cubicBezTo>
+                  <a:pt x="2518172" y="545294"/>
+                  <a:pt x="3037496" y="314081"/>
+                  <a:pt x="3446642" y="207597"/>
+                </a:cubicBezTo>
+                <a:cubicBezTo>
+                  <a:pt x="3189079" y="425122"/>
+                  <a:pt x="2831791" y="831120"/>
+                  <a:pt x="2523139" y="1171416"/>
+                </a:cubicBezTo>
+                <a:cubicBezTo>
+                  <a:pt x="2899890" y="982082"/>
+                  <a:pt x="3757903" y="166158"/>
+                  <a:pt x="4828584" y="0"/>
+                </a:cubicBezTo>
+                <a:cubicBezTo>
+                  <a:pt x="4671772" y="83079"/>
+                  <a:pt x="3434930" y="1678199"/>
+                  <a:pt x="3389237" y="1806972"/>
+                </a:cubicBezTo>
+                <a:cubicBezTo>
+                  <a:pt x="4047640" y="1237881"/>
+                  <a:pt x="3858703" y="1384873"/>
+                  <a:pt x="4735120" y="616863"/>
+                </a:cubicBezTo>
+                <a:cubicBezTo>
+                  <a:pt x="4720437" y="883575"/>
+                  <a:pt x="4462612" y="1889380"/>
+                  <a:pt x="3862384" y="3143221"/>
+                </a:cubicBezTo>
+                <a:cubicBezTo>
+                  <a:pt x="3262156" y="4397062"/>
+                  <a:pt x="2444151" y="4834404"/>
+                  <a:pt x="1800459" y="4812596"/>
+                </a:cubicBezTo>
+                <a:cubicBezTo>
+                  <a:pt x="1156767" y="4790788"/>
+                  <a:pt x="18926" y="4380927"/>
+                  <a:pt x="234" y="3012371"/>
+                </a:cubicBezTo>
+                <a:close/>
+              </a:path>
+            </a:pathLst>
+          </a:custGeom>
+          <a:solidFill>
+            <a:srgbClr val="FF8100"/>
+          </a:solidFill>
+          <a:ln w="111125" cap="sq">
+            <a:solidFill>
+              <a:srgbClr val="EBE600"/>
+            </a:solidFill>
+            <a:miter lim="800000"/>
+          </a:ln>
+        </p:spPr>
+        <p:style>
+          <a:lnRef idx="2">
+            <a:schemeClr val="accent1">
+              <a:shade val="50000"/>
+            </a:schemeClr>
+          </a:lnRef>
+          <a:fillRef idx="1">
+            <a:schemeClr val="accent1"/>
+          </a:fillRef>
+          <a:effectRef idx="0">
+            <a:schemeClr val="accent1"/>
+          </a:effectRef>
+          <a:fontRef idx="minor">
+            <a:schemeClr val="lt1"/>
+          </a:fontRef>
+        </p:style>
+        <p:txBody>
+          <a:bodyPr rtlCol="0" anchor="ctr"/>
+          <a:lstStyle/>
+          <a:p>
+            <a:pPr algn="ctr"/>
+            <a:endParaRPr lang="en-IN"/>
+          </a:p>
+        </p:txBody>
+      </p:sp>
+      <p:grpSp>
+        <p:nvGrpSpPr>
+          <p:cNvPr id="5" name="Group 4"/>
+          <p:cNvGrpSpPr/>
+          <p:nvPr/>
+        </p:nvGrpSpPr>
+        <p:grpSpPr>
+          <a:xfrm>
+            <a:off x="2215777" y="2406653"/>
+            <a:ext cx="3287394" cy="3287394"/>
+            <a:chOff x="6079265" y="2348865"/>
+            <a:chExt cx="3287394" cy="3287394"/>
+          </a:xfrm>
+        </p:grpSpPr>
+        <p:sp>
+          <p:nvSpPr>
+            <p:cNvPr id="2" name="Oval 1"/>
+            <p:cNvSpPr/>
+            <p:nvPr/>
+          </p:nvSpPr>
+          <p:spPr>
+            <a:xfrm>
+              <a:off x="6079265" y="2348865"/>
+              <a:ext cx="3287394" cy="3287394"/>
+            </a:xfrm>
+            <a:prstGeom prst="ellipse">
+              <a:avLst/>
+            </a:prstGeom>
+            <a:solidFill>
+              <a:srgbClr val="C00000"/>
+            </a:solidFill>
+            <a:ln w="190500">
+              <a:solidFill>
+                <a:schemeClr val="tx1"/>
+              </a:solidFill>
+            </a:ln>
+          </p:spPr>
+          <p:style>
+            <a:lnRef idx="2">
+              <a:schemeClr val="accent1">
+                <a:shade val="50000"/>
+              </a:schemeClr>
+            </a:lnRef>
+            <a:fillRef idx="1">
+              <a:schemeClr val="accent1"/>
+            </a:fillRef>
+            <a:effectRef idx="0">
+              <a:schemeClr val="accent1"/>
+            </a:effectRef>
+            <a:fontRef idx="minor">
+              <a:schemeClr val="lt1"/>
+            </a:fontRef>
+          </p:style>
+          <p:txBody>
+            <a:bodyPr rtlCol="0" anchor="ctr"/>
+            <a:lstStyle/>
+            <a:p>
+              <a:pPr algn="ctr"/>
+              <a:endParaRPr lang="en-IN"/>
+            </a:p>
+          </p:txBody>
+        </p:sp>
+        <p:sp>
+          <p:nvSpPr>
+            <p:cNvPr id="4" name="Freeform 3"/>
+            <p:cNvSpPr/>
+            <p:nvPr/>
+          </p:nvSpPr>
+          <p:spPr>
+            <a:xfrm>
+              <a:off x="7441226" y="2479990"/>
+              <a:ext cx="633870" cy="3004505"/>
+            </a:xfrm>
+            <a:custGeom>
+              <a:avLst/>
+              <a:gdLst>
+                <a:gd name="connsiteX0" fmla="*/ 0 w 1403350"/>
+                <a:gd name="connsiteY0" fmla="*/ 0 h 2983681"/>
+                <a:gd name="connsiteX1" fmla="*/ 635000 w 1403350"/>
+                <a:gd name="connsiteY1" fmla="*/ 2927350 h 2983681"/>
+                <a:gd name="connsiteX2" fmla="*/ 1403350 w 1403350"/>
+                <a:gd name="connsiteY2" fmla="*/ 1993900 h 2983681"/>
+                <a:gd name="connsiteX0" fmla="*/ 0 w 635000"/>
+                <a:gd name="connsiteY0" fmla="*/ 0 h 2927350"/>
+                <a:gd name="connsiteX1" fmla="*/ 635000 w 635000"/>
+                <a:gd name="connsiteY1" fmla="*/ 2927350 h 2927350"/>
+                <a:gd name="connsiteX0" fmla="*/ 0 w 635000"/>
+                <a:gd name="connsiteY0" fmla="*/ 0 h 2927350"/>
+                <a:gd name="connsiteX1" fmla="*/ 635000 w 635000"/>
+                <a:gd name="connsiteY1" fmla="*/ 2927350 h 2927350"/>
+                <a:gd name="connsiteX0" fmla="*/ 0 w 635000"/>
+                <a:gd name="connsiteY0" fmla="*/ 0 h 2927350"/>
+                <a:gd name="connsiteX1" fmla="*/ 635000 w 635000"/>
+                <a:gd name="connsiteY1" fmla="*/ 2927350 h 2927350"/>
+                <a:gd name="connsiteX0" fmla="*/ 0 w 635000"/>
+                <a:gd name="connsiteY0" fmla="*/ 0 h 2927350"/>
+                <a:gd name="connsiteX1" fmla="*/ 635000 w 635000"/>
+                <a:gd name="connsiteY1" fmla="*/ 2927350 h 2927350"/>
+                <a:gd name="connsiteX0" fmla="*/ 0 w 730250"/>
+                <a:gd name="connsiteY0" fmla="*/ 0 h 2670175"/>
+                <a:gd name="connsiteX1" fmla="*/ 730250 w 730250"/>
+                <a:gd name="connsiteY1" fmla="*/ 2670175 h 2670175"/>
+                <a:gd name="connsiteX0" fmla="*/ 0 w 649287"/>
+                <a:gd name="connsiteY0" fmla="*/ 0 h 2913062"/>
+                <a:gd name="connsiteX1" fmla="*/ 649287 w 649287"/>
+                <a:gd name="connsiteY1" fmla="*/ 2913062 h 2913062"/>
+                <a:gd name="connsiteX0" fmla="*/ 45686 w 694973"/>
+                <a:gd name="connsiteY0" fmla="*/ 0 h 2913062"/>
+                <a:gd name="connsiteX1" fmla="*/ 694973 w 694973"/>
+                <a:gd name="connsiteY1" fmla="*/ 2913062 h 2913062"/>
+                <a:gd name="connsiteX0" fmla="*/ 63892 w 713179"/>
+                <a:gd name="connsiteY0" fmla="*/ 0 h 2913062"/>
+                <a:gd name="connsiteX1" fmla="*/ 713179 w 713179"/>
+                <a:gd name="connsiteY1" fmla="*/ 2913062 h 2913062"/>
+                <a:gd name="connsiteX0" fmla="*/ 67111 w 692586"/>
+                <a:gd name="connsiteY0" fmla="*/ 0 h 2913062"/>
+                <a:gd name="connsiteX1" fmla="*/ 692586 w 692586"/>
+                <a:gd name="connsiteY1" fmla="*/ 2913062 h 2913062"/>
+                <a:gd name="connsiteX0" fmla="*/ 78245 w 633870"/>
+                <a:gd name="connsiteY0" fmla="*/ 0 h 2814899"/>
+                <a:gd name="connsiteX1" fmla="*/ 633870 w 633870"/>
+                <a:gd name="connsiteY1" fmla="*/ 2814899 h 2814899"/>
+              </a:gdLst>
+              <a:ahLst/>
+              <a:cxnLst>
+                <a:cxn ang="0">
+                  <a:pos x="connsiteX0" y="connsiteY0"/>
+                </a:cxn>
+                <a:cxn ang="0">
+                  <a:pos x="connsiteX1" y="connsiteY1"/>
+                </a:cxn>
+              </a:cxnLst>
+              <a:rect l="l" t="t" r="r" b="b"/>
+              <a:pathLst>
+                <a:path w="633870" h="2814899">
+                  <a:moveTo>
+                    <a:pt x="78245" y="0"/>
+                  </a:moveTo>
+                  <a:cubicBezTo>
+                    <a:pt x="-111726" y="1307041"/>
+                    <a:pt x="33266" y="1944419"/>
+                    <a:pt x="633870" y="2814899"/>
+                  </a:cubicBezTo>
+                </a:path>
+              </a:pathLst>
+            </a:custGeom>
+            <a:ln w="34925" cap="rnd">
+              <a:solidFill>
+                <a:schemeClr val="bg1"/>
+              </a:solidFill>
+              <a:prstDash val="dash"/>
+            </a:ln>
+          </p:spPr>
+          <p:style>
+            <a:lnRef idx="1">
+              <a:schemeClr val="accent1"/>
+            </a:lnRef>
+            <a:fillRef idx="0">
+              <a:schemeClr val="accent1"/>
+            </a:fillRef>
+            <a:effectRef idx="0">
+              <a:schemeClr val="accent1"/>
+            </a:effectRef>
+            <a:fontRef idx="minor">
+              <a:schemeClr val="tx1"/>
+            </a:fontRef>
+          </p:style>
+          <p:txBody>
+            <a:bodyPr rtlCol="0" anchor="ctr"/>
+            <a:lstStyle/>
+            <a:p>
+              <a:pPr algn="ctr"/>
+              <a:r>
+                <a:rPr lang="en-IN" dirty="0" smtClean="0"/>
+                <a:t> </a:t>
+              </a:r>
+              <a:endParaRPr lang="en-IN" dirty="0"/>
+            </a:p>
+          </p:txBody>
+        </p:sp>
+        <p:sp>
+          <p:nvSpPr>
+            <p:cNvPr id="6" name="Freeform 5"/>
+            <p:cNvSpPr/>
+            <p:nvPr/>
+          </p:nvSpPr>
+          <p:spPr>
+            <a:xfrm>
+              <a:off x="6851470" y="2679876"/>
+              <a:ext cx="667570" cy="2849723"/>
+            </a:xfrm>
+            <a:custGeom>
+              <a:avLst/>
+              <a:gdLst>
+                <a:gd name="connsiteX0" fmla="*/ 0 w 1403350"/>
+                <a:gd name="connsiteY0" fmla="*/ 0 h 2983681"/>
+                <a:gd name="connsiteX1" fmla="*/ 635000 w 1403350"/>
+                <a:gd name="connsiteY1" fmla="*/ 2927350 h 2983681"/>
+                <a:gd name="connsiteX2" fmla="*/ 1403350 w 1403350"/>
+                <a:gd name="connsiteY2" fmla="*/ 1993900 h 2983681"/>
+                <a:gd name="connsiteX0" fmla="*/ 0 w 635000"/>
+                <a:gd name="connsiteY0" fmla="*/ 0 h 2927350"/>
+                <a:gd name="connsiteX1" fmla="*/ 635000 w 635000"/>
+                <a:gd name="connsiteY1" fmla="*/ 2927350 h 2927350"/>
+                <a:gd name="connsiteX0" fmla="*/ 0 w 635000"/>
+                <a:gd name="connsiteY0" fmla="*/ 0 h 2927350"/>
+                <a:gd name="connsiteX1" fmla="*/ 635000 w 635000"/>
+                <a:gd name="connsiteY1" fmla="*/ 2927350 h 2927350"/>
+                <a:gd name="connsiteX0" fmla="*/ 0 w 635000"/>
+                <a:gd name="connsiteY0" fmla="*/ 0 h 2927350"/>
+                <a:gd name="connsiteX1" fmla="*/ 635000 w 635000"/>
+                <a:gd name="connsiteY1" fmla="*/ 2927350 h 2927350"/>
+                <a:gd name="connsiteX0" fmla="*/ 0 w 635000"/>
+                <a:gd name="connsiteY0" fmla="*/ 0 h 2927350"/>
+                <a:gd name="connsiteX1" fmla="*/ 635000 w 635000"/>
+                <a:gd name="connsiteY1" fmla="*/ 2927350 h 2927350"/>
+                <a:gd name="connsiteX0" fmla="*/ 0 w 730250"/>
+                <a:gd name="connsiteY0" fmla="*/ 0 h 2670175"/>
+                <a:gd name="connsiteX1" fmla="*/ 730250 w 730250"/>
+                <a:gd name="connsiteY1" fmla="*/ 2670175 h 2670175"/>
+                <a:gd name="connsiteX0" fmla="*/ 0 w 649287"/>
+                <a:gd name="connsiteY0" fmla="*/ 0 h 2913062"/>
+                <a:gd name="connsiteX1" fmla="*/ 649287 w 649287"/>
+                <a:gd name="connsiteY1" fmla="*/ 2913062 h 2913062"/>
+                <a:gd name="connsiteX0" fmla="*/ 45686 w 694973"/>
+                <a:gd name="connsiteY0" fmla="*/ 0 h 2913062"/>
+                <a:gd name="connsiteX1" fmla="*/ 694973 w 694973"/>
+                <a:gd name="connsiteY1" fmla="*/ 2913062 h 2913062"/>
+                <a:gd name="connsiteX0" fmla="*/ 63892 w 713179"/>
+                <a:gd name="connsiteY0" fmla="*/ 0 h 2913062"/>
+                <a:gd name="connsiteX1" fmla="*/ 713179 w 713179"/>
+                <a:gd name="connsiteY1" fmla="*/ 2913062 h 2913062"/>
+                <a:gd name="connsiteX0" fmla="*/ 67111 w 692586"/>
+                <a:gd name="connsiteY0" fmla="*/ 0 h 2913062"/>
+                <a:gd name="connsiteX1" fmla="*/ 692586 w 692586"/>
+                <a:gd name="connsiteY1" fmla="*/ 2913062 h 2913062"/>
+                <a:gd name="connsiteX0" fmla="*/ 78245 w 633870"/>
+                <a:gd name="connsiteY0" fmla="*/ 0 h 2814899"/>
+                <a:gd name="connsiteX1" fmla="*/ 633870 w 633870"/>
+                <a:gd name="connsiteY1" fmla="*/ 2814899 h 2814899"/>
+                <a:gd name="connsiteX0" fmla="*/ 74138 w 653576"/>
+                <a:gd name="connsiteY0" fmla="*/ 0 h 2649806"/>
+                <a:gd name="connsiteX1" fmla="*/ 653576 w 653576"/>
+                <a:gd name="connsiteY1" fmla="*/ 2649806 h 2649806"/>
+                <a:gd name="connsiteX0" fmla="*/ 74535 w 651592"/>
+                <a:gd name="connsiteY0" fmla="*/ 0 h 2638650"/>
+                <a:gd name="connsiteX1" fmla="*/ 651592 w 651592"/>
+                <a:gd name="connsiteY1" fmla="*/ 2638650 h 2638650"/>
+                <a:gd name="connsiteX0" fmla="*/ 71463 w 667570"/>
+                <a:gd name="connsiteY0" fmla="*/ 0 h 2669884"/>
+                <a:gd name="connsiteX1" fmla="*/ 667570 w 667570"/>
+                <a:gd name="connsiteY1" fmla="*/ 2669884 h 2669884"/>
+              </a:gdLst>
+              <a:ahLst/>
+              <a:cxnLst>
+                <a:cxn ang="0">
+                  <a:pos x="connsiteX0" y="connsiteY0"/>
+                </a:cxn>
+                <a:cxn ang="0">
+                  <a:pos x="connsiteX1" y="connsiteY1"/>
+                </a:cxn>
+              </a:cxnLst>
+              <a:rect l="l" t="t" r="r" b="b"/>
+              <a:pathLst>
+                <a:path w="667570" h="2669884">
+                  <a:moveTo>
+                    <a:pt x="71463" y="0"/>
+                  </a:moveTo>
+                  <a:cubicBezTo>
+                    <a:pt x="-118508" y="1307041"/>
+                    <a:pt x="66966" y="1799404"/>
+                    <a:pt x="667570" y="2669884"/>
+                  </a:cubicBezTo>
+                </a:path>
+              </a:pathLst>
+            </a:custGeom>
+            <a:ln w="34925" cap="rnd">
+              <a:solidFill>
+                <a:schemeClr val="bg1"/>
+              </a:solidFill>
+              <a:prstDash val="dash"/>
+            </a:ln>
+          </p:spPr>
+          <p:style>
+            <a:lnRef idx="1">
+              <a:schemeClr val="accent1"/>
+            </a:lnRef>
+            <a:fillRef idx="0">
+              <a:schemeClr val="accent1"/>
+            </a:fillRef>
+            <a:effectRef idx="0">
+              <a:schemeClr val="accent1"/>
+            </a:effectRef>
+            <a:fontRef idx="minor">
+              <a:schemeClr val="tx1"/>
+            </a:fontRef>
+          </p:style>
+          <p:txBody>
+            <a:bodyPr rtlCol="0" anchor="ctr"/>
+            <a:lstStyle/>
+            <a:p>
+              <a:pPr algn="ctr"/>
+              <a:endParaRPr lang="en-IN"/>
+            </a:p>
+          </p:txBody>
+        </p:sp>
+        <p:sp>
+          <p:nvSpPr>
+            <p:cNvPr id="7" name="Freeform 6"/>
+            <p:cNvSpPr/>
+            <p:nvPr/>
+          </p:nvSpPr>
+          <p:spPr>
+            <a:xfrm>
+              <a:off x="7120006" y="2553810"/>
+              <a:ext cx="685781" cy="2980692"/>
+            </a:xfrm>
+            <a:custGeom>
+              <a:avLst/>
+              <a:gdLst>
+                <a:gd name="connsiteX0" fmla="*/ 0 w 1403350"/>
+                <a:gd name="connsiteY0" fmla="*/ 0 h 2983681"/>
+                <a:gd name="connsiteX1" fmla="*/ 635000 w 1403350"/>
+                <a:gd name="connsiteY1" fmla="*/ 2927350 h 2983681"/>
+                <a:gd name="connsiteX2" fmla="*/ 1403350 w 1403350"/>
+                <a:gd name="connsiteY2" fmla="*/ 1993900 h 2983681"/>
+                <a:gd name="connsiteX0" fmla="*/ 0 w 635000"/>
+                <a:gd name="connsiteY0" fmla="*/ 0 h 2927350"/>
+                <a:gd name="connsiteX1" fmla="*/ 635000 w 635000"/>
+                <a:gd name="connsiteY1" fmla="*/ 2927350 h 2927350"/>
+                <a:gd name="connsiteX0" fmla="*/ 0 w 635000"/>
+                <a:gd name="connsiteY0" fmla="*/ 0 h 2927350"/>
+                <a:gd name="connsiteX1" fmla="*/ 635000 w 635000"/>
+                <a:gd name="connsiteY1" fmla="*/ 2927350 h 2927350"/>
+                <a:gd name="connsiteX0" fmla="*/ 0 w 635000"/>
+                <a:gd name="connsiteY0" fmla="*/ 0 h 2927350"/>
+                <a:gd name="connsiteX1" fmla="*/ 635000 w 635000"/>
+                <a:gd name="connsiteY1" fmla="*/ 2927350 h 2927350"/>
+                <a:gd name="connsiteX0" fmla="*/ 0 w 635000"/>
+                <a:gd name="connsiteY0" fmla="*/ 0 h 2927350"/>
+                <a:gd name="connsiteX1" fmla="*/ 635000 w 635000"/>
+                <a:gd name="connsiteY1" fmla="*/ 2927350 h 2927350"/>
+                <a:gd name="connsiteX0" fmla="*/ 0 w 730250"/>
+                <a:gd name="connsiteY0" fmla="*/ 0 h 2670175"/>
+                <a:gd name="connsiteX1" fmla="*/ 730250 w 730250"/>
+                <a:gd name="connsiteY1" fmla="*/ 2670175 h 2670175"/>
+                <a:gd name="connsiteX0" fmla="*/ 0 w 649287"/>
+                <a:gd name="connsiteY0" fmla="*/ 0 h 2913062"/>
+                <a:gd name="connsiteX1" fmla="*/ 649287 w 649287"/>
+                <a:gd name="connsiteY1" fmla="*/ 2913062 h 2913062"/>
+                <a:gd name="connsiteX0" fmla="*/ 45686 w 694973"/>
+                <a:gd name="connsiteY0" fmla="*/ 0 h 2913062"/>
+                <a:gd name="connsiteX1" fmla="*/ 694973 w 694973"/>
+                <a:gd name="connsiteY1" fmla="*/ 2913062 h 2913062"/>
+                <a:gd name="connsiteX0" fmla="*/ 63892 w 713179"/>
+                <a:gd name="connsiteY0" fmla="*/ 0 h 2913062"/>
+                <a:gd name="connsiteX1" fmla="*/ 713179 w 713179"/>
+                <a:gd name="connsiteY1" fmla="*/ 2913062 h 2913062"/>
+                <a:gd name="connsiteX0" fmla="*/ 67111 w 692586"/>
+                <a:gd name="connsiteY0" fmla="*/ 0 h 2913062"/>
+                <a:gd name="connsiteX1" fmla="*/ 692586 w 692586"/>
+                <a:gd name="connsiteY1" fmla="*/ 2913062 h 2913062"/>
+                <a:gd name="connsiteX0" fmla="*/ 78245 w 633870"/>
+                <a:gd name="connsiteY0" fmla="*/ 0 h 2814899"/>
+                <a:gd name="connsiteX1" fmla="*/ 633870 w 633870"/>
+                <a:gd name="connsiteY1" fmla="*/ 2814899 h 2814899"/>
+                <a:gd name="connsiteX0" fmla="*/ 74138 w 653576"/>
+                <a:gd name="connsiteY0" fmla="*/ 0 h 2649806"/>
+                <a:gd name="connsiteX1" fmla="*/ 653576 w 653576"/>
+                <a:gd name="connsiteY1" fmla="*/ 2649806 h 2649806"/>
+                <a:gd name="connsiteX0" fmla="*/ 66888 w 693951"/>
+                <a:gd name="connsiteY0" fmla="*/ 0 h 2779203"/>
+                <a:gd name="connsiteX1" fmla="*/ 693951 w 693951"/>
+                <a:gd name="connsiteY1" fmla="*/ 2779203 h 2779203"/>
+                <a:gd name="connsiteX0" fmla="*/ 67901 w 687820"/>
+                <a:gd name="connsiteY0" fmla="*/ 0 h 2801512"/>
+                <a:gd name="connsiteX1" fmla="*/ 687820 w 687820"/>
+                <a:gd name="connsiteY1" fmla="*/ 2801512 h 2801512"/>
+                <a:gd name="connsiteX0" fmla="*/ 68244 w 685781"/>
+                <a:gd name="connsiteY0" fmla="*/ 0 h 2792588"/>
+                <a:gd name="connsiteX1" fmla="*/ 685781 w 685781"/>
+                <a:gd name="connsiteY1" fmla="*/ 2792588 h 2792588"/>
+              </a:gdLst>
+              <a:ahLst/>
+              <a:cxnLst>
+                <a:cxn ang="0">
+                  <a:pos x="connsiteX0" y="connsiteY0"/>
+                </a:cxn>
+                <a:cxn ang="0">
+                  <a:pos x="connsiteX1" y="connsiteY1"/>
+                </a:cxn>
+              </a:cxnLst>
+              <a:rect l="l" t="t" r="r" b="b"/>
+              <a:pathLst>
+                <a:path w="685781" h="2792588">
+                  <a:moveTo>
+                    <a:pt x="68244" y="0"/>
+                  </a:moveTo>
+                  <a:cubicBezTo>
+                    <a:pt x="-121727" y="1307041"/>
+                    <a:pt x="85177" y="1922108"/>
+                    <a:pt x="685781" y="2792588"/>
+                  </a:cubicBezTo>
+                </a:path>
+              </a:pathLst>
+            </a:custGeom>
+            <a:ln w="57150" cap="rnd">
+              <a:solidFill>
+                <a:schemeClr val="accent2">
+                  <a:lumMod val="50000"/>
+                </a:schemeClr>
+              </a:solidFill>
+              <a:prstDash val="solid"/>
+            </a:ln>
+          </p:spPr>
+          <p:style>
+            <a:lnRef idx="1">
+              <a:schemeClr val="accent1"/>
+            </a:lnRef>
+            <a:fillRef idx="0">
+              <a:schemeClr val="accent1"/>
+            </a:fillRef>
+            <a:effectRef idx="0">
+              <a:schemeClr val="accent1"/>
+            </a:effectRef>
+            <a:fontRef idx="minor">
+              <a:schemeClr val="tx1"/>
+            </a:fontRef>
+          </p:style>
+          <p:txBody>
+            <a:bodyPr rtlCol="0" anchor="ctr"/>
+            <a:lstStyle/>
+            <a:p>
+              <a:pPr algn="ctr"/>
+              <a:endParaRPr lang="en-IN"/>
+            </a:p>
+          </p:txBody>
+        </p:sp>
+        <p:sp>
+          <p:nvSpPr>
+            <p:cNvPr id="8" name="Freeform 7"/>
+            <p:cNvSpPr/>
+            <p:nvPr/>
+          </p:nvSpPr>
+          <p:spPr>
+            <a:xfrm>
+              <a:off x="7560479" y="2465684"/>
+              <a:ext cx="624151" cy="2971166"/>
+            </a:xfrm>
+            <a:custGeom>
+              <a:avLst/>
+              <a:gdLst>
+                <a:gd name="connsiteX0" fmla="*/ 0 w 1403350"/>
+                <a:gd name="connsiteY0" fmla="*/ 0 h 2983681"/>
+                <a:gd name="connsiteX1" fmla="*/ 635000 w 1403350"/>
+                <a:gd name="connsiteY1" fmla="*/ 2927350 h 2983681"/>
+                <a:gd name="connsiteX2" fmla="*/ 1403350 w 1403350"/>
+                <a:gd name="connsiteY2" fmla="*/ 1993900 h 2983681"/>
+                <a:gd name="connsiteX0" fmla="*/ 0 w 635000"/>
+                <a:gd name="connsiteY0" fmla="*/ 0 h 2927350"/>
+                <a:gd name="connsiteX1" fmla="*/ 635000 w 635000"/>
+                <a:gd name="connsiteY1" fmla="*/ 2927350 h 2927350"/>
+                <a:gd name="connsiteX0" fmla="*/ 0 w 635000"/>
+                <a:gd name="connsiteY0" fmla="*/ 0 h 2927350"/>
+                <a:gd name="connsiteX1" fmla="*/ 635000 w 635000"/>
+                <a:gd name="connsiteY1" fmla="*/ 2927350 h 2927350"/>
+                <a:gd name="connsiteX0" fmla="*/ 0 w 635000"/>
+                <a:gd name="connsiteY0" fmla="*/ 0 h 2927350"/>
+                <a:gd name="connsiteX1" fmla="*/ 635000 w 635000"/>
+                <a:gd name="connsiteY1" fmla="*/ 2927350 h 2927350"/>
+                <a:gd name="connsiteX0" fmla="*/ 0 w 635000"/>
+                <a:gd name="connsiteY0" fmla="*/ 0 h 2927350"/>
+                <a:gd name="connsiteX1" fmla="*/ 635000 w 635000"/>
+                <a:gd name="connsiteY1" fmla="*/ 2927350 h 2927350"/>
+                <a:gd name="connsiteX0" fmla="*/ 0 w 730250"/>
+                <a:gd name="connsiteY0" fmla="*/ 0 h 2670175"/>
+                <a:gd name="connsiteX1" fmla="*/ 730250 w 730250"/>
+                <a:gd name="connsiteY1" fmla="*/ 2670175 h 2670175"/>
+                <a:gd name="connsiteX0" fmla="*/ 0 w 649287"/>
+                <a:gd name="connsiteY0" fmla="*/ 0 h 2913062"/>
+                <a:gd name="connsiteX1" fmla="*/ 649287 w 649287"/>
+                <a:gd name="connsiteY1" fmla="*/ 2913062 h 2913062"/>
+                <a:gd name="connsiteX0" fmla="*/ 45686 w 694973"/>
+                <a:gd name="connsiteY0" fmla="*/ 0 h 2913062"/>
+                <a:gd name="connsiteX1" fmla="*/ 694973 w 694973"/>
+                <a:gd name="connsiteY1" fmla="*/ 2913062 h 2913062"/>
+                <a:gd name="connsiteX0" fmla="*/ 63892 w 713179"/>
+                <a:gd name="connsiteY0" fmla="*/ 0 h 2913062"/>
+                <a:gd name="connsiteX1" fmla="*/ 713179 w 713179"/>
+                <a:gd name="connsiteY1" fmla="*/ 2913062 h 2913062"/>
+                <a:gd name="connsiteX0" fmla="*/ 67111 w 692586"/>
+                <a:gd name="connsiteY0" fmla="*/ 0 h 2913062"/>
+                <a:gd name="connsiteX1" fmla="*/ 692586 w 692586"/>
+                <a:gd name="connsiteY1" fmla="*/ 2913062 h 2913062"/>
+                <a:gd name="connsiteX0" fmla="*/ 78245 w 633870"/>
+                <a:gd name="connsiteY0" fmla="*/ 0 h 2814899"/>
+                <a:gd name="connsiteX1" fmla="*/ 633870 w 633870"/>
+                <a:gd name="connsiteY1" fmla="*/ 2814899 h 2814899"/>
+                <a:gd name="connsiteX0" fmla="*/ 77819 w 635826"/>
+                <a:gd name="connsiteY0" fmla="*/ 0 h 2797051"/>
+                <a:gd name="connsiteX1" fmla="*/ 635826 w 635826"/>
+                <a:gd name="connsiteY1" fmla="*/ 2797051 h 2797051"/>
+                <a:gd name="connsiteX0" fmla="*/ 76978 w 639747"/>
+                <a:gd name="connsiteY0" fmla="*/ 0 h 2801512"/>
+                <a:gd name="connsiteX1" fmla="*/ 639747 w 639747"/>
+                <a:gd name="connsiteY1" fmla="*/ 2801512 h 2801512"/>
+                <a:gd name="connsiteX0" fmla="*/ 80432 w 624151"/>
+                <a:gd name="connsiteY0" fmla="*/ 0 h 2783664"/>
+                <a:gd name="connsiteX1" fmla="*/ 624151 w 624151"/>
+                <a:gd name="connsiteY1" fmla="*/ 2783664 h 2783664"/>
+              </a:gdLst>
+              <a:ahLst/>
+              <a:cxnLst>
+                <a:cxn ang="0">
+                  <a:pos x="connsiteX0" y="connsiteY0"/>
+                </a:cxn>
+                <a:cxn ang="0">
+                  <a:pos x="connsiteX1" y="connsiteY1"/>
+                </a:cxn>
+              </a:cxnLst>
+              <a:rect l="l" t="t" r="r" b="b"/>
+              <a:pathLst>
+                <a:path w="624151" h="2783664">
+                  <a:moveTo>
+                    <a:pt x="80432" y="0"/>
+                  </a:moveTo>
+                  <a:cubicBezTo>
+                    <a:pt x="-109539" y="1307041"/>
+                    <a:pt x="23547" y="1913184"/>
+                    <a:pt x="624151" y="2783664"/>
+                  </a:cubicBezTo>
+                </a:path>
+              </a:pathLst>
+            </a:custGeom>
+            <a:ln w="34925" cap="rnd">
+              <a:solidFill>
+                <a:schemeClr val="bg1"/>
+              </a:solidFill>
+              <a:prstDash val="sysDash"/>
+            </a:ln>
+          </p:spPr>
+          <p:style>
+            <a:lnRef idx="1">
+              <a:schemeClr val="accent1"/>
+            </a:lnRef>
+            <a:fillRef idx="0">
+              <a:schemeClr val="accent1"/>
+            </a:fillRef>
+            <a:effectRef idx="0">
+              <a:schemeClr val="accent1"/>
+            </a:effectRef>
+            <a:fontRef idx="minor">
+              <a:schemeClr val="tx1"/>
+            </a:fontRef>
+          </p:style>
+          <p:txBody>
+            <a:bodyPr rtlCol="0" anchor="ctr"/>
+            <a:lstStyle/>
+            <a:p>
+              <a:pPr algn="ctr"/>
+              <a:r>
+                <a:rPr lang="en-IN" dirty="0" smtClean="0"/>
+                <a:t> </a:t>
+              </a:r>
+              <a:endParaRPr lang="en-IN" dirty="0"/>
+            </a:p>
+          </p:txBody>
+        </p:sp>
+        <p:sp>
+          <p:nvSpPr>
+            <p:cNvPr id="10" name="Freeform 9"/>
+            <p:cNvSpPr/>
+            <p:nvPr/>
+          </p:nvSpPr>
+          <p:spPr>
+            <a:xfrm>
+              <a:off x="6711780" y="2760958"/>
+              <a:ext cx="612612" cy="2709227"/>
+            </a:xfrm>
+            <a:custGeom>
+              <a:avLst/>
+              <a:gdLst>
+                <a:gd name="connsiteX0" fmla="*/ 0 w 1403350"/>
+                <a:gd name="connsiteY0" fmla="*/ 0 h 2983681"/>
+                <a:gd name="connsiteX1" fmla="*/ 635000 w 1403350"/>
+                <a:gd name="connsiteY1" fmla="*/ 2927350 h 2983681"/>
+                <a:gd name="connsiteX2" fmla="*/ 1403350 w 1403350"/>
+                <a:gd name="connsiteY2" fmla="*/ 1993900 h 2983681"/>
+                <a:gd name="connsiteX0" fmla="*/ 0 w 635000"/>
+                <a:gd name="connsiteY0" fmla="*/ 0 h 2927350"/>
+                <a:gd name="connsiteX1" fmla="*/ 635000 w 635000"/>
+                <a:gd name="connsiteY1" fmla="*/ 2927350 h 2927350"/>
+                <a:gd name="connsiteX0" fmla="*/ 0 w 635000"/>
+                <a:gd name="connsiteY0" fmla="*/ 0 h 2927350"/>
+                <a:gd name="connsiteX1" fmla="*/ 635000 w 635000"/>
+                <a:gd name="connsiteY1" fmla="*/ 2927350 h 2927350"/>
+                <a:gd name="connsiteX0" fmla="*/ 0 w 635000"/>
+                <a:gd name="connsiteY0" fmla="*/ 0 h 2927350"/>
+                <a:gd name="connsiteX1" fmla="*/ 635000 w 635000"/>
+                <a:gd name="connsiteY1" fmla="*/ 2927350 h 2927350"/>
+                <a:gd name="connsiteX0" fmla="*/ 0 w 635000"/>
+                <a:gd name="connsiteY0" fmla="*/ 0 h 2927350"/>
+                <a:gd name="connsiteX1" fmla="*/ 635000 w 635000"/>
+                <a:gd name="connsiteY1" fmla="*/ 2927350 h 2927350"/>
+                <a:gd name="connsiteX0" fmla="*/ 0 w 730250"/>
+                <a:gd name="connsiteY0" fmla="*/ 0 h 2670175"/>
+                <a:gd name="connsiteX1" fmla="*/ 730250 w 730250"/>
+                <a:gd name="connsiteY1" fmla="*/ 2670175 h 2670175"/>
+                <a:gd name="connsiteX0" fmla="*/ 0 w 649287"/>
+                <a:gd name="connsiteY0" fmla="*/ 0 h 2913062"/>
+                <a:gd name="connsiteX1" fmla="*/ 649287 w 649287"/>
+                <a:gd name="connsiteY1" fmla="*/ 2913062 h 2913062"/>
+                <a:gd name="connsiteX0" fmla="*/ 45686 w 694973"/>
+                <a:gd name="connsiteY0" fmla="*/ 0 h 2913062"/>
+                <a:gd name="connsiteX1" fmla="*/ 694973 w 694973"/>
+                <a:gd name="connsiteY1" fmla="*/ 2913062 h 2913062"/>
+                <a:gd name="connsiteX0" fmla="*/ 63892 w 713179"/>
+                <a:gd name="connsiteY0" fmla="*/ 0 h 2913062"/>
+                <a:gd name="connsiteX1" fmla="*/ 713179 w 713179"/>
+                <a:gd name="connsiteY1" fmla="*/ 2913062 h 2913062"/>
+                <a:gd name="connsiteX0" fmla="*/ 67111 w 692586"/>
+                <a:gd name="connsiteY0" fmla="*/ 0 h 2913062"/>
+                <a:gd name="connsiteX1" fmla="*/ 692586 w 692586"/>
+                <a:gd name="connsiteY1" fmla="*/ 2913062 h 2913062"/>
+                <a:gd name="connsiteX0" fmla="*/ 78245 w 633870"/>
+                <a:gd name="connsiteY0" fmla="*/ 0 h 2814899"/>
+                <a:gd name="connsiteX1" fmla="*/ 633870 w 633870"/>
+                <a:gd name="connsiteY1" fmla="*/ 2814899 h 2814899"/>
+                <a:gd name="connsiteX0" fmla="*/ 77819 w 635826"/>
+                <a:gd name="connsiteY0" fmla="*/ 0 h 2797051"/>
+                <a:gd name="connsiteX1" fmla="*/ 635826 w 635826"/>
+                <a:gd name="connsiteY1" fmla="*/ 2797051 h 2797051"/>
+                <a:gd name="connsiteX0" fmla="*/ 76978 w 639747"/>
+                <a:gd name="connsiteY0" fmla="*/ 0 h 2801512"/>
+                <a:gd name="connsiteX1" fmla="*/ 639747 w 639747"/>
+                <a:gd name="connsiteY1" fmla="*/ 2801512 h 2801512"/>
+                <a:gd name="connsiteX0" fmla="*/ 74534 w 651591"/>
+                <a:gd name="connsiteY0" fmla="*/ 0 h 2667653"/>
+                <a:gd name="connsiteX1" fmla="*/ 651591 w 651591"/>
+                <a:gd name="connsiteY1" fmla="*/ 2667653 h 2667653"/>
+                <a:gd name="connsiteX0" fmla="*/ 83180 w 612612"/>
+                <a:gd name="connsiteY0" fmla="*/ 0 h 2573952"/>
+                <a:gd name="connsiteX1" fmla="*/ 612612 w 612612"/>
+                <a:gd name="connsiteY1" fmla="*/ 2573952 h 2573952"/>
+                <a:gd name="connsiteX0" fmla="*/ 83180 w 612612"/>
+                <a:gd name="connsiteY0" fmla="*/ 0 h 2551642"/>
+                <a:gd name="connsiteX1" fmla="*/ 612612 w 612612"/>
+                <a:gd name="connsiteY1" fmla="*/ 2551642 h 2551642"/>
+                <a:gd name="connsiteX0" fmla="*/ 83180 w 612612"/>
+                <a:gd name="connsiteY0" fmla="*/ 0 h 2538256"/>
+                <a:gd name="connsiteX1" fmla="*/ 612612 w 612612"/>
+                <a:gd name="connsiteY1" fmla="*/ 2538256 h 2538256"/>
+              </a:gdLst>
+              <a:ahLst/>
+              <a:cxnLst>
+                <a:cxn ang="0">
+                  <a:pos x="connsiteX0" y="connsiteY0"/>
+                </a:cxn>
+                <a:cxn ang="0">
+                  <a:pos x="connsiteX1" y="connsiteY1"/>
+                </a:cxn>
+              </a:cxnLst>
+              <a:rect l="l" t="t" r="r" b="b"/>
+              <a:pathLst>
+                <a:path w="612612" h="2538256">
+                  <a:moveTo>
+                    <a:pt x="83180" y="0"/>
+                  </a:moveTo>
+                  <a:cubicBezTo>
+                    <a:pt x="-106791" y="1307041"/>
+                    <a:pt x="12008" y="1667776"/>
+                    <a:pt x="612612" y="2538256"/>
+                  </a:cubicBezTo>
+                </a:path>
+              </a:pathLst>
+            </a:custGeom>
+            <a:ln w="34925" cap="rnd">
+              <a:solidFill>
+                <a:schemeClr val="bg1"/>
+              </a:solidFill>
+              <a:prstDash val="sysDash"/>
+            </a:ln>
+          </p:spPr>
+          <p:style>
+            <a:lnRef idx="1">
+              <a:schemeClr val="accent1"/>
+            </a:lnRef>
+            <a:fillRef idx="0">
+              <a:schemeClr val="accent1"/>
+            </a:fillRef>
+            <a:effectRef idx="0">
+              <a:schemeClr val="accent1"/>
+            </a:effectRef>
+            <a:fontRef idx="minor">
+              <a:schemeClr val="tx1"/>
+            </a:fontRef>
+          </p:style>
+          <p:txBody>
+            <a:bodyPr rtlCol="0" anchor="ctr"/>
+            <a:lstStyle/>
+            <a:p>
+              <a:pPr algn="ctr"/>
+              <a:r>
+                <a:rPr lang="en-IN" dirty="0" smtClean="0"/>
+                <a:t> </a:t>
+              </a:r>
+              <a:endParaRPr lang="en-IN" dirty="0"/>
+            </a:p>
+          </p:txBody>
+        </p:sp>
+      </p:grpSp>
+    </p:spTree>
+    <p:extLst>
+      <p:ext uri="{BB962C8B-B14F-4D97-AF65-F5344CB8AC3E}">
+        <p14:creationId xmlns:p14="http://schemas.microsoft.com/office/powerpoint/2010/main" val="1570978723"/>
+      </p:ext>
+    </p:extLst>
+  </p:cSld>
+  <p:clrMapOvr>
+    <a:masterClrMapping/>
+  </p:clrMapOvr>
+</p:sld>
+</file>
+
+<file path=ppt/slides/slide20.xml><?xml version="1.0" encoding="utf-8"?>
 <p:sld xmlns:a="http://schemas.openxmlformats.org/drawingml/2006/main" xmlns:r="http://schemas.openxmlformats.org/officeDocument/2006/relationships" xmlns:p="http://schemas.openxmlformats.org/presentationml/2006/main">
   <p:cSld>
     <p:spTree>
@@ -5440,7 +7387,7 @@
           <p:cNvPr id="2" name="Rectangle 1">
             <a:extLst>
               <a:ext uri="{FF2B5EF4-FFF2-40B4-BE49-F238E27FC236}">
-                <a16:creationId xmlns="" xmlns:a16="http://schemas.microsoft.com/office/drawing/2014/main" id="{32C61CE2-8423-40A5-BD57-CB60A710678F}"/>
+                <a16:creationId xmlns:a16="http://schemas.microsoft.com/office/drawing/2014/main" xmlns="" id="{32C61CE2-8423-40A5-BD57-CB60A710678F}"/>
               </a:ext>
             </a:extLst>
           </p:cNvPr>
@@ -5500,227 +7447,7 @@
 </p:sld>
 </file>
 
-<file path=ppt/slides/slide2.xml><?xml version="1.0" encoding="utf-8"?>
-<p:sld xmlns:a="http://schemas.openxmlformats.org/drawingml/2006/main" xmlns:r="http://schemas.openxmlformats.org/officeDocument/2006/relationships" xmlns:p="http://schemas.openxmlformats.org/presentationml/2006/main">
-  <p:cSld>
-    <p:spTree>
-      <p:nvGrpSpPr>
-        <p:cNvPr id="1" name=""/>
-        <p:cNvGrpSpPr/>
-        <p:nvPr/>
-      </p:nvGrpSpPr>
-      <p:grpSpPr>
-        <a:xfrm>
-          <a:off x="0" y="0"/>
-          <a:ext cx="0" cy="0"/>
-          <a:chOff x="0" y="0"/>
-          <a:chExt cx="0" cy="0"/>
-        </a:xfrm>
-      </p:grpSpPr>
-      <p:sp>
-        <p:nvSpPr>
-          <p:cNvPr id="4" name="Oval 3"/>
-          <p:cNvSpPr/>
-          <p:nvPr/>
-        </p:nvSpPr>
-        <p:spPr>
-          <a:xfrm>
-            <a:off x="3355759" y="2212759"/>
-            <a:ext cx="2432482" cy="2432482"/>
-          </a:xfrm>
-          <a:prstGeom prst="ellipse">
-            <a:avLst/>
-          </a:prstGeom>
-          <a:noFill/>
-          <a:ln w="190500">
-            <a:solidFill>
-              <a:schemeClr val="bg1"/>
-            </a:solidFill>
-          </a:ln>
-        </p:spPr>
-        <p:style>
-          <a:lnRef idx="2">
-            <a:schemeClr val="accent1">
-              <a:shade val="50000"/>
-            </a:schemeClr>
-          </a:lnRef>
-          <a:fillRef idx="1">
-            <a:schemeClr val="accent1"/>
-          </a:fillRef>
-          <a:effectRef idx="0">
-            <a:schemeClr val="accent1"/>
-          </a:effectRef>
-          <a:fontRef idx="minor">
-            <a:schemeClr val="lt1"/>
-          </a:fontRef>
-        </p:style>
-        <p:txBody>
-          <a:bodyPr rtlCol="0" anchor="ctr"/>
-          <a:lstStyle/>
-          <a:p>
-            <a:pPr algn="ctr"/>
-            <a:endParaRPr lang="en-IN"/>
-          </a:p>
-        </p:txBody>
-      </p:sp>
-      <p:sp>
-        <p:nvSpPr>
-          <p:cNvPr id="3" name="Rectangle 2"/>
-          <p:cNvSpPr/>
-          <p:nvPr/>
-        </p:nvSpPr>
-        <p:spPr>
-          <a:xfrm>
-            <a:off x="275208" y="2212759"/>
-            <a:ext cx="2432482" cy="2432482"/>
-          </a:xfrm>
-          <a:prstGeom prst="rect">
-            <a:avLst/>
-          </a:prstGeom>
-          <a:noFill/>
-          <a:ln w="190500" cap="sq">
-            <a:solidFill>
-              <a:schemeClr val="bg1"/>
-            </a:solidFill>
-            <a:miter lim="800000"/>
-          </a:ln>
-        </p:spPr>
-        <p:style>
-          <a:lnRef idx="2">
-            <a:schemeClr val="accent1">
-              <a:shade val="50000"/>
-            </a:schemeClr>
-          </a:lnRef>
-          <a:fillRef idx="1">
-            <a:schemeClr val="accent1"/>
-          </a:fillRef>
-          <a:effectRef idx="0">
-            <a:schemeClr val="accent1"/>
-          </a:effectRef>
-          <a:fontRef idx="minor">
-            <a:schemeClr val="lt1"/>
-          </a:fontRef>
-        </p:style>
-        <p:txBody>
-          <a:bodyPr rtlCol="0" anchor="ctr"/>
-          <a:lstStyle/>
-          <a:p>
-            <a:pPr algn="ctr"/>
-            <a:endParaRPr lang="en-IN"/>
-          </a:p>
-        </p:txBody>
-      </p:sp>
-      <p:pic>
-        <p:nvPicPr>
-          <p:cNvPr id="1028" name="Picture 4" descr="C:\Repos\SlideAway\Assets\Resources\FloorIcons\ad0.png"/>
-          <p:cNvPicPr>
-            <a:picLocks noChangeAspect="1" noChangeArrowheads="1"/>
-          </p:cNvPicPr>
-          <p:nvPr/>
-        </p:nvPicPr>
-        <p:blipFill>
-          <a:blip r:embed="rId2">
-            <a:extLst>
-              <a:ext uri="{28A0092B-C50C-407E-A947-70E740481C1C}">
-                <a14:useLocalDpi xmlns:a14="http://schemas.microsoft.com/office/drawing/2010/main" val="0"/>
-              </a:ext>
-            </a:extLst>
-          </a:blip>
-          <a:srcRect/>
-          <a:stretch>
-            <a:fillRect/>
-          </a:stretch>
-        </p:blipFill>
-        <p:spPr bwMode="auto">
-          <a:xfrm>
-            <a:off x="6356412" y="1957182"/>
-            <a:ext cx="2438740" cy="2943636"/>
-          </a:xfrm>
-          <a:prstGeom prst="rect">
-            <a:avLst/>
-          </a:prstGeom>
-          <a:noFill/>
-          <a:extLst>
-            <a:ext uri="{909E8E84-426E-40DD-AFC4-6F175D3DCCD1}">
-              <a14:hiddenFill xmlns:a14="http://schemas.microsoft.com/office/drawing/2010/main">
-                <a:solidFill>
-                  <a:srgbClr val="FFFFFF"/>
-                </a:solidFill>
-              </a14:hiddenFill>
-            </a:ext>
-          </a:extLst>
-        </p:spPr>
-      </p:pic>
-      <p:sp>
-        <p:nvSpPr>
-          <p:cNvPr id="5" name="Hexagon 4"/>
-          <p:cNvSpPr/>
-          <p:nvPr/>
-        </p:nvSpPr>
-        <p:spPr>
-          <a:xfrm rot="5400000">
-            <a:off x="6100835" y="2212761"/>
-            <a:ext cx="2943633" cy="2432482"/>
-          </a:xfrm>
-          <a:prstGeom prst="hexagon">
-            <a:avLst>
-              <a:gd name="adj" fmla="val 35219"/>
-              <a:gd name="vf" fmla="val 115470"/>
-            </a:avLst>
-          </a:prstGeom>
-          <a:noFill/>
-          <a:ln w="190500">
-            <a:solidFill>
-              <a:schemeClr val="bg1"/>
-            </a:solidFill>
-          </a:ln>
-        </p:spPr>
-        <p:style>
-          <a:lnRef idx="2">
-            <a:schemeClr val="accent1">
-              <a:shade val="50000"/>
-            </a:schemeClr>
-          </a:lnRef>
-          <a:fillRef idx="1">
-            <a:schemeClr val="accent1"/>
-          </a:fillRef>
-          <a:effectRef idx="0">
-            <a:schemeClr val="accent1"/>
-          </a:effectRef>
-          <a:fontRef idx="minor">
-            <a:schemeClr val="lt1"/>
-          </a:fontRef>
-        </p:style>
-        <p:txBody>
-          <a:bodyPr rtlCol="0" anchor="ctr"/>
-          <a:lstStyle/>
-          <a:p>
-            <a:pPr algn="ctr"/>
-            <a:endParaRPr lang="en-IN"/>
-          </a:p>
-        </p:txBody>
-      </p:sp>
-    </p:spTree>
-    <p:extLst>
-      <p:ext uri="{BB962C8B-B14F-4D97-AF65-F5344CB8AC3E}">
-        <p14:creationId xmlns:p14="http://schemas.microsoft.com/office/powerpoint/2010/main" val="1513403828"/>
-      </p:ext>
-    </p:extLst>
-  </p:cSld>
-  <p:clrMapOvr>
-    <a:masterClrMapping/>
-  </p:clrMapOvr>
-  <p:timing>
-    <p:tnLst>
-      <p:par>
-        <p:cTn id="1" dur="indefinite" restart="never" nodeType="tmRoot"/>
-      </p:par>
-    </p:tnLst>
-  </p:timing>
-</p:sld>
-</file>
-
-<file path=ppt/slides/slide20.xml><?xml version="1.0" encoding="utf-8"?>
+<file path=ppt/slides/slide21.xml><?xml version="1.0" encoding="utf-8"?>
 <p:sld xmlns:a="http://schemas.openxmlformats.org/drawingml/2006/main" xmlns:r="http://schemas.openxmlformats.org/officeDocument/2006/relationships" xmlns:p="http://schemas.openxmlformats.org/presentationml/2006/main">
   <p:cSld>
     <p:spTree>
@@ -5742,7 +7469,7 @@
           <p:cNvPr id="3" name="Rectangle 2">
             <a:extLst>
               <a:ext uri="{FF2B5EF4-FFF2-40B4-BE49-F238E27FC236}">
-                <a16:creationId xmlns="" xmlns:a16="http://schemas.microsoft.com/office/drawing/2014/main" id="{207AF6DD-ECCA-43F6-9535-AE4D31B9762C}"/>
+                <a16:creationId xmlns:a16="http://schemas.microsoft.com/office/drawing/2014/main" xmlns="" id="{207AF6DD-ECCA-43F6-9535-AE4D31B9762C}"/>
               </a:ext>
             </a:extLst>
           </p:cNvPr>
@@ -5805,7 +7532,7 @@
 </p:sld>
 </file>
 
-<file path=ppt/slides/slide21.xml><?xml version="1.0" encoding="utf-8"?>
+<file path=ppt/slides/slide22.xml><?xml version="1.0" encoding="utf-8"?>
 <p:sld xmlns:a="http://schemas.openxmlformats.org/drawingml/2006/main" xmlns:r="http://schemas.openxmlformats.org/officeDocument/2006/relationships" xmlns:p="http://schemas.openxmlformats.org/presentationml/2006/main">
   <p:cSld>
     <p:spTree>
@@ -5827,7 +7554,7 @@
           <p:cNvPr id="18" name="Group 17">
             <a:extLst>
               <a:ext uri="{FF2B5EF4-FFF2-40B4-BE49-F238E27FC236}">
-                <a16:creationId xmlns="" xmlns:a16="http://schemas.microsoft.com/office/drawing/2014/main" id="{296FEBEB-E6C9-45D8-BED5-B963E50B6C8B}"/>
+                <a16:creationId xmlns:a16="http://schemas.microsoft.com/office/drawing/2014/main" xmlns="" id="{296FEBEB-E6C9-45D8-BED5-B963E50B6C8B}"/>
               </a:ext>
             </a:extLst>
           </p:cNvPr>
@@ -5847,7 +7574,7 @@
             <p:cNvPr id="2" name="Rectangle 1">
               <a:extLst>
                 <a:ext uri="{FF2B5EF4-FFF2-40B4-BE49-F238E27FC236}">
-                  <a16:creationId xmlns="" xmlns:a16="http://schemas.microsoft.com/office/drawing/2014/main" id="{6DC95FA6-49F0-43A7-9EB3-6B599F68F848}"/>
+                  <a16:creationId xmlns:a16="http://schemas.microsoft.com/office/drawing/2014/main" xmlns="" id="{6DC95FA6-49F0-43A7-9EB3-6B599F68F848}"/>
                 </a:ext>
               </a:extLst>
             </p:cNvPr>
@@ -5899,7 +7626,7 @@
             <p:cNvPr id="12" name="Rectangle 11">
               <a:extLst>
                 <a:ext uri="{FF2B5EF4-FFF2-40B4-BE49-F238E27FC236}">
-                  <a16:creationId xmlns="" xmlns:a16="http://schemas.microsoft.com/office/drawing/2014/main" id="{8C5E4EE9-8293-4139-8CF5-CC0A34FDBB41}"/>
+                  <a16:creationId xmlns:a16="http://schemas.microsoft.com/office/drawing/2014/main" xmlns="" id="{8C5E4EE9-8293-4139-8CF5-CC0A34FDBB41}"/>
                 </a:ext>
               </a:extLst>
             </p:cNvPr>
@@ -5953,7 +7680,7 @@
             <p:cNvPr id="13" name="Rectangle 12">
               <a:extLst>
                 <a:ext uri="{FF2B5EF4-FFF2-40B4-BE49-F238E27FC236}">
-                  <a16:creationId xmlns="" xmlns:a16="http://schemas.microsoft.com/office/drawing/2014/main" id="{D9ECCF58-240B-4FB2-A3F5-76942C811B28}"/>
+                  <a16:creationId xmlns:a16="http://schemas.microsoft.com/office/drawing/2014/main" xmlns="" id="{D9ECCF58-240B-4FB2-A3F5-76942C811B28}"/>
                 </a:ext>
               </a:extLst>
             </p:cNvPr>
@@ -6008,7 +7735,7 @@
           <p:cNvPr id="17" name="Rectangle: Rounded Corners 16">
             <a:extLst>
               <a:ext uri="{FF2B5EF4-FFF2-40B4-BE49-F238E27FC236}">
-                <a16:creationId xmlns="" xmlns:a16="http://schemas.microsoft.com/office/drawing/2014/main" id="{2A96BEB6-F9B6-4ADC-B384-0DBA22CE4EAA}"/>
+                <a16:creationId xmlns:a16="http://schemas.microsoft.com/office/drawing/2014/main" xmlns="" id="{2A96BEB6-F9B6-4ADC-B384-0DBA22CE4EAA}"/>
               </a:ext>
             </a:extLst>
           </p:cNvPr>
@@ -6067,7 +7794,7 @@
 </p:sld>
 </file>
 
-<file path=ppt/slides/slide22.xml><?xml version="1.0" encoding="utf-8"?>
+<file path=ppt/slides/slide23.xml><?xml version="1.0" encoding="utf-8"?>
 <p:sld xmlns:a="http://schemas.openxmlformats.org/drawingml/2006/main" xmlns:r="http://schemas.openxmlformats.org/officeDocument/2006/relationships" xmlns:p="http://schemas.openxmlformats.org/presentationml/2006/main">
   <p:cSld>
     <p:spTree>
@@ -6089,7 +7816,7 @@
           <p:cNvPr id="1026" name="Picture 2" descr="Fishing Reel Icon. Vector &amp; Photo (Free Trial) | Bigstock">
             <a:extLst>
               <a:ext uri="{FF2B5EF4-FFF2-40B4-BE49-F238E27FC236}">
-                <a16:creationId xmlns="" xmlns:a16="http://schemas.microsoft.com/office/drawing/2014/main" id="{42CD2598-1884-4198-8449-C9CBD1CEF439}"/>
+                <a16:creationId xmlns:a16="http://schemas.microsoft.com/office/drawing/2014/main" xmlns="" id="{42CD2598-1884-4198-8449-C9CBD1CEF439}"/>
               </a:ext>
             </a:extLst>
           </p:cNvPr>
@@ -6136,7 +7863,7 @@
           <p:cNvPr id="1028" name="Picture 4" descr="Fishing reel - Free sports icons">
             <a:extLst>
               <a:ext uri="{FF2B5EF4-FFF2-40B4-BE49-F238E27FC236}">
-                <a16:creationId xmlns="" xmlns:a16="http://schemas.microsoft.com/office/drawing/2014/main" id="{C3AFD24C-99DA-4921-A1CD-37620D1DFB48}"/>
+                <a16:creationId xmlns:a16="http://schemas.microsoft.com/office/drawing/2014/main" xmlns="" id="{C3AFD24C-99DA-4921-A1CD-37620D1DFB48}"/>
               </a:ext>
             </a:extLst>
           </p:cNvPr>
@@ -6183,7 +7910,7 @@
           <p:cNvPr id="36" name="Freeform: Shape 35">
             <a:extLst>
               <a:ext uri="{FF2B5EF4-FFF2-40B4-BE49-F238E27FC236}">
-                <a16:creationId xmlns="" xmlns:a16="http://schemas.microsoft.com/office/drawing/2014/main" id="{7C0A1675-41AB-4473-A1B1-DA52410A6636}"/>
+                <a16:creationId xmlns:a16="http://schemas.microsoft.com/office/drawing/2014/main" xmlns="" id="{7C0A1675-41AB-4473-A1B1-DA52410A6636}"/>
               </a:ext>
             </a:extLst>
           </p:cNvPr>
@@ -6777,7 +8504,7 @@
           <p:cNvPr id="21" name="Group 20">
             <a:extLst>
               <a:ext uri="{FF2B5EF4-FFF2-40B4-BE49-F238E27FC236}">
-                <a16:creationId xmlns="" xmlns:a16="http://schemas.microsoft.com/office/drawing/2014/main" id="{63EDE57A-D111-45CB-BB58-A3E574C2A061}"/>
+                <a16:creationId xmlns:a16="http://schemas.microsoft.com/office/drawing/2014/main" xmlns="" id="{63EDE57A-D111-45CB-BB58-A3E574C2A061}"/>
               </a:ext>
             </a:extLst>
           </p:cNvPr>
@@ -6797,7 +8524,7 @@
             <p:cNvPr id="22" name="Oval 21">
               <a:extLst>
                 <a:ext uri="{FF2B5EF4-FFF2-40B4-BE49-F238E27FC236}">
-                  <a16:creationId xmlns="" xmlns:a16="http://schemas.microsoft.com/office/drawing/2014/main" id="{36CD6310-BC74-420A-A87A-6967BD1377E2}"/>
+                  <a16:creationId xmlns:a16="http://schemas.microsoft.com/office/drawing/2014/main" xmlns="" id="{36CD6310-BC74-420A-A87A-6967BD1377E2}"/>
                 </a:ext>
               </a:extLst>
             </p:cNvPr>
@@ -6846,7 +8573,7 @@
             <p:cNvPr id="23" name="Oval 22">
               <a:extLst>
                 <a:ext uri="{FF2B5EF4-FFF2-40B4-BE49-F238E27FC236}">
-                  <a16:creationId xmlns="" xmlns:a16="http://schemas.microsoft.com/office/drawing/2014/main" id="{6E067BED-B36A-4BB9-8BAA-2F725D363FC9}"/>
+                  <a16:creationId xmlns:a16="http://schemas.microsoft.com/office/drawing/2014/main" xmlns="" id="{6E067BED-B36A-4BB9-8BAA-2F725D363FC9}"/>
                 </a:ext>
               </a:extLst>
             </p:cNvPr>
@@ -6898,7 +8625,7 @@
             <p:cNvPr id="24" name="Oval 23">
               <a:extLst>
                 <a:ext uri="{FF2B5EF4-FFF2-40B4-BE49-F238E27FC236}">
-                  <a16:creationId xmlns="" xmlns:a16="http://schemas.microsoft.com/office/drawing/2014/main" id="{5C9C3BAD-3123-4F35-A610-EEE18C0973B0}"/>
+                  <a16:creationId xmlns:a16="http://schemas.microsoft.com/office/drawing/2014/main" xmlns="" id="{5C9C3BAD-3123-4F35-A610-EEE18C0973B0}"/>
                 </a:ext>
               </a:extLst>
             </p:cNvPr>
@@ -6950,7 +8677,7 @@
             <p:cNvPr id="25" name="Group 24">
               <a:extLst>
                 <a:ext uri="{FF2B5EF4-FFF2-40B4-BE49-F238E27FC236}">
-                  <a16:creationId xmlns="" xmlns:a16="http://schemas.microsoft.com/office/drawing/2014/main" id="{3133B8AA-2578-44F2-B68A-D88D0EF5B419}"/>
+                  <a16:creationId xmlns:a16="http://schemas.microsoft.com/office/drawing/2014/main" xmlns="" id="{3133B8AA-2578-44F2-B68A-D88D0EF5B419}"/>
                 </a:ext>
               </a:extLst>
             </p:cNvPr>
@@ -6970,7 +8697,7 @@
               <p:cNvPr id="33" name="Oval 32">
                 <a:extLst>
                   <a:ext uri="{FF2B5EF4-FFF2-40B4-BE49-F238E27FC236}">
-                    <a16:creationId xmlns="" xmlns:a16="http://schemas.microsoft.com/office/drawing/2014/main" id="{D26644F3-46C9-4D4B-99EF-32026CDED056}"/>
+                    <a16:creationId xmlns:a16="http://schemas.microsoft.com/office/drawing/2014/main" xmlns="" id="{D26644F3-46C9-4D4B-99EF-32026CDED056}"/>
                   </a:ext>
                 </a:extLst>
               </p:cNvPr>
@@ -7022,7 +8749,7 @@
               <p:cNvPr id="34" name="Oval 33">
                 <a:extLst>
                   <a:ext uri="{FF2B5EF4-FFF2-40B4-BE49-F238E27FC236}">
-                    <a16:creationId xmlns="" xmlns:a16="http://schemas.microsoft.com/office/drawing/2014/main" id="{2FCEDCED-0E11-401D-A06A-3A0EA08BEC29}"/>
+                    <a16:creationId xmlns:a16="http://schemas.microsoft.com/office/drawing/2014/main" xmlns="" id="{2FCEDCED-0E11-401D-A06A-3A0EA08BEC29}"/>
                   </a:ext>
                 </a:extLst>
               </p:cNvPr>
@@ -7075,7 +8802,7 @@
             <p:cNvPr id="26" name="Group 25">
               <a:extLst>
                 <a:ext uri="{FF2B5EF4-FFF2-40B4-BE49-F238E27FC236}">
-                  <a16:creationId xmlns="" xmlns:a16="http://schemas.microsoft.com/office/drawing/2014/main" id="{B1BA5735-B8DF-43F1-BE41-AEC36D9B4D0D}"/>
+                  <a16:creationId xmlns:a16="http://schemas.microsoft.com/office/drawing/2014/main" xmlns="" id="{B1BA5735-B8DF-43F1-BE41-AEC36D9B4D0D}"/>
                 </a:ext>
               </a:extLst>
             </p:cNvPr>
@@ -7095,7 +8822,7 @@
               <p:cNvPr id="31" name="Oval 30">
                 <a:extLst>
                   <a:ext uri="{FF2B5EF4-FFF2-40B4-BE49-F238E27FC236}">
-                    <a16:creationId xmlns="" xmlns:a16="http://schemas.microsoft.com/office/drawing/2014/main" id="{DD9E0A75-9B49-44EB-A74D-64748A2C950E}"/>
+                    <a16:creationId xmlns:a16="http://schemas.microsoft.com/office/drawing/2014/main" xmlns="" id="{DD9E0A75-9B49-44EB-A74D-64748A2C950E}"/>
                   </a:ext>
                 </a:extLst>
               </p:cNvPr>
@@ -7147,7 +8874,7 @@
               <p:cNvPr id="32" name="Oval 31">
                 <a:extLst>
                   <a:ext uri="{FF2B5EF4-FFF2-40B4-BE49-F238E27FC236}">
-                    <a16:creationId xmlns="" xmlns:a16="http://schemas.microsoft.com/office/drawing/2014/main" id="{6F6267FB-6D55-4BBF-AE56-A4889852ADC3}"/>
+                    <a16:creationId xmlns:a16="http://schemas.microsoft.com/office/drawing/2014/main" xmlns="" id="{6F6267FB-6D55-4BBF-AE56-A4889852ADC3}"/>
                   </a:ext>
                 </a:extLst>
               </p:cNvPr>
@@ -7200,7 +8927,7 @@
             <p:cNvPr id="27" name="Group 26">
               <a:extLst>
                 <a:ext uri="{FF2B5EF4-FFF2-40B4-BE49-F238E27FC236}">
-                  <a16:creationId xmlns="" xmlns:a16="http://schemas.microsoft.com/office/drawing/2014/main" id="{3938A498-AD65-4C70-A0C4-3E9C1E8383E5}"/>
+                  <a16:creationId xmlns:a16="http://schemas.microsoft.com/office/drawing/2014/main" xmlns="" id="{3938A498-AD65-4C70-A0C4-3E9C1E8383E5}"/>
                 </a:ext>
               </a:extLst>
             </p:cNvPr>
@@ -7220,7 +8947,7 @@
               <p:cNvPr id="29" name="Oval 28">
                 <a:extLst>
                   <a:ext uri="{FF2B5EF4-FFF2-40B4-BE49-F238E27FC236}">
-                    <a16:creationId xmlns="" xmlns:a16="http://schemas.microsoft.com/office/drawing/2014/main" id="{CF878B12-6270-4B6A-896C-613922D70B91}"/>
+                    <a16:creationId xmlns:a16="http://schemas.microsoft.com/office/drawing/2014/main" xmlns="" id="{CF878B12-6270-4B6A-896C-613922D70B91}"/>
                   </a:ext>
                 </a:extLst>
               </p:cNvPr>
@@ -7272,7 +8999,7 @@
               <p:cNvPr id="30" name="Oval 29">
                 <a:extLst>
                   <a:ext uri="{FF2B5EF4-FFF2-40B4-BE49-F238E27FC236}">
-                    <a16:creationId xmlns="" xmlns:a16="http://schemas.microsoft.com/office/drawing/2014/main" id="{541E30A1-911C-4CB6-965A-4794CC47891A}"/>
+                    <a16:creationId xmlns:a16="http://schemas.microsoft.com/office/drawing/2014/main" xmlns="" id="{541E30A1-911C-4CB6-965A-4794CC47891A}"/>
                   </a:ext>
                 </a:extLst>
               </p:cNvPr>
@@ -7325,7 +9052,7 @@
             <p:cNvPr id="28" name="Oval 27">
               <a:extLst>
                 <a:ext uri="{FF2B5EF4-FFF2-40B4-BE49-F238E27FC236}">
-                  <a16:creationId xmlns="" xmlns:a16="http://schemas.microsoft.com/office/drawing/2014/main" id="{87BF42C7-7805-4F6A-88A5-7B6FE49F1749}"/>
+                  <a16:creationId xmlns:a16="http://schemas.microsoft.com/office/drawing/2014/main" xmlns="" id="{87BF42C7-7805-4F6A-88A5-7B6FE49F1749}"/>
                 </a:ext>
               </a:extLst>
             </p:cNvPr>
@@ -7378,7 +9105,7 @@
           <p:cNvPr id="37" name="Group 36">
             <a:extLst>
               <a:ext uri="{FF2B5EF4-FFF2-40B4-BE49-F238E27FC236}">
-                <a16:creationId xmlns="" xmlns:a16="http://schemas.microsoft.com/office/drawing/2014/main" id="{CC1A29CF-1719-4074-BBFD-580735A086D4}"/>
+                <a16:creationId xmlns:a16="http://schemas.microsoft.com/office/drawing/2014/main" xmlns="" id="{CC1A29CF-1719-4074-BBFD-580735A086D4}"/>
               </a:ext>
             </a:extLst>
           </p:cNvPr>
@@ -7401,7 +9128,7 @@
             <p:cNvPr id="19" name="Rectangle: Top Corners Rounded 18">
               <a:extLst>
                 <a:ext uri="{FF2B5EF4-FFF2-40B4-BE49-F238E27FC236}">
-                  <a16:creationId xmlns="" xmlns:a16="http://schemas.microsoft.com/office/drawing/2014/main" id="{94F72908-535E-4D89-8109-9F2A06ED09CE}"/>
+                  <a16:creationId xmlns:a16="http://schemas.microsoft.com/office/drawing/2014/main" xmlns="" id="{94F72908-535E-4D89-8109-9F2A06ED09CE}"/>
                 </a:ext>
               </a:extLst>
             </p:cNvPr>
@@ -7458,7 +9185,7 @@
             <p:cNvPr id="20" name="Oval 19">
               <a:extLst>
                 <a:ext uri="{FF2B5EF4-FFF2-40B4-BE49-F238E27FC236}">
-                  <a16:creationId xmlns="" xmlns:a16="http://schemas.microsoft.com/office/drawing/2014/main" id="{3225F8AE-768E-4B74-94DE-39957BD55381}"/>
+                  <a16:creationId xmlns:a16="http://schemas.microsoft.com/office/drawing/2014/main" xmlns="" id="{3225F8AE-768E-4B74-94DE-39957BD55381}"/>
                 </a:ext>
               </a:extLst>
             </p:cNvPr>
@@ -7513,7 +9240,7 @@
           <p:cNvPr id="39" name="Rectangle 38">
             <a:extLst>
               <a:ext uri="{FF2B5EF4-FFF2-40B4-BE49-F238E27FC236}">
-                <a16:creationId xmlns="" xmlns:a16="http://schemas.microsoft.com/office/drawing/2014/main" id="{4B52A79A-AB1B-41B3-9A6F-0A7F93BA70F8}"/>
+                <a16:creationId xmlns:a16="http://schemas.microsoft.com/office/drawing/2014/main" xmlns="" id="{4B52A79A-AB1B-41B3-9A6F-0A7F93BA70F8}"/>
               </a:ext>
             </a:extLst>
           </p:cNvPr>
@@ -7567,7 +9294,7 @@
           <p:cNvPr id="38" name="Rectangle: Rounded Corners 37">
             <a:extLst>
               <a:ext uri="{FF2B5EF4-FFF2-40B4-BE49-F238E27FC236}">
-                <a16:creationId xmlns="" xmlns:a16="http://schemas.microsoft.com/office/drawing/2014/main" id="{01DBCCA9-6713-48A8-A2EF-4BB8B8CBDA08}"/>
+                <a16:creationId xmlns:a16="http://schemas.microsoft.com/office/drawing/2014/main" xmlns="" id="{01DBCCA9-6713-48A8-A2EF-4BB8B8CBDA08}"/>
               </a:ext>
             </a:extLst>
           </p:cNvPr>
@@ -7623,7 +9350,7 @@
           <p:cNvPr id="42" name="Rectangle 41">
             <a:extLst>
               <a:ext uri="{FF2B5EF4-FFF2-40B4-BE49-F238E27FC236}">
-                <a16:creationId xmlns="" xmlns:a16="http://schemas.microsoft.com/office/drawing/2014/main" id="{2D3041F9-6C27-45E6-89FA-71A8C9AA6C57}"/>
+                <a16:creationId xmlns:a16="http://schemas.microsoft.com/office/drawing/2014/main" xmlns="" id="{2D3041F9-6C27-45E6-89FA-71A8C9AA6C57}"/>
               </a:ext>
             </a:extLst>
           </p:cNvPr>
@@ -7685,7 +9412,7 @@
 </p:sld>
 </file>
 
-<file path=ppt/slides/slide23.xml><?xml version="1.0" encoding="utf-8"?>
+<file path=ppt/slides/slide24.xml><?xml version="1.0" encoding="utf-8"?>
 <p:sld xmlns:a="http://schemas.openxmlformats.org/drawingml/2006/main" xmlns:r="http://schemas.openxmlformats.org/officeDocument/2006/relationships" xmlns:p="http://schemas.openxmlformats.org/presentationml/2006/main">
   <p:cSld>
     <p:spTree>
@@ -7707,7 +9434,7 @@
           <p:cNvPr id="2" name="Oval 1">
             <a:extLst>
               <a:ext uri="{FF2B5EF4-FFF2-40B4-BE49-F238E27FC236}">
-                <a16:creationId xmlns="" xmlns:a16="http://schemas.microsoft.com/office/drawing/2014/main" id="{BB94812E-CB64-4BF8-8336-2BB82264598F}"/>
+                <a16:creationId xmlns:a16="http://schemas.microsoft.com/office/drawing/2014/main" xmlns="" id="{BB94812E-CB64-4BF8-8336-2BB82264598F}"/>
               </a:ext>
             </a:extLst>
           </p:cNvPr>
@@ -7770,7 +9497,7 @@
 </p:sld>
 </file>
 
-<file path=ppt/slides/slide24.xml><?xml version="1.0" encoding="utf-8"?>
+<file path=ppt/slides/slide25.xml><?xml version="1.0" encoding="utf-8"?>
 <p:sld xmlns:a="http://schemas.openxmlformats.org/drawingml/2006/main" xmlns:r="http://schemas.openxmlformats.org/officeDocument/2006/relationships" xmlns:p="http://schemas.openxmlformats.org/presentationml/2006/main">
   <p:cSld>
     <p:spTree>
@@ -7792,7 +9519,7 @@
           <p:cNvPr id="2" name="Oval 1">
             <a:extLst>
               <a:ext uri="{FF2B5EF4-FFF2-40B4-BE49-F238E27FC236}">
-                <a16:creationId xmlns="" xmlns:a16="http://schemas.microsoft.com/office/drawing/2014/main" id="{BB94812E-CB64-4BF8-8336-2BB82264598F}"/>
+                <a16:creationId xmlns:a16="http://schemas.microsoft.com/office/drawing/2014/main" xmlns="" id="{BB94812E-CB64-4BF8-8336-2BB82264598F}"/>
               </a:ext>
             </a:extLst>
           </p:cNvPr>
@@ -7852,7 +9579,7 @@
 </p:sld>
 </file>
 
-<file path=ppt/slides/slide25.xml><?xml version="1.0" encoding="utf-8"?>
+<file path=ppt/slides/slide26.xml><?xml version="1.0" encoding="utf-8"?>
 <p:sld xmlns:a="http://schemas.openxmlformats.org/drawingml/2006/main" xmlns:r="http://schemas.openxmlformats.org/officeDocument/2006/relationships" xmlns:p="http://schemas.openxmlformats.org/presentationml/2006/main">
   <p:cSld>
     <p:spTree>
@@ -7874,7 +9601,7 @@
           <p:cNvPr id="8" name="Group 7">
             <a:extLst>
               <a:ext uri="{FF2B5EF4-FFF2-40B4-BE49-F238E27FC236}">
-                <a16:creationId xmlns="" xmlns:a16="http://schemas.microsoft.com/office/drawing/2014/main" id="{2C8FE924-E2A9-4FCF-AB10-4849252056CE}"/>
+                <a16:creationId xmlns:a16="http://schemas.microsoft.com/office/drawing/2014/main" xmlns="" id="{2C8FE924-E2A9-4FCF-AB10-4849252056CE}"/>
               </a:ext>
             </a:extLst>
           </p:cNvPr>
@@ -7894,7 +9621,7 @@
             <p:cNvPr id="2" name="Rectangle: Rounded Corners 1">
               <a:extLst>
                 <a:ext uri="{FF2B5EF4-FFF2-40B4-BE49-F238E27FC236}">
-                  <a16:creationId xmlns="" xmlns:a16="http://schemas.microsoft.com/office/drawing/2014/main" id="{41D21A81-62EB-45C0-959F-1C72D436A1ED}"/>
+                  <a16:creationId xmlns:a16="http://schemas.microsoft.com/office/drawing/2014/main" xmlns="" id="{41D21A81-62EB-45C0-959F-1C72D436A1ED}"/>
                 </a:ext>
               </a:extLst>
             </p:cNvPr>
@@ -7955,7 +9682,7 @@
             <p:cNvPr id="5" name="Rectangle: Top Corners Rounded 4">
               <a:extLst>
                 <a:ext uri="{FF2B5EF4-FFF2-40B4-BE49-F238E27FC236}">
-                  <a16:creationId xmlns="" xmlns:a16="http://schemas.microsoft.com/office/drawing/2014/main" id="{69AF57CF-2B55-4711-9CF7-242A6509C0C2}"/>
+                  <a16:creationId xmlns:a16="http://schemas.microsoft.com/office/drawing/2014/main" xmlns="" id="{69AF57CF-2B55-4711-9CF7-242A6509C0C2}"/>
                 </a:ext>
               </a:extLst>
             </p:cNvPr>
@@ -8010,7 +9737,7 @@
             <p:cNvPr id="6" name="Rectangle: Top Corners Rounded 5">
               <a:extLst>
                 <a:ext uri="{FF2B5EF4-FFF2-40B4-BE49-F238E27FC236}">
-                  <a16:creationId xmlns="" xmlns:a16="http://schemas.microsoft.com/office/drawing/2014/main" id="{5F370DD8-8227-4CDB-BA60-B8D18EEF3950}"/>
+                  <a16:creationId xmlns:a16="http://schemas.microsoft.com/office/drawing/2014/main" xmlns="" id="{5F370DD8-8227-4CDB-BA60-B8D18EEF3950}"/>
                 </a:ext>
               </a:extLst>
             </p:cNvPr>
@@ -8074,7 +9801,7 @@
 </p:sld>
 </file>
 
-<file path=ppt/slides/slide26.xml><?xml version="1.0" encoding="utf-8"?>
+<file path=ppt/slides/slide27.xml><?xml version="1.0" encoding="utf-8"?>
 <p:sld xmlns:a="http://schemas.openxmlformats.org/drawingml/2006/main" xmlns:r="http://schemas.openxmlformats.org/officeDocument/2006/relationships" xmlns:p="http://schemas.openxmlformats.org/presentationml/2006/main">
   <p:cSld>
     <p:spTree>
@@ -8096,7 +9823,7 @@
           <p:cNvPr id="8" name="Group 7">
             <a:extLst>
               <a:ext uri="{FF2B5EF4-FFF2-40B4-BE49-F238E27FC236}">
-                <a16:creationId xmlns="" xmlns:a16="http://schemas.microsoft.com/office/drawing/2014/main" id="{2C8FE924-E2A9-4FCF-AB10-4849252056CE}"/>
+                <a16:creationId xmlns:a16="http://schemas.microsoft.com/office/drawing/2014/main" xmlns="" id="{2C8FE924-E2A9-4FCF-AB10-4849252056CE}"/>
               </a:ext>
             </a:extLst>
           </p:cNvPr>
@@ -8116,7 +9843,7 @@
             <p:cNvPr id="2" name="Rectangle: Rounded Corners 1">
               <a:extLst>
                 <a:ext uri="{FF2B5EF4-FFF2-40B4-BE49-F238E27FC236}">
-                  <a16:creationId xmlns="" xmlns:a16="http://schemas.microsoft.com/office/drawing/2014/main" id="{41D21A81-62EB-45C0-959F-1C72D436A1ED}"/>
+                  <a16:creationId xmlns:a16="http://schemas.microsoft.com/office/drawing/2014/main" xmlns="" id="{41D21A81-62EB-45C0-959F-1C72D436A1ED}"/>
                 </a:ext>
               </a:extLst>
             </p:cNvPr>
@@ -8177,7 +9904,7 @@
             <p:cNvPr id="5" name="Rectangle: Top Corners Rounded 4">
               <a:extLst>
                 <a:ext uri="{FF2B5EF4-FFF2-40B4-BE49-F238E27FC236}">
-                  <a16:creationId xmlns="" xmlns:a16="http://schemas.microsoft.com/office/drawing/2014/main" id="{69AF57CF-2B55-4711-9CF7-242A6509C0C2}"/>
+                  <a16:creationId xmlns:a16="http://schemas.microsoft.com/office/drawing/2014/main" xmlns="" id="{69AF57CF-2B55-4711-9CF7-242A6509C0C2}"/>
                 </a:ext>
               </a:extLst>
             </p:cNvPr>
@@ -8248,7 +9975,7 @@
 </p:sld>
 </file>
 
-<file path=ppt/slides/slide27.xml><?xml version="1.0" encoding="utf-8"?>
+<file path=ppt/slides/slide28.xml><?xml version="1.0" encoding="utf-8"?>
 <p:sld xmlns:a="http://schemas.openxmlformats.org/drawingml/2006/main" xmlns:r="http://schemas.openxmlformats.org/officeDocument/2006/relationships" xmlns:p="http://schemas.openxmlformats.org/presentationml/2006/main">
   <p:cSld>
     <p:spTree>
@@ -8270,7 +9997,7 @@
           <p:cNvPr id="3" name="&quot;Not Allowed&quot; Symbol 2">
             <a:extLst>
               <a:ext uri="{FF2B5EF4-FFF2-40B4-BE49-F238E27FC236}">
-                <a16:creationId xmlns="" xmlns:a16="http://schemas.microsoft.com/office/drawing/2014/main" id="{364F1BE9-BD04-4A76-AFFF-4454208BA134}"/>
+                <a16:creationId xmlns:a16="http://schemas.microsoft.com/office/drawing/2014/main" xmlns="" id="{364F1BE9-BD04-4A76-AFFF-4454208BA134}"/>
               </a:ext>
             </a:extLst>
           </p:cNvPr>
@@ -8343,7 +10070,7 @@
 </p:sld>
 </file>
 
-<file path=ppt/slides/slide28.xml><?xml version="1.0" encoding="utf-8"?>
+<file path=ppt/slides/slide29.xml><?xml version="1.0" encoding="utf-8"?>
 <p:sld xmlns:a="http://schemas.openxmlformats.org/drawingml/2006/main" xmlns:r="http://schemas.openxmlformats.org/officeDocument/2006/relationships" xmlns:p="http://schemas.openxmlformats.org/presentationml/2006/main">
   <p:cSld>
     <p:spTree>
@@ -8365,7 +10092,7 @@
           <p:cNvPr id="3" name="L-Shape 2">
             <a:extLst>
               <a:ext uri="{FF2B5EF4-FFF2-40B4-BE49-F238E27FC236}">
-                <a16:creationId xmlns="" xmlns:a16="http://schemas.microsoft.com/office/drawing/2014/main" id="{4B6D5B79-FD53-4056-ADE3-1F8B0D882ECD}"/>
+                <a16:creationId xmlns:a16="http://schemas.microsoft.com/office/drawing/2014/main" xmlns="" id="{4B6D5B79-FD53-4056-ADE3-1F8B0D882ECD}"/>
               </a:ext>
             </a:extLst>
           </p:cNvPr>
@@ -8424,7 +10151,7 @@
           <p:cNvPr id="6" name="L-Shape 5">
             <a:extLst>
               <a:ext uri="{FF2B5EF4-FFF2-40B4-BE49-F238E27FC236}">
-                <a16:creationId xmlns="" xmlns:a16="http://schemas.microsoft.com/office/drawing/2014/main" id="{3F952716-7333-4F4A-A914-00948134503E}"/>
+                <a16:creationId xmlns:a16="http://schemas.microsoft.com/office/drawing/2014/main" xmlns="" id="{3F952716-7333-4F4A-A914-00948134503E}"/>
               </a:ext>
             </a:extLst>
           </p:cNvPr>
@@ -8483,7 +10210,7 @@
           <p:cNvPr id="7" name="L-Shape 6">
             <a:extLst>
               <a:ext uri="{FF2B5EF4-FFF2-40B4-BE49-F238E27FC236}">
-                <a16:creationId xmlns="" xmlns:a16="http://schemas.microsoft.com/office/drawing/2014/main" id="{887C30F7-ED54-41BA-9C34-79A1112E22C6}"/>
+                <a16:creationId xmlns:a16="http://schemas.microsoft.com/office/drawing/2014/main" xmlns="" id="{887C30F7-ED54-41BA-9C34-79A1112E22C6}"/>
               </a:ext>
             </a:extLst>
           </p:cNvPr>
@@ -8542,7 +10269,7 @@
           <p:cNvPr id="8" name="L-Shape 7">
             <a:extLst>
               <a:ext uri="{FF2B5EF4-FFF2-40B4-BE49-F238E27FC236}">
-                <a16:creationId xmlns="" xmlns:a16="http://schemas.microsoft.com/office/drawing/2014/main" id="{A18D6D78-3055-4CF7-A993-4219F0F334C4}"/>
+                <a16:creationId xmlns:a16="http://schemas.microsoft.com/office/drawing/2014/main" xmlns="" id="{A18D6D78-3055-4CF7-A993-4219F0F334C4}"/>
               </a:ext>
             </a:extLst>
           </p:cNvPr>
@@ -8609,7 +10336,227 @@
 </p:sld>
 </file>
 
-<file path=ppt/slides/slide29.xml><?xml version="1.0" encoding="utf-8"?>
+<file path=ppt/slides/slide3.xml><?xml version="1.0" encoding="utf-8"?>
+<p:sld xmlns:a="http://schemas.openxmlformats.org/drawingml/2006/main" xmlns:r="http://schemas.openxmlformats.org/officeDocument/2006/relationships" xmlns:p="http://schemas.openxmlformats.org/presentationml/2006/main">
+  <p:cSld>
+    <p:spTree>
+      <p:nvGrpSpPr>
+        <p:cNvPr id="1" name=""/>
+        <p:cNvGrpSpPr/>
+        <p:nvPr/>
+      </p:nvGrpSpPr>
+      <p:grpSpPr>
+        <a:xfrm>
+          <a:off x="0" y="0"/>
+          <a:ext cx="0" cy="0"/>
+          <a:chOff x="0" y="0"/>
+          <a:chExt cx="0" cy="0"/>
+        </a:xfrm>
+      </p:grpSpPr>
+      <p:sp>
+        <p:nvSpPr>
+          <p:cNvPr id="4" name="Oval 3"/>
+          <p:cNvSpPr/>
+          <p:nvPr/>
+        </p:nvSpPr>
+        <p:spPr>
+          <a:xfrm>
+            <a:off x="3355759" y="2212759"/>
+            <a:ext cx="2432482" cy="2432482"/>
+          </a:xfrm>
+          <a:prstGeom prst="ellipse">
+            <a:avLst/>
+          </a:prstGeom>
+          <a:noFill/>
+          <a:ln w="190500">
+            <a:solidFill>
+              <a:schemeClr val="bg1"/>
+            </a:solidFill>
+          </a:ln>
+        </p:spPr>
+        <p:style>
+          <a:lnRef idx="2">
+            <a:schemeClr val="accent1">
+              <a:shade val="50000"/>
+            </a:schemeClr>
+          </a:lnRef>
+          <a:fillRef idx="1">
+            <a:schemeClr val="accent1"/>
+          </a:fillRef>
+          <a:effectRef idx="0">
+            <a:schemeClr val="accent1"/>
+          </a:effectRef>
+          <a:fontRef idx="minor">
+            <a:schemeClr val="lt1"/>
+          </a:fontRef>
+        </p:style>
+        <p:txBody>
+          <a:bodyPr rtlCol="0" anchor="ctr"/>
+          <a:lstStyle/>
+          <a:p>
+            <a:pPr algn="ctr"/>
+            <a:endParaRPr lang="en-IN"/>
+          </a:p>
+        </p:txBody>
+      </p:sp>
+      <p:sp>
+        <p:nvSpPr>
+          <p:cNvPr id="3" name="Rectangle 2"/>
+          <p:cNvSpPr/>
+          <p:nvPr/>
+        </p:nvSpPr>
+        <p:spPr>
+          <a:xfrm>
+            <a:off x="275208" y="2212759"/>
+            <a:ext cx="2432482" cy="2432482"/>
+          </a:xfrm>
+          <a:prstGeom prst="rect">
+            <a:avLst/>
+          </a:prstGeom>
+          <a:noFill/>
+          <a:ln w="190500" cap="sq">
+            <a:solidFill>
+              <a:schemeClr val="bg1"/>
+            </a:solidFill>
+            <a:miter lim="800000"/>
+          </a:ln>
+        </p:spPr>
+        <p:style>
+          <a:lnRef idx="2">
+            <a:schemeClr val="accent1">
+              <a:shade val="50000"/>
+            </a:schemeClr>
+          </a:lnRef>
+          <a:fillRef idx="1">
+            <a:schemeClr val="accent1"/>
+          </a:fillRef>
+          <a:effectRef idx="0">
+            <a:schemeClr val="accent1"/>
+          </a:effectRef>
+          <a:fontRef idx="minor">
+            <a:schemeClr val="lt1"/>
+          </a:fontRef>
+        </p:style>
+        <p:txBody>
+          <a:bodyPr rtlCol="0" anchor="ctr"/>
+          <a:lstStyle/>
+          <a:p>
+            <a:pPr algn="ctr"/>
+            <a:endParaRPr lang="en-IN"/>
+          </a:p>
+        </p:txBody>
+      </p:sp>
+      <p:pic>
+        <p:nvPicPr>
+          <p:cNvPr id="1028" name="Picture 4" descr="C:\Repos\SlideAway\Assets\Resources\FloorIcons\ad0.png"/>
+          <p:cNvPicPr>
+            <a:picLocks noChangeAspect="1" noChangeArrowheads="1"/>
+          </p:cNvPicPr>
+          <p:nvPr/>
+        </p:nvPicPr>
+        <p:blipFill>
+          <a:blip r:embed="rId2">
+            <a:extLst>
+              <a:ext uri="{28A0092B-C50C-407E-A947-70E740481C1C}">
+                <a14:useLocalDpi xmlns:a14="http://schemas.microsoft.com/office/drawing/2010/main" val="0"/>
+              </a:ext>
+            </a:extLst>
+          </a:blip>
+          <a:srcRect/>
+          <a:stretch>
+            <a:fillRect/>
+          </a:stretch>
+        </p:blipFill>
+        <p:spPr bwMode="auto">
+          <a:xfrm>
+            <a:off x="6356412" y="1957182"/>
+            <a:ext cx="2438740" cy="2943636"/>
+          </a:xfrm>
+          <a:prstGeom prst="rect">
+            <a:avLst/>
+          </a:prstGeom>
+          <a:noFill/>
+          <a:extLst>
+            <a:ext uri="{909E8E84-426E-40DD-AFC4-6F175D3DCCD1}">
+              <a14:hiddenFill xmlns:a14="http://schemas.microsoft.com/office/drawing/2010/main">
+                <a:solidFill>
+                  <a:srgbClr val="FFFFFF"/>
+                </a:solidFill>
+              </a14:hiddenFill>
+            </a:ext>
+          </a:extLst>
+        </p:spPr>
+      </p:pic>
+      <p:sp>
+        <p:nvSpPr>
+          <p:cNvPr id="5" name="Hexagon 4"/>
+          <p:cNvSpPr/>
+          <p:nvPr/>
+        </p:nvSpPr>
+        <p:spPr>
+          <a:xfrm rot="5400000">
+            <a:off x="6100835" y="2212761"/>
+            <a:ext cx="2943633" cy="2432482"/>
+          </a:xfrm>
+          <a:prstGeom prst="hexagon">
+            <a:avLst>
+              <a:gd name="adj" fmla="val 35219"/>
+              <a:gd name="vf" fmla="val 115470"/>
+            </a:avLst>
+          </a:prstGeom>
+          <a:noFill/>
+          <a:ln w="190500">
+            <a:solidFill>
+              <a:schemeClr val="bg1"/>
+            </a:solidFill>
+          </a:ln>
+        </p:spPr>
+        <p:style>
+          <a:lnRef idx="2">
+            <a:schemeClr val="accent1">
+              <a:shade val="50000"/>
+            </a:schemeClr>
+          </a:lnRef>
+          <a:fillRef idx="1">
+            <a:schemeClr val="accent1"/>
+          </a:fillRef>
+          <a:effectRef idx="0">
+            <a:schemeClr val="accent1"/>
+          </a:effectRef>
+          <a:fontRef idx="minor">
+            <a:schemeClr val="lt1"/>
+          </a:fontRef>
+        </p:style>
+        <p:txBody>
+          <a:bodyPr rtlCol="0" anchor="ctr"/>
+          <a:lstStyle/>
+          <a:p>
+            <a:pPr algn="ctr"/>
+            <a:endParaRPr lang="en-IN"/>
+          </a:p>
+        </p:txBody>
+      </p:sp>
+    </p:spTree>
+    <p:extLst>
+      <p:ext uri="{BB962C8B-B14F-4D97-AF65-F5344CB8AC3E}">
+        <p14:creationId xmlns:p14="http://schemas.microsoft.com/office/powerpoint/2010/main" val="1513403828"/>
+      </p:ext>
+    </p:extLst>
+  </p:cSld>
+  <p:clrMapOvr>
+    <a:masterClrMapping/>
+  </p:clrMapOvr>
+  <p:timing>
+    <p:tnLst>
+      <p:par>
+        <p:cTn id="1" dur="indefinite" restart="never" nodeType="tmRoot"/>
+      </p:par>
+    </p:tnLst>
+  </p:timing>
+</p:sld>
+</file>
+
+<file path=ppt/slides/slide30.xml><?xml version="1.0" encoding="utf-8"?>
 <p:sld xmlns:a="http://schemas.openxmlformats.org/drawingml/2006/main" xmlns:r="http://schemas.openxmlformats.org/officeDocument/2006/relationships" xmlns:p="http://schemas.openxmlformats.org/presentationml/2006/main">
   <p:cSld>
     <p:spTree>
@@ -8631,7 +10578,7 @@
           <p:cNvPr id="8" name="Group 7">
             <a:extLst>
               <a:ext uri="{FF2B5EF4-FFF2-40B4-BE49-F238E27FC236}">
-                <a16:creationId xmlns="" xmlns:a16="http://schemas.microsoft.com/office/drawing/2014/main" id="{2C8FE924-E2A9-4FCF-AB10-4849252056CE}"/>
+                <a16:creationId xmlns:a16="http://schemas.microsoft.com/office/drawing/2014/main" xmlns="" id="{2C8FE924-E2A9-4FCF-AB10-4849252056CE}"/>
               </a:ext>
             </a:extLst>
           </p:cNvPr>
@@ -8651,7 +10598,7 @@
             <p:cNvPr id="2" name="Rectangle: Rounded Corners 1">
               <a:extLst>
                 <a:ext uri="{FF2B5EF4-FFF2-40B4-BE49-F238E27FC236}">
-                  <a16:creationId xmlns="" xmlns:a16="http://schemas.microsoft.com/office/drawing/2014/main" id="{41D21A81-62EB-45C0-959F-1C72D436A1ED}"/>
+                  <a16:creationId xmlns:a16="http://schemas.microsoft.com/office/drawing/2014/main" xmlns="" id="{41D21A81-62EB-45C0-959F-1C72D436A1ED}"/>
                 </a:ext>
               </a:extLst>
             </p:cNvPr>
@@ -8714,7 +10661,7 @@
             <p:cNvPr id="5" name="Rectangle: Top Corners Rounded 4">
               <a:extLst>
                 <a:ext uri="{FF2B5EF4-FFF2-40B4-BE49-F238E27FC236}">
-                  <a16:creationId xmlns="" xmlns:a16="http://schemas.microsoft.com/office/drawing/2014/main" id="{69AF57CF-2B55-4711-9CF7-242A6509C0C2}"/>
+                  <a16:creationId xmlns:a16="http://schemas.microsoft.com/office/drawing/2014/main" xmlns="" id="{69AF57CF-2B55-4711-9CF7-242A6509C0C2}"/>
                 </a:ext>
               </a:extLst>
             </p:cNvPr>
@@ -8769,7 +10716,7 @@
             <p:cNvPr id="6" name="Rectangle: Top Corners Rounded 5">
               <a:extLst>
                 <a:ext uri="{FF2B5EF4-FFF2-40B4-BE49-F238E27FC236}">
-                  <a16:creationId xmlns="" xmlns:a16="http://schemas.microsoft.com/office/drawing/2014/main" id="{5F370DD8-8227-4CDB-BA60-B8D18EEF3950}"/>
+                  <a16:creationId xmlns:a16="http://schemas.microsoft.com/office/drawing/2014/main" xmlns="" id="{5F370DD8-8227-4CDB-BA60-B8D18EEF3950}"/>
                 </a:ext>
               </a:extLst>
             </p:cNvPr>
@@ -8828,7 +10775,7 @@
           <p:cNvPr id="7" name="Group 6">
             <a:extLst>
               <a:ext uri="{FF2B5EF4-FFF2-40B4-BE49-F238E27FC236}">
-                <a16:creationId xmlns="" xmlns:a16="http://schemas.microsoft.com/office/drawing/2014/main" id="{AC3B8550-1AC4-4F80-8A05-11713579488F}"/>
+                <a16:creationId xmlns:a16="http://schemas.microsoft.com/office/drawing/2014/main" xmlns="" id="{AC3B8550-1AC4-4F80-8A05-11713579488F}"/>
               </a:ext>
             </a:extLst>
           </p:cNvPr>
@@ -8848,7 +10795,7 @@
             <p:cNvPr id="9" name="Rectangle: Rounded Corners 8">
               <a:extLst>
                 <a:ext uri="{FF2B5EF4-FFF2-40B4-BE49-F238E27FC236}">
-                  <a16:creationId xmlns="" xmlns:a16="http://schemas.microsoft.com/office/drawing/2014/main" id="{6FB75456-3298-444E-AC32-7AB754F66F90}"/>
+                  <a16:creationId xmlns:a16="http://schemas.microsoft.com/office/drawing/2014/main" xmlns="" id="{6FB75456-3298-444E-AC32-7AB754F66F90}"/>
                 </a:ext>
               </a:extLst>
             </p:cNvPr>
@@ -8911,7 +10858,7 @@
             <p:cNvPr id="10" name="Rectangle: Top Corners Rounded 9">
               <a:extLst>
                 <a:ext uri="{FF2B5EF4-FFF2-40B4-BE49-F238E27FC236}">
-                  <a16:creationId xmlns="" xmlns:a16="http://schemas.microsoft.com/office/drawing/2014/main" id="{7F5F5DFB-946A-440C-8D40-96AB03B69404}"/>
+                  <a16:creationId xmlns:a16="http://schemas.microsoft.com/office/drawing/2014/main" xmlns="" id="{7F5F5DFB-946A-440C-8D40-96AB03B69404}"/>
                 </a:ext>
               </a:extLst>
             </p:cNvPr>
@@ -8982,136 +10929,7 @@
 </p:sld>
 </file>
 
-<file path=ppt/slides/slide3.xml><?xml version="1.0" encoding="utf-8"?>
-<p:sld xmlns:a="http://schemas.openxmlformats.org/drawingml/2006/main" xmlns:r="http://schemas.openxmlformats.org/officeDocument/2006/relationships" xmlns:p="http://schemas.openxmlformats.org/presentationml/2006/main">
-  <p:cSld>
-    <p:spTree>
-      <p:nvGrpSpPr>
-        <p:cNvPr id="1" name=""/>
-        <p:cNvGrpSpPr/>
-        <p:nvPr/>
-      </p:nvGrpSpPr>
-      <p:grpSpPr>
-        <a:xfrm>
-          <a:off x="0" y="0"/>
-          <a:ext cx="0" cy="0"/>
-          <a:chOff x="0" y="0"/>
-          <a:chExt cx="0" cy="0"/>
-        </a:xfrm>
-      </p:grpSpPr>
-      <p:sp>
-        <p:nvSpPr>
-          <p:cNvPr id="4" name="Oval 3"/>
-          <p:cNvSpPr/>
-          <p:nvPr/>
-        </p:nvSpPr>
-        <p:spPr>
-          <a:xfrm>
-            <a:off x="3355759" y="2212759"/>
-            <a:ext cx="2432482" cy="2432482"/>
-          </a:xfrm>
-          <a:prstGeom prst="ellipse">
-            <a:avLst/>
-          </a:prstGeom>
-          <a:noFill/>
-          <a:ln w="254000">
-            <a:solidFill>
-              <a:schemeClr val="bg1"/>
-            </a:solidFill>
-          </a:ln>
-        </p:spPr>
-        <p:style>
-          <a:lnRef idx="2">
-            <a:schemeClr val="accent1">
-              <a:shade val="50000"/>
-            </a:schemeClr>
-          </a:lnRef>
-          <a:fillRef idx="1">
-            <a:schemeClr val="accent1"/>
-          </a:fillRef>
-          <a:effectRef idx="0">
-            <a:schemeClr val="accent1"/>
-          </a:effectRef>
-          <a:fontRef idx="minor">
-            <a:schemeClr val="lt1"/>
-          </a:fontRef>
-        </p:style>
-        <p:txBody>
-          <a:bodyPr rtlCol="0" anchor="ctr"/>
-          <a:lstStyle/>
-          <a:p>
-            <a:pPr algn="ctr"/>
-            <a:endParaRPr lang="en-IN"/>
-          </a:p>
-        </p:txBody>
-      </p:sp>
-      <p:sp>
-        <p:nvSpPr>
-          <p:cNvPr id="6" name="Arc 5"/>
-          <p:cNvSpPr/>
-          <p:nvPr/>
-        </p:nvSpPr>
-        <p:spPr>
-          <a:xfrm>
-            <a:off x="3851910" y="2708910"/>
-            <a:ext cx="1440180" cy="1440180"/>
-          </a:xfrm>
-          <a:prstGeom prst="arc">
-            <a:avLst/>
-          </a:prstGeom>
-          <a:noFill/>
-          <a:ln w="254000" cap="rnd">
-            <a:solidFill>
-              <a:srgbClr val="FF8100"/>
-            </a:solidFill>
-          </a:ln>
-        </p:spPr>
-        <p:style>
-          <a:lnRef idx="2">
-            <a:schemeClr val="accent1">
-              <a:shade val="50000"/>
-            </a:schemeClr>
-          </a:lnRef>
-          <a:fillRef idx="1">
-            <a:schemeClr val="accent1"/>
-          </a:fillRef>
-          <a:effectRef idx="0">
-            <a:schemeClr val="accent1"/>
-          </a:effectRef>
-          <a:fontRef idx="minor">
-            <a:schemeClr val="lt1"/>
-          </a:fontRef>
-        </p:style>
-        <p:txBody>
-          <a:bodyPr rtlCol="0" anchor="ctr"/>
-          <a:lstStyle/>
-          <a:p>
-            <a:pPr algn="ctr"/>
-            <a:endParaRPr lang="en-IN"/>
-          </a:p>
-        </p:txBody>
-      </p:sp>
-    </p:spTree>
-    <p:extLst>
-      <p:ext uri="{BB962C8B-B14F-4D97-AF65-F5344CB8AC3E}">
-        <p14:creationId xmlns:p14="http://schemas.microsoft.com/office/powerpoint/2010/main" val="198311063"/>
-      </p:ext>
-    </p:extLst>
-  </p:cSld>
-  <p:clrMapOvr>
-    <a:masterClrMapping/>
-  </p:clrMapOvr>
-  <p:timing>
-    <p:tnLst>
-      <p:par>
-        <p:cTn id="1" dur="indefinite" restart="never" nodeType="tmRoot"/>
-      </p:par>
-    </p:tnLst>
-  </p:timing>
-</p:sld>
-</file>
-
-<file path=ppt/slides/slide30.xml><?xml version="1.0" encoding="utf-8"?>
+<file path=ppt/slides/slide31.xml><?xml version="1.0" encoding="utf-8"?>
 <p:sld xmlns:a="http://schemas.openxmlformats.org/drawingml/2006/main" xmlns:r="http://schemas.openxmlformats.org/officeDocument/2006/relationships" xmlns:p="http://schemas.openxmlformats.org/presentationml/2006/main">
   <p:cSld>
     <p:spTree>
@@ -9133,7 +10951,7 @@
           <p:cNvPr id="5" name="Oval 4">
             <a:extLst>
               <a:ext uri="{FF2B5EF4-FFF2-40B4-BE49-F238E27FC236}">
-                <a16:creationId xmlns="" xmlns:a16="http://schemas.microsoft.com/office/drawing/2014/main" id="{5CE85C29-C9E0-4DC2-9692-A83A4E8ECB26}"/>
+                <a16:creationId xmlns:a16="http://schemas.microsoft.com/office/drawing/2014/main" xmlns="" id="{5CE85C29-C9E0-4DC2-9692-A83A4E8ECB26}"/>
               </a:ext>
             </a:extLst>
           </p:cNvPr>
@@ -9202,7 +11020,7 @@
           <p:cNvPr id="3" name="Block Arc 2">
             <a:extLst>
               <a:ext uri="{FF2B5EF4-FFF2-40B4-BE49-F238E27FC236}">
-                <a16:creationId xmlns="" xmlns:a16="http://schemas.microsoft.com/office/drawing/2014/main" id="{55727453-48C0-4248-AC8F-2458A300A257}"/>
+                <a16:creationId xmlns:a16="http://schemas.microsoft.com/office/drawing/2014/main" xmlns="" id="{55727453-48C0-4248-AC8F-2458A300A257}"/>
               </a:ext>
             </a:extLst>
           </p:cNvPr>
@@ -9269,7 +11087,7 @@
           <p:cNvPr id="10" name="Block Arc 9">
             <a:extLst>
               <a:ext uri="{FF2B5EF4-FFF2-40B4-BE49-F238E27FC236}">
-                <a16:creationId xmlns="" xmlns:a16="http://schemas.microsoft.com/office/drawing/2014/main" id="{22EF910F-387C-4573-AA1C-23739886E288}"/>
+                <a16:creationId xmlns:a16="http://schemas.microsoft.com/office/drawing/2014/main" xmlns="" id="{22EF910F-387C-4573-AA1C-23739886E288}"/>
               </a:ext>
             </a:extLst>
           </p:cNvPr>
@@ -9336,7 +11154,7 @@
           <p:cNvPr id="11" name="Block Arc 10">
             <a:extLst>
               <a:ext uri="{FF2B5EF4-FFF2-40B4-BE49-F238E27FC236}">
-                <a16:creationId xmlns="" xmlns:a16="http://schemas.microsoft.com/office/drawing/2014/main" id="{FCECEC34-98B0-40FE-913A-5B8191258157}"/>
+                <a16:creationId xmlns:a16="http://schemas.microsoft.com/office/drawing/2014/main" xmlns="" id="{FCECEC34-98B0-40FE-913A-5B8191258157}"/>
               </a:ext>
             </a:extLst>
           </p:cNvPr>
@@ -9411,7 +11229,7 @@
 </p:sld>
 </file>
 
-<file path=ppt/slides/slide31.xml><?xml version="1.0" encoding="utf-8"?>
+<file path=ppt/slides/slide32.xml><?xml version="1.0" encoding="utf-8"?>
 <p:sld xmlns:a="http://schemas.openxmlformats.org/drawingml/2006/main" xmlns:r="http://schemas.openxmlformats.org/officeDocument/2006/relationships" xmlns:p="http://schemas.openxmlformats.org/presentationml/2006/main">
   <p:cSld>
     <p:spTree>
@@ -9433,7 +11251,7 @@
           <p:cNvPr id="7" name="Freeform: Shape 6">
             <a:extLst>
               <a:ext uri="{FF2B5EF4-FFF2-40B4-BE49-F238E27FC236}">
-                <a16:creationId xmlns="" xmlns:a16="http://schemas.microsoft.com/office/drawing/2014/main" id="{F165FF3A-79F0-4681-9C5F-D7BF753A653E}"/>
+                <a16:creationId xmlns:a16="http://schemas.microsoft.com/office/drawing/2014/main" xmlns="" id="{F165FF3A-79F0-4681-9C5F-D7BF753A653E}"/>
               </a:ext>
             </a:extLst>
           </p:cNvPr>
@@ -9726,7 +11544,7 @@
 </p:sld>
 </file>
 
-<file path=ppt/slides/slide32.xml><?xml version="1.0" encoding="utf-8"?>
+<file path=ppt/slides/slide33.xml><?xml version="1.0" encoding="utf-8"?>
 <p:sld xmlns:a="http://schemas.openxmlformats.org/drawingml/2006/main" xmlns:r="http://schemas.openxmlformats.org/officeDocument/2006/relationships" xmlns:p="http://schemas.openxmlformats.org/presentationml/2006/main">
   <p:cSld>
     <p:spTree>
@@ -9848,7 +11666,7 @@
           <p:cNvPr id="6" name="Rounded Rectangle 4">
             <a:extLst>
               <a:ext uri="{FF2B5EF4-FFF2-40B4-BE49-F238E27FC236}">
-                <a16:creationId xmlns="" xmlns:a16="http://schemas.microsoft.com/office/drawing/2014/main" id="{3485F0AD-70A9-404F-AE9D-6C3E9DA3D32F}"/>
+                <a16:creationId xmlns:a16="http://schemas.microsoft.com/office/drawing/2014/main" xmlns="" id="{3485F0AD-70A9-404F-AE9D-6C3E9DA3D32F}"/>
               </a:ext>
             </a:extLst>
           </p:cNvPr>
@@ -9902,7 +11720,7 @@
           <p:cNvPr id="7" name="Rounded Rectangle 3">
             <a:extLst>
               <a:ext uri="{FF2B5EF4-FFF2-40B4-BE49-F238E27FC236}">
-                <a16:creationId xmlns="" xmlns:a16="http://schemas.microsoft.com/office/drawing/2014/main" id="{BDDDC232-1895-4BA3-83DE-722E22507136}"/>
+                <a16:creationId xmlns:a16="http://schemas.microsoft.com/office/drawing/2014/main" xmlns="" id="{BDDDC232-1895-4BA3-83DE-722E22507136}"/>
               </a:ext>
             </a:extLst>
           </p:cNvPr>
@@ -9958,7 +11776,7 @@
           <p:cNvPr id="21" name="Group 20">
             <a:extLst>
               <a:ext uri="{FF2B5EF4-FFF2-40B4-BE49-F238E27FC236}">
-                <a16:creationId xmlns="" xmlns:a16="http://schemas.microsoft.com/office/drawing/2014/main" id="{43F10BE4-CCDE-4CAE-9B8E-7DEDF81FFAF2}"/>
+                <a16:creationId xmlns:a16="http://schemas.microsoft.com/office/drawing/2014/main" xmlns="" id="{43F10BE4-CCDE-4CAE-9B8E-7DEDF81FFAF2}"/>
               </a:ext>
             </a:extLst>
           </p:cNvPr>
@@ -9978,7 +11796,7 @@
             <p:cNvPr id="8" name="Rounded Rectangle 4">
               <a:extLst>
                 <a:ext uri="{FF2B5EF4-FFF2-40B4-BE49-F238E27FC236}">
-                  <a16:creationId xmlns="" xmlns:a16="http://schemas.microsoft.com/office/drawing/2014/main" id="{8209D2B2-9E54-41E4-BD79-1C8E09E5C52B}"/>
+                  <a16:creationId xmlns:a16="http://schemas.microsoft.com/office/drawing/2014/main" xmlns="" id="{8209D2B2-9E54-41E4-BD79-1C8E09E5C52B}"/>
                 </a:ext>
               </a:extLst>
             </p:cNvPr>
@@ -10032,7 +11850,7 @@
             <p:cNvPr id="18" name="Straight Connector 17">
               <a:extLst>
                 <a:ext uri="{FF2B5EF4-FFF2-40B4-BE49-F238E27FC236}">
-                  <a16:creationId xmlns="" xmlns:a16="http://schemas.microsoft.com/office/drawing/2014/main" id="{C17E63B2-3BC5-4E63-9740-4B53F50FA06D}"/>
+                  <a16:creationId xmlns:a16="http://schemas.microsoft.com/office/drawing/2014/main" xmlns="" id="{C17E63B2-3BC5-4E63-9740-4B53F50FA06D}"/>
                 </a:ext>
               </a:extLst>
             </p:cNvPr>
@@ -10087,7 +11905,7 @@
 </p:sld>
 </file>
 
-<file path=ppt/slides/slide33.xml><?xml version="1.0" encoding="utf-8"?>
+<file path=ppt/slides/slide34.xml><?xml version="1.0" encoding="utf-8"?>
 <p:sld xmlns:a="http://schemas.openxmlformats.org/drawingml/2006/main" xmlns:r="http://schemas.openxmlformats.org/officeDocument/2006/relationships" xmlns:p="http://schemas.openxmlformats.org/presentationml/2006/main">
   <p:cSld>
     <p:spTree>
@@ -10109,7 +11927,7 @@
           <p:cNvPr id="10" name="Group 9">
             <a:extLst>
               <a:ext uri="{FF2B5EF4-FFF2-40B4-BE49-F238E27FC236}">
-                <a16:creationId xmlns="" xmlns:a16="http://schemas.microsoft.com/office/drawing/2014/main" id="{A6205789-EF0B-4BA0-889A-5DD5304B2384}"/>
+                <a16:creationId xmlns:a16="http://schemas.microsoft.com/office/drawing/2014/main" xmlns="" id="{A6205789-EF0B-4BA0-889A-5DD5304B2384}"/>
               </a:ext>
             </a:extLst>
           </p:cNvPr>
@@ -10129,7 +11947,7 @@
             <p:cNvPr id="11" name="Rounded Rectangle 4">
               <a:extLst>
                 <a:ext uri="{FF2B5EF4-FFF2-40B4-BE49-F238E27FC236}">
-                  <a16:creationId xmlns="" xmlns:a16="http://schemas.microsoft.com/office/drawing/2014/main" id="{A1F57A30-623F-47FF-A411-608120B64C66}"/>
+                  <a16:creationId xmlns:a16="http://schemas.microsoft.com/office/drawing/2014/main" xmlns="" id="{A1F57A30-623F-47FF-A411-608120B64C66}"/>
                 </a:ext>
               </a:extLst>
             </p:cNvPr>
@@ -10183,7 +12001,7 @@
             <p:cNvPr id="12" name="Rounded Rectangle 4">
               <a:extLst>
                 <a:ext uri="{FF2B5EF4-FFF2-40B4-BE49-F238E27FC236}">
-                  <a16:creationId xmlns="" xmlns:a16="http://schemas.microsoft.com/office/drawing/2014/main" id="{5BCCC17E-7791-4171-BBBA-BBA6021C4B61}"/>
+                  <a16:creationId xmlns:a16="http://schemas.microsoft.com/office/drawing/2014/main" xmlns="" id="{5BCCC17E-7791-4171-BBBA-BBA6021C4B61}"/>
                 </a:ext>
               </a:extLst>
             </p:cNvPr>
@@ -10237,7 +12055,7 @@
             <p:cNvPr id="13" name="Rounded Rectangle 4">
               <a:extLst>
                 <a:ext uri="{FF2B5EF4-FFF2-40B4-BE49-F238E27FC236}">
-                  <a16:creationId xmlns="" xmlns:a16="http://schemas.microsoft.com/office/drawing/2014/main" id="{17116BF3-B4E5-4B9D-94C3-E847D7ADFA01}"/>
+                  <a16:creationId xmlns:a16="http://schemas.microsoft.com/office/drawing/2014/main" xmlns="" id="{17116BF3-B4E5-4B9D-94C3-E847D7ADFA01}"/>
                 </a:ext>
               </a:extLst>
             </p:cNvPr>
@@ -10291,7 +12109,7 @@
             <p:cNvPr id="14" name="Rounded Rectangle 4">
               <a:extLst>
                 <a:ext uri="{FF2B5EF4-FFF2-40B4-BE49-F238E27FC236}">
-                  <a16:creationId xmlns="" xmlns:a16="http://schemas.microsoft.com/office/drawing/2014/main" id="{9895E51C-C8F7-4BC3-B592-ACFA71345B40}"/>
+                  <a16:creationId xmlns:a16="http://schemas.microsoft.com/office/drawing/2014/main" xmlns="" id="{9895E51C-C8F7-4BC3-B592-ACFA71345B40}"/>
                 </a:ext>
               </a:extLst>
             </p:cNvPr>
@@ -10346,7 +12164,7 @@
           <p:cNvPr id="3" name="Group 2">
             <a:extLst>
               <a:ext uri="{FF2B5EF4-FFF2-40B4-BE49-F238E27FC236}">
-                <a16:creationId xmlns="" xmlns:a16="http://schemas.microsoft.com/office/drawing/2014/main" id="{E9FD4DCC-E1DF-48D8-A766-EBEB4BB31844}"/>
+                <a16:creationId xmlns:a16="http://schemas.microsoft.com/office/drawing/2014/main" xmlns="" id="{E9FD4DCC-E1DF-48D8-A766-EBEB4BB31844}"/>
               </a:ext>
             </a:extLst>
           </p:cNvPr>
@@ -10366,7 +12184,7 @@
             <p:cNvPr id="6" name="Rounded Rectangle 4">
               <a:extLst>
                 <a:ext uri="{FF2B5EF4-FFF2-40B4-BE49-F238E27FC236}">
-                  <a16:creationId xmlns="" xmlns:a16="http://schemas.microsoft.com/office/drawing/2014/main" id="{3485F0AD-70A9-404F-AE9D-6C3E9DA3D32F}"/>
+                  <a16:creationId xmlns:a16="http://schemas.microsoft.com/office/drawing/2014/main" xmlns="" id="{3485F0AD-70A9-404F-AE9D-6C3E9DA3D32F}"/>
                 </a:ext>
               </a:extLst>
             </p:cNvPr>
@@ -10420,7 +12238,7 @@
             <p:cNvPr id="7" name="Rounded Rectangle 4">
               <a:extLst>
                 <a:ext uri="{FF2B5EF4-FFF2-40B4-BE49-F238E27FC236}">
-                  <a16:creationId xmlns="" xmlns:a16="http://schemas.microsoft.com/office/drawing/2014/main" id="{C69A883F-4E84-4667-9CC2-CA7D225BB107}"/>
+                  <a16:creationId xmlns:a16="http://schemas.microsoft.com/office/drawing/2014/main" xmlns="" id="{C69A883F-4E84-4667-9CC2-CA7D225BB107}"/>
                 </a:ext>
               </a:extLst>
             </p:cNvPr>
@@ -10474,7 +12292,7 @@
             <p:cNvPr id="8" name="Rounded Rectangle 4">
               <a:extLst>
                 <a:ext uri="{FF2B5EF4-FFF2-40B4-BE49-F238E27FC236}">
-                  <a16:creationId xmlns="" xmlns:a16="http://schemas.microsoft.com/office/drawing/2014/main" id="{E2D36C2A-DFFD-4786-AD4B-60FC9FA14482}"/>
+                  <a16:creationId xmlns:a16="http://schemas.microsoft.com/office/drawing/2014/main" xmlns="" id="{E2D36C2A-DFFD-4786-AD4B-60FC9FA14482}"/>
                 </a:ext>
               </a:extLst>
             </p:cNvPr>
@@ -10528,7 +12346,7 @@
             <p:cNvPr id="9" name="Rounded Rectangle 4">
               <a:extLst>
                 <a:ext uri="{FF2B5EF4-FFF2-40B4-BE49-F238E27FC236}">
-                  <a16:creationId xmlns="" xmlns:a16="http://schemas.microsoft.com/office/drawing/2014/main" id="{126B3AA7-02E3-40F1-8546-7B3D97D2302D}"/>
+                  <a16:creationId xmlns:a16="http://schemas.microsoft.com/office/drawing/2014/main" xmlns="" id="{126B3AA7-02E3-40F1-8546-7B3D97D2302D}"/>
                 </a:ext>
               </a:extLst>
             </p:cNvPr>
@@ -10582,7 +12400,7 @@
             <p:cNvPr id="15" name="Rounded Rectangle 4">
               <a:extLst>
                 <a:ext uri="{FF2B5EF4-FFF2-40B4-BE49-F238E27FC236}">
-                  <a16:creationId xmlns="" xmlns:a16="http://schemas.microsoft.com/office/drawing/2014/main" id="{0CE60671-8D6D-4730-88BD-8B0FBE849613}"/>
+                  <a16:creationId xmlns:a16="http://schemas.microsoft.com/office/drawing/2014/main" xmlns="" id="{0CE60671-8D6D-4730-88BD-8B0FBE849613}"/>
                 </a:ext>
               </a:extLst>
             </p:cNvPr>
@@ -10636,7 +12454,7 @@
             <p:cNvPr id="16" name="Rounded Rectangle 4">
               <a:extLst>
                 <a:ext uri="{FF2B5EF4-FFF2-40B4-BE49-F238E27FC236}">
-                  <a16:creationId xmlns="" xmlns:a16="http://schemas.microsoft.com/office/drawing/2014/main" id="{8ABCDF2C-78C8-4B1B-A079-5C7CC0EDB793}"/>
+                  <a16:creationId xmlns:a16="http://schemas.microsoft.com/office/drawing/2014/main" xmlns="" id="{8ABCDF2C-78C8-4B1B-A079-5C7CC0EDB793}"/>
                 </a:ext>
               </a:extLst>
             </p:cNvPr>
@@ -10690,7 +12508,7 @@
             <p:cNvPr id="17" name="Rounded Rectangle 4">
               <a:extLst>
                 <a:ext uri="{FF2B5EF4-FFF2-40B4-BE49-F238E27FC236}">
-                  <a16:creationId xmlns="" xmlns:a16="http://schemas.microsoft.com/office/drawing/2014/main" id="{472041CA-791D-459C-A8CE-BCA958F85B3E}"/>
+                  <a16:creationId xmlns:a16="http://schemas.microsoft.com/office/drawing/2014/main" xmlns="" id="{472041CA-791D-459C-A8CE-BCA958F85B3E}"/>
                 </a:ext>
               </a:extLst>
             </p:cNvPr>
@@ -10744,7 +12562,7 @@
             <p:cNvPr id="18" name="Rounded Rectangle 4">
               <a:extLst>
                 <a:ext uri="{FF2B5EF4-FFF2-40B4-BE49-F238E27FC236}">
-                  <a16:creationId xmlns="" xmlns:a16="http://schemas.microsoft.com/office/drawing/2014/main" id="{EBC185CD-743E-4274-AFD6-440CF0AF24CD}"/>
+                  <a16:creationId xmlns:a16="http://schemas.microsoft.com/office/drawing/2014/main" xmlns="" id="{EBC185CD-743E-4274-AFD6-440CF0AF24CD}"/>
                 </a:ext>
               </a:extLst>
             </p:cNvPr>
@@ -10798,7 +12616,7 @@
             <p:cNvPr id="19" name="Rounded Rectangle 4">
               <a:extLst>
                 <a:ext uri="{FF2B5EF4-FFF2-40B4-BE49-F238E27FC236}">
-                  <a16:creationId xmlns="" xmlns:a16="http://schemas.microsoft.com/office/drawing/2014/main" id="{7C4773C1-5291-40ED-9E24-F9439EE920AC}"/>
+                  <a16:creationId xmlns:a16="http://schemas.microsoft.com/office/drawing/2014/main" xmlns="" id="{7C4773C1-5291-40ED-9E24-F9439EE920AC}"/>
                 </a:ext>
               </a:extLst>
             </p:cNvPr>
@@ -10853,7 +12671,7 @@
           <p:cNvPr id="20" name="Rectangle 19">
             <a:extLst>
               <a:ext uri="{FF2B5EF4-FFF2-40B4-BE49-F238E27FC236}">
-                <a16:creationId xmlns="" xmlns:a16="http://schemas.microsoft.com/office/drawing/2014/main" id="{9C90FE5E-16CA-40BA-A45A-7E5C4821922C}"/>
+                <a16:creationId xmlns:a16="http://schemas.microsoft.com/office/drawing/2014/main" xmlns="" id="{9C90FE5E-16CA-40BA-A45A-7E5C4821922C}"/>
               </a:ext>
             </a:extLst>
           </p:cNvPr>
@@ -10905,7 +12723,7 @@
           <p:cNvPr id="29" name="Group 28">
             <a:extLst>
               <a:ext uri="{FF2B5EF4-FFF2-40B4-BE49-F238E27FC236}">
-                <a16:creationId xmlns="" xmlns:a16="http://schemas.microsoft.com/office/drawing/2014/main" id="{494DB6CB-F438-4692-9109-14408BA9056B}"/>
+                <a16:creationId xmlns:a16="http://schemas.microsoft.com/office/drawing/2014/main" xmlns="" id="{494DB6CB-F438-4692-9109-14408BA9056B}"/>
               </a:ext>
             </a:extLst>
           </p:cNvPr>
@@ -10925,7 +12743,7 @@
             <p:cNvPr id="21" name="Rectangle 20">
               <a:extLst>
                 <a:ext uri="{FF2B5EF4-FFF2-40B4-BE49-F238E27FC236}">
-                  <a16:creationId xmlns="" xmlns:a16="http://schemas.microsoft.com/office/drawing/2014/main" id="{E4886657-7DE2-45D3-B9EE-F0CED45D1134}"/>
+                  <a16:creationId xmlns:a16="http://schemas.microsoft.com/office/drawing/2014/main" xmlns="" id="{E4886657-7DE2-45D3-B9EE-F0CED45D1134}"/>
                 </a:ext>
               </a:extLst>
             </p:cNvPr>
@@ -10977,7 +12795,7 @@
             <p:cNvPr id="24" name="Rectangle 23">
               <a:extLst>
                 <a:ext uri="{FF2B5EF4-FFF2-40B4-BE49-F238E27FC236}">
-                  <a16:creationId xmlns="" xmlns:a16="http://schemas.microsoft.com/office/drawing/2014/main" id="{BB0BA0DE-CFE9-49EA-A200-BDB2DA019A6C}"/>
+                  <a16:creationId xmlns:a16="http://schemas.microsoft.com/office/drawing/2014/main" xmlns="" id="{BB0BA0DE-CFE9-49EA-A200-BDB2DA019A6C}"/>
                 </a:ext>
               </a:extLst>
             </p:cNvPr>
@@ -11029,7 +12847,7 @@
             <p:cNvPr id="26" name="Rectangle 25">
               <a:extLst>
                 <a:ext uri="{FF2B5EF4-FFF2-40B4-BE49-F238E27FC236}">
-                  <a16:creationId xmlns="" xmlns:a16="http://schemas.microsoft.com/office/drawing/2014/main" id="{8B0CF26A-6751-40B7-AA2C-E5C19E5AFA6F}"/>
+                  <a16:creationId xmlns:a16="http://schemas.microsoft.com/office/drawing/2014/main" xmlns="" id="{8B0CF26A-6751-40B7-AA2C-E5C19E5AFA6F}"/>
                 </a:ext>
               </a:extLst>
             </p:cNvPr>
@@ -11081,7 +12899,7 @@
             <p:cNvPr id="28" name="Rectangle 27">
               <a:extLst>
                 <a:ext uri="{FF2B5EF4-FFF2-40B4-BE49-F238E27FC236}">
-                  <a16:creationId xmlns="" xmlns:a16="http://schemas.microsoft.com/office/drawing/2014/main" id="{45E130DE-DB96-4CBE-8A53-C12B423CDE0A}"/>
+                  <a16:creationId xmlns:a16="http://schemas.microsoft.com/office/drawing/2014/main" xmlns="" id="{45E130DE-DB96-4CBE-8A53-C12B423CDE0A}"/>
                 </a:ext>
               </a:extLst>
             </p:cNvPr>
@@ -11134,7 +12952,7 @@
           <p:cNvPr id="45" name="Group 44">
             <a:extLst>
               <a:ext uri="{FF2B5EF4-FFF2-40B4-BE49-F238E27FC236}">
-                <a16:creationId xmlns="" xmlns:a16="http://schemas.microsoft.com/office/drawing/2014/main" id="{ED89DBB8-00E6-4567-978D-A5C062E551E1}"/>
+                <a16:creationId xmlns:a16="http://schemas.microsoft.com/office/drawing/2014/main" xmlns="" id="{ED89DBB8-00E6-4567-978D-A5C062E551E1}"/>
               </a:ext>
             </a:extLst>
           </p:cNvPr>
@@ -11154,7 +12972,7 @@
             <p:cNvPr id="31" name="Rectangle 30">
               <a:extLst>
                 <a:ext uri="{FF2B5EF4-FFF2-40B4-BE49-F238E27FC236}">
-                  <a16:creationId xmlns="" xmlns:a16="http://schemas.microsoft.com/office/drawing/2014/main" id="{B95E63B7-D48A-4E03-A98A-01FFB0C48EFC}"/>
+                  <a16:creationId xmlns:a16="http://schemas.microsoft.com/office/drawing/2014/main" xmlns="" id="{B95E63B7-D48A-4E03-A98A-01FFB0C48EFC}"/>
                 </a:ext>
               </a:extLst>
             </p:cNvPr>
@@ -11206,7 +13024,7 @@
             <p:cNvPr id="32" name="Rectangle 31">
               <a:extLst>
                 <a:ext uri="{FF2B5EF4-FFF2-40B4-BE49-F238E27FC236}">
-                  <a16:creationId xmlns="" xmlns:a16="http://schemas.microsoft.com/office/drawing/2014/main" id="{D809C39E-05E3-4BC3-B534-A304E14181E5}"/>
+                  <a16:creationId xmlns:a16="http://schemas.microsoft.com/office/drawing/2014/main" xmlns="" id="{D809C39E-05E3-4BC3-B534-A304E14181E5}"/>
                 </a:ext>
               </a:extLst>
             </p:cNvPr>
@@ -11258,7 +13076,7 @@
             <p:cNvPr id="33" name="Rectangle 32">
               <a:extLst>
                 <a:ext uri="{FF2B5EF4-FFF2-40B4-BE49-F238E27FC236}">
-                  <a16:creationId xmlns="" xmlns:a16="http://schemas.microsoft.com/office/drawing/2014/main" id="{57513C37-D87F-4867-BB1C-AB0265DE8504}"/>
+                  <a16:creationId xmlns:a16="http://schemas.microsoft.com/office/drawing/2014/main" xmlns="" id="{57513C37-D87F-4867-BB1C-AB0265DE8504}"/>
                 </a:ext>
               </a:extLst>
             </p:cNvPr>
@@ -11310,7 +13128,7 @@
             <p:cNvPr id="34" name="Rectangle 33">
               <a:extLst>
                 <a:ext uri="{FF2B5EF4-FFF2-40B4-BE49-F238E27FC236}">
-                  <a16:creationId xmlns="" xmlns:a16="http://schemas.microsoft.com/office/drawing/2014/main" id="{7F88305E-9A19-4CD1-AFE9-AD5A63AE6250}"/>
+                  <a16:creationId xmlns:a16="http://schemas.microsoft.com/office/drawing/2014/main" xmlns="" id="{7F88305E-9A19-4CD1-AFE9-AD5A63AE6250}"/>
                 </a:ext>
               </a:extLst>
             </p:cNvPr>
@@ -11362,7 +13180,7 @@
             <p:cNvPr id="36" name="Rectangle 35">
               <a:extLst>
                 <a:ext uri="{FF2B5EF4-FFF2-40B4-BE49-F238E27FC236}">
-                  <a16:creationId xmlns="" xmlns:a16="http://schemas.microsoft.com/office/drawing/2014/main" id="{27AB44A4-567E-4F77-A380-FBB1E27BB3CC}"/>
+                  <a16:creationId xmlns:a16="http://schemas.microsoft.com/office/drawing/2014/main" xmlns="" id="{27AB44A4-567E-4F77-A380-FBB1E27BB3CC}"/>
                 </a:ext>
               </a:extLst>
             </p:cNvPr>
@@ -11414,7 +13232,7 @@
             <p:cNvPr id="38" name="Rectangle 37">
               <a:extLst>
                 <a:ext uri="{FF2B5EF4-FFF2-40B4-BE49-F238E27FC236}">
-                  <a16:creationId xmlns="" xmlns:a16="http://schemas.microsoft.com/office/drawing/2014/main" id="{2794DD45-3E32-4A33-BF6C-A5F3F0519A3F}"/>
+                  <a16:creationId xmlns:a16="http://schemas.microsoft.com/office/drawing/2014/main" xmlns="" id="{2794DD45-3E32-4A33-BF6C-A5F3F0519A3F}"/>
                 </a:ext>
               </a:extLst>
             </p:cNvPr>
@@ -11466,7 +13284,7 @@
             <p:cNvPr id="40" name="Rectangle 39">
               <a:extLst>
                 <a:ext uri="{FF2B5EF4-FFF2-40B4-BE49-F238E27FC236}">
-                  <a16:creationId xmlns="" xmlns:a16="http://schemas.microsoft.com/office/drawing/2014/main" id="{041B4176-C024-4F3A-AABA-B63D7C0C66CE}"/>
+                  <a16:creationId xmlns:a16="http://schemas.microsoft.com/office/drawing/2014/main" xmlns="" id="{041B4176-C024-4F3A-AABA-B63D7C0C66CE}"/>
                 </a:ext>
               </a:extLst>
             </p:cNvPr>
@@ -11518,7 +13336,7 @@
             <p:cNvPr id="42" name="Rectangle 41">
               <a:extLst>
                 <a:ext uri="{FF2B5EF4-FFF2-40B4-BE49-F238E27FC236}">
-                  <a16:creationId xmlns="" xmlns:a16="http://schemas.microsoft.com/office/drawing/2014/main" id="{7872883E-7751-48EC-A872-1D4934847CD2}"/>
+                  <a16:creationId xmlns:a16="http://schemas.microsoft.com/office/drawing/2014/main" xmlns="" id="{7872883E-7751-48EC-A872-1D4934847CD2}"/>
                 </a:ext>
               </a:extLst>
             </p:cNvPr>
@@ -11570,7 +13388,7 @@
             <p:cNvPr id="44" name="Rectangle 43">
               <a:extLst>
                 <a:ext uri="{FF2B5EF4-FFF2-40B4-BE49-F238E27FC236}">
-                  <a16:creationId xmlns="" xmlns:a16="http://schemas.microsoft.com/office/drawing/2014/main" id="{F8E36C9E-67D9-4E49-B1A5-6E5CEA56A90F}"/>
+                  <a16:creationId xmlns:a16="http://schemas.microsoft.com/office/drawing/2014/main" xmlns="" id="{F8E36C9E-67D9-4E49-B1A5-6E5CEA56A90F}"/>
                 </a:ext>
               </a:extLst>
             </p:cNvPr>
@@ -11623,7 +13441,7 @@
           <p:cNvPr id="2" name="Rectangle 1">
             <a:extLst>
               <a:ext uri="{FF2B5EF4-FFF2-40B4-BE49-F238E27FC236}">
-                <a16:creationId xmlns="" xmlns:a16="http://schemas.microsoft.com/office/drawing/2014/main" id="{FE5D35B2-2233-49B7-899A-3326D707F4CB}"/>
+                <a16:creationId xmlns:a16="http://schemas.microsoft.com/office/drawing/2014/main" xmlns="" id="{FE5D35B2-2233-49B7-899A-3326D707F4CB}"/>
               </a:ext>
             </a:extLst>
           </p:cNvPr>
@@ -11687,7 +13505,7 @@
 </p:sld>
 </file>
 
-<file path=ppt/slides/slide34.xml><?xml version="1.0" encoding="utf-8"?>
+<file path=ppt/slides/slide35.xml><?xml version="1.0" encoding="utf-8"?>
 <p:sld xmlns:a="http://schemas.openxmlformats.org/drawingml/2006/main" xmlns:r="http://schemas.openxmlformats.org/officeDocument/2006/relationships" xmlns:p="http://schemas.openxmlformats.org/presentationml/2006/main">
   <p:cSld>
     <p:spTree>
@@ -11709,7 +13527,7 @@
           <p:cNvPr id="5" name="Oval 4">
             <a:extLst>
               <a:ext uri="{FF2B5EF4-FFF2-40B4-BE49-F238E27FC236}">
-                <a16:creationId xmlns="" xmlns:a16="http://schemas.microsoft.com/office/drawing/2014/main" id="{5CE85C29-C9E0-4DC2-9692-A83A4E8ECB26}"/>
+                <a16:creationId xmlns:a16="http://schemas.microsoft.com/office/drawing/2014/main" xmlns="" id="{5CE85C29-C9E0-4DC2-9692-A83A4E8ECB26}"/>
               </a:ext>
             </a:extLst>
           </p:cNvPr>
@@ -11780,7 +13598,7 @@
           <p:cNvPr id="8" name="Oval 7">
             <a:extLst>
               <a:ext uri="{FF2B5EF4-FFF2-40B4-BE49-F238E27FC236}">
-                <a16:creationId xmlns="" xmlns:a16="http://schemas.microsoft.com/office/drawing/2014/main" id="{5725AE3B-260D-4152-B42C-402374412E31}"/>
+                <a16:creationId xmlns:a16="http://schemas.microsoft.com/office/drawing/2014/main" xmlns="" id="{5725AE3B-260D-4152-B42C-402374412E31}"/>
               </a:ext>
             </a:extLst>
           </p:cNvPr>
@@ -11844,7 +13662,7 @@
 </p:sld>
 </file>
 
-<file path=ppt/slides/slide35.xml><?xml version="1.0" encoding="utf-8"?>
+<file path=ppt/slides/slide36.xml><?xml version="1.0" encoding="utf-8"?>
 <p:sld xmlns:a="http://schemas.openxmlformats.org/drawingml/2006/main" xmlns:r="http://schemas.openxmlformats.org/officeDocument/2006/relationships" xmlns:p="http://schemas.openxmlformats.org/presentationml/2006/main">
   <p:cSld>
     <p:spTree>
@@ -11866,7 +13684,7 @@
           <p:cNvPr id="1026" name="Picture 2" descr="Archero 1.4.3 APK Download">
             <a:extLst>
               <a:ext uri="{FF2B5EF4-FFF2-40B4-BE49-F238E27FC236}">
-                <a16:creationId xmlns="" xmlns:a16="http://schemas.microsoft.com/office/drawing/2014/main" id="{6B6FC3BB-24B5-40E9-8988-16CDA19AEE96}"/>
+                <a16:creationId xmlns:a16="http://schemas.microsoft.com/office/drawing/2014/main" xmlns="" id="{6B6FC3BB-24B5-40E9-8988-16CDA19AEE96}"/>
               </a:ext>
             </a:extLst>
           </p:cNvPr>
@@ -11911,7 +13729,7 @@
           <p:cNvPr id="2" name="Circle: Hollow 1">
             <a:extLst>
               <a:ext uri="{FF2B5EF4-FFF2-40B4-BE49-F238E27FC236}">
-                <a16:creationId xmlns="" xmlns:a16="http://schemas.microsoft.com/office/drawing/2014/main" id="{62C64EB0-7A2B-4828-BDBB-E82B485700F5}"/>
+                <a16:creationId xmlns:a16="http://schemas.microsoft.com/office/drawing/2014/main" xmlns="" id="{62C64EB0-7A2B-4828-BDBB-E82B485700F5}"/>
               </a:ext>
             </a:extLst>
           </p:cNvPr>
@@ -11971,7 +13789,7 @@
           <p:cNvPr id="17" name="Freeform: Shape 16">
             <a:extLst>
               <a:ext uri="{FF2B5EF4-FFF2-40B4-BE49-F238E27FC236}">
-                <a16:creationId xmlns="" xmlns:a16="http://schemas.microsoft.com/office/drawing/2014/main" id="{013B213B-B3A8-46BD-8505-858079DC669A}"/>
+                <a16:creationId xmlns:a16="http://schemas.microsoft.com/office/drawing/2014/main" xmlns="" id="{013B213B-B3A8-46BD-8505-858079DC669A}"/>
               </a:ext>
             </a:extLst>
           </p:cNvPr>
@@ -12300,7 +14118,7 @@
           <p:cNvPr id="8" name="Oval 7">
             <a:extLst>
               <a:ext uri="{FF2B5EF4-FFF2-40B4-BE49-F238E27FC236}">
-                <a16:creationId xmlns="" xmlns:a16="http://schemas.microsoft.com/office/drawing/2014/main" id="{B448E0E3-14DE-4BDF-8127-E194DBC3C114}"/>
+                <a16:creationId xmlns:a16="http://schemas.microsoft.com/office/drawing/2014/main" xmlns="" id="{B448E0E3-14DE-4BDF-8127-E194DBC3C114}"/>
               </a:ext>
             </a:extLst>
           </p:cNvPr>
@@ -12356,7 +14174,7 @@
           <p:cNvPr id="15" name="Group 14">
             <a:extLst>
               <a:ext uri="{FF2B5EF4-FFF2-40B4-BE49-F238E27FC236}">
-                <a16:creationId xmlns="" xmlns:a16="http://schemas.microsoft.com/office/drawing/2014/main" id="{F309C236-CAAB-4873-A3E4-4857862B0035}"/>
+                <a16:creationId xmlns:a16="http://schemas.microsoft.com/office/drawing/2014/main" xmlns="" id="{F309C236-CAAB-4873-A3E4-4857862B0035}"/>
               </a:ext>
             </a:extLst>
           </p:cNvPr>
@@ -12376,7 +14194,7 @@
             <p:cNvPr id="18" name="Circle: Hollow 17">
               <a:extLst>
                 <a:ext uri="{FF2B5EF4-FFF2-40B4-BE49-F238E27FC236}">
-                  <a16:creationId xmlns="" xmlns:a16="http://schemas.microsoft.com/office/drawing/2014/main" id="{905502AC-2C95-493E-ABD8-7A5C23B0AB55}"/>
+                  <a16:creationId xmlns:a16="http://schemas.microsoft.com/office/drawing/2014/main" xmlns="" id="{905502AC-2C95-493E-ABD8-7A5C23B0AB55}"/>
                 </a:ext>
               </a:extLst>
             </p:cNvPr>
@@ -12434,7 +14252,7 @@
             <p:cNvPr id="19" name="Freeform: Shape 18">
               <a:extLst>
                 <a:ext uri="{FF2B5EF4-FFF2-40B4-BE49-F238E27FC236}">
-                  <a16:creationId xmlns="" xmlns:a16="http://schemas.microsoft.com/office/drawing/2014/main" id="{EC397DD4-E1BB-4644-B9D4-DE223BCA64E3}"/>
+                  <a16:creationId xmlns:a16="http://schemas.microsoft.com/office/drawing/2014/main" xmlns="" id="{EC397DD4-E1BB-4644-B9D4-DE223BCA64E3}"/>
                 </a:ext>
               </a:extLst>
             </p:cNvPr>
@@ -12748,7 +14566,7 @@
           <p:cNvPr id="28" name="Straight Connector 27">
             <a:extLst>
               <a:ext uri="{FF2B5EF4-FFF2-40B4-BE49-F238E27FC236}">
-                <a16:creationId xmlns="" xmlns:a16="http://schemas.microsoft.com/office/drawing/2014/main" id="{A8CDF03B-7684-4F8C-B314-5B341086EF9E}"/>
+                <a16:creationId xmlns:a16="http://schemas.microsoft.com/office/drawing/2014/main" xmlns="" id="{A8CDF03B-7684-4F8C-B314-5B341086EF9E}"/>
               </a:ext>
             </a:extLst>
           </p:cNvPr>
@@ -12784,7 +14602,7 @@
           <p:cNvPr id="3" name="Arc 2">
             <a:extLst>
               <a:ext uri="{FF2B5EF4-FFF2-40B4-BE49-F238E27FC236}">
-                <a16:creationId xmlns="" xmlns:a16="http://schemas.microsoft.com/office/drawing/2014/main" id="{F1DE6C16-66BA-4944-BAFA-DE19BAB319DB}"/>
+                <a16:creationId xmlns:a16="http://schemas.microsoft.com/office/drawing/2014/main" xmlns="" id="{F1DE6C16-66BA-4944-BAFA-DE19BAB319DB}"/>
               </a:ext>
             </a:extLst>
           </p:cNvPr>
@@ -12843,7 +14661,7 @@
           <p:cNvPr id="16" name="Arc 15">
             <a:extLst>
               <a:ext uri="{FF2B5EF4-FFF2-40B4-BE49-F238E27FC236}">
-                <a16:creationId xmlns="" xmlns:a16="http://schemas.microsoft.com/office/drawing/2014/main" id="{5C7BA855-062D-41FB-B829-A92492BC8D43}"/>
+                <a16:creationId xmlns:a16="http://schemas.microsoft.com/office/drawing/2014/main" xmlns="" id="{5C7BA855-062D-41FB-B829-A92492BC8D43}"/>
               </a:ext>
             </a:extLst>
           </p:cNvPr>
@@ -12902,7 +14720,7 @@
           <p:cNvPr id="12" name="Oval 11">
             <a:extLst>
               <a:ext uri="{FF2B5EF4-FFF2-40B4-BE49-F238E27FC236}">
-                <a16:creationId xmlns="" xmlns:a16="http://schemas.microsoft.com/office/drawing/2014/main" id="{FB0565F6-8DBF-4B85-88AD-5148B2CA8C2F}"/>
+                <a16:creationId xmlns:a16="http://schemas.microsoft.com/office/drawing/2014/main" xmlns="" id="{FB0565F6-8DBF-4B85-88AD-5148B2CA8C2F}"/>
               </a:ext>
             </a:extLst>
           </p:cNvPr>
@@ -12986,7 +14804,7 @@
 </p:sld>
 </file>
 
-<file path=ppt/slides/slide36.xml><?xml version="1.0" encoding="utf-8"?>
+<file path=ppt/slides/slide37.xml><?xml version="1.0" encoding="utf-8"?>
 <p:sld xmlns:a="http://schemas.openxmlformats.org/drawingml/2006/main" xmlns:r="http://schemas.openxmlformats.org/officeDocument/2006/relationships" xmlns:p="http://schemas.openxmlformats.org/presentationml/2006/main">
   <p:cSld>
     <p:spTree>
@@ -13072,7 +14890,7 @@
 </p:sld>
 </file>
 
-<file path=ppt/slides/slide37.xml><?xml version="1.0" encoding="utf-8"?>
+<file path=ppt/slides/slide38.xml><?xml version="1.0" encoding="utf-8"?>
 <p:sld xmlns:a="http://schemas.openxmlformats.org/drawingml/2006/main" xmlns:r="http://schemas.openxmlformats.org/officeDocument/2006/relationships" xmlns:p="http://schemas.openxmlformats.org/presentationml/2006/main">
   <p:cSld>
     <p:spTree>
@@ -13094,7 +14912,7 @@
           <p:cNvPr id="2" name="Oval 1">
             <a:extLst>
               <a:ext uri="{FF2B5EF4-FFF2-40B4-BE49-F238E27FC236}">
-                <a16:creationId xmlns="" xmlns:a16="http://schemas.microsoft.com/office/drawing/2014/main" id="{BB9FA810-2B32-4230-AFB2-CDCBF6192A9E}"/>
+                <a16:creationId xmlns:a16="http://schemas.microsoft.com/office/drawing/2014/main" xmlns="" id="{BB9FA810-2B32-4230-AFB2-CDCBF6192A9E}"/>
               </a:ext>
             </a:extLst>
           </p:cNvPr>
@@ -13165,7 +14983,7 @@
           <p:cNvPr id="3" name="Oval 2">
             <a:extLst>
               <a:ext uri="{FF2B5EF4-FFF2-40B4-BE49-F238E27FC236}">
-                <a16:creationId xmlns="" xmlns:a16="http://schemas.microsoft.com/office/drawing/2014/main" id="{1FAA4FC1-4D62-4338-8A62-D903A26423EE}"/>
+                <a16:creationId xmlns:a16="http://schemas.microsoft.com/office/drawing/2014/main" xmlns="" id="{1FAA4FC1-4D62-4338-8A62-D903A26423EE}"/>
               </a:ext>
             </a:extLst>
           </p:cNvPr>
@@ -13249,7 +15067,7 @@
 </p:sld>
 </file>
 
-<file path=ppt/slides/slide38.xml><?xml version="1.0" encoding="utf-8"?>
+<file path=ppt/slides/slide39.xml><?xml version="1.0" encoding="utf-8"?>
 <p:sld xmlns:a="http://schemas.openxmlformats.org/drawingml/2006/main" xmlns:r="http://schemas.openxmlformats.org/officeDocument/2006/relationships" xmlns:p="http://schemas.openxmlformats.org/presentationml/2006/main">
   <p:cSld>
     <p:spTree>
@@ -13271,7 +15089,7 @@
           <p:cNvPr id="7" name="Freeform: Shape 6">
             <a:extLst>
               <a:ext uri="{FF2B5EF4-FFF2-40B4-BE49-F238E27FC236}">
-                <a16:creationId xmlns="" xmlns:a16="http://schemas.microsoft.com/office/drawing/2014/main" id="{6F8E5CDA-EFCE-44B8-BC67-987C59E77E33}"/>
+                <a16:creationId xmlns:a16="http://schemas.microsoft.com/office/drawing/2014/main" xmlns="" id="{6F8E5CDA-EFCE-44B8-BC67-987C59E77E33}"/>
               </a:ext>
             </a:extLst>
           </p:cNvPr>
@@ -13498,7 +15316,136 @@
 </p:sld>
 </file>
 
-<file path=ppt/slides/slide39.xml><?xml version="1.0" encoding="utf-8"?>
+<file path=ppt/slides/slide4.xml><?xml version="1.0" encoding="utf-8"?>
+<p:sld xmlns:a="http://schemas.openxmlformats.org/drawingml/2006/main" xmlns:r="http://schemas.openxmlformats.org/officeDocument/2006/relationships" xmlns:p="http://schemas.openxmlformats.org/presentationml/2006/main">
+  <p:cSld>
+    <p:spTree>
+      <p:nvGrpSpPr>
+        <p:cNvPr id="1" name=""/>
+        <p:cNvGrpSpPr/>
+        <p:nvPr/>
+      </p:nvGrpSpPr>
+      <p:grpSpPr>
+        <a:xfrm>
+          <a:off x="0" y="0"/>
+          <a:ext cx="0" cy="0"/>
+          <a:chOff x="0" y="0"/>
+          <a:chExt cx="0" cy="0"/>
+        </a:xfrm>
+      </p:grpSpPr>
+      <p:sp>
+        <p:nvSpPr>
+          <p:cNvPr id="4" name="Oval 3"/>
+          <p:cNvSpPr/>
+          <p:nvPr/>
+        </p:nvSpPr>
+        <p:spPr>
+          <a:xfrm>
+            <a:off x="3355759" y="2212759"/>
+            <a:ext cx="2432482" cy="2432482"/>
+          </a:xfrm>
+          <a:prstGeom prst="ellipse">
+            <a:avLst/>
+          </a:prstGeom>
+          <a:noFill/>
+          <a:ln w="254000">
+            <a:solidFill>
+              <a:schemeClr val="bg1"/>
+            </a:solidFill>
+          </a:ln>
+        </p:spPr>
+        <p:style>
+          <a:lnRef idx="2">
+            <a:schemeClr val="accent1">
+              <a:shade val="50000"/>
+            </a:schemeClr>
+          </a:lnRef>
+          <a:fillRef idx="1">
+            <a:schemeClr val="accent1"/>
+          </a:fillRef>
+          <a:effectRef idx="0">
+            <a:schemeClr val="accent1"/>
+          </a:effectRef>
+          <a:fontRef idx="minor">
+            <a:schemeClr val="lt1"/>
+          </a:fontRef>
+        </p:style>
+        <p:txBody>
+          <a:bodyPr rtlCol="0" anchor="ctr"/>
+          <a:lstStyle/>
+          <a:p>
+            <a:pPr algn="ctr"/>
+            <a:endParaRPr lang="en-IN"/>
+          </a:p>
+        </p:txBody>
+      </p:sp>
+      <p:sp>
+        <p:nvSpPr>
+          <p:cNvPr id="6" name="Arc 5"/>
+          <p:cNvSpPr/>
+          <p:nvPr/>
+        </p:nvSpPr>
+        <p:spPr>
+          <a:xfrm>
+            <a:off x="3851910" y="2708910"/>
+            <a:ext cx="1440180" cy="1440180"/>
+          </a:xfrm>
+          <a:prstGeom prst="arc">
+            <a:avLst/>
+          </a:prstGeom>
+          <a:noFill/>
+          <a:ln w="254000" cap="rnd">
+            <a:solidFill>
+              <a:srgbClr val="FF8100"/>
+            </a:solidFill>
+          </a:ln>
+        </p:spPr>
+        <p:style>
+          <a:lnRef idx="2">
+            <a:schemeClr val="accent1">
+              <a:shade val="50000"/>
+            </a:schemeClr>
+          </a:lnRef>
+          <a:fillRef idx="1">
+            <a:schemeClr val="accent1"/>
+          </a:fillRef>
+          <a:effectRef idx="0">
+            <a:schemeClr val="accent1"/>
+          </a:effectRef>
+          <a:fontRef idx="minor">
+            <a:schemeClr val="lt1"/>
+          </a:fontRef>
+        </p:style>
+        <p:txBody>
+          <a:bodyPr rtlCol="0" anchor="ctr"/>
+          <a:lstStyle/>
+          <a:p>
+            <a:pPr algn="ctr"/>
+            <a:endParaRPr lang="en-IN"/>
+          </a:p>
+        </p:txBody>
+      </p:sp>
+    </p:spTree>
+    <p:extLst>
+      <p:ext uri="{BB962C8B-B14F-4D97-AF65-F5344CB8AC3E}">
+        <p14:creationId xmlns:p14="http://schemas.microsoft.com/office/powerpoint/2010/main" val="198311063"/>
+      </p:ext>
+    </p:extLst>
+  </p:cSld>
+  <p:clrMapOvr>
+    <a:masterClrMapping/>
+  </p:clrMapOvr>
+  <p:timing>
+    <p:tnLst>
+      <p:par>
+        <p:cTn id="1" dur="indefinite" restart="never" nodeType="tmRoot"/>
+      </p:par>
+    </p:tnLst>
+  </p:timing>
+</p:sld>
+</file>
+
+<file path=ppt/slides/slide40.xml><?xml version="1.0" encoding="utf-8"?>
 <p:sld xmlns:a="http://schemas.openxmlformats.org/drawingml/2006/main" xmlns:r="http://schemas.openxmlformats.org/officeDocument/2006/relationships" xmlns:p="http://schemas.openxmlformats.org/presentationml/2006/main">
   <p:cSld>
     <p:spTree>
@@ -13520,7 +15467,7 @@
           <p:cNvPr id="4" name="Rectangle: Rounded Corners 3">
             <a:extLst>
               <a:ext uri="{FF2B5EF4-FFF2-40B4-BE49-F238E27FC236}">
-                <a16:creationId xmlns="" xmlns:a16="http://schemas.microsoft.com/office/drawing/2014/main" id="{FE6125FE-148F-4C48-AA05-7BC4E92676FA}"/>
+                <a16:creationId xmlns:a16="http://schemas.microsoft.com/office/drawing/2014/main" xmlns="" id="{FE6125FE-148F-4C48-AA05-7BC4E92676FA}"/>
               </a:ext>
             </a:extLst>
           </p:cNvPr>
@@ -13591,90 +15538,7 @@
 </p:sld>
 </file>
 
-<file path=ppt/slides/slide4.xml><?xml version="1.0" encoding="utf-8"?>
-<p:sld xmlns:a="http://schemas.openxmlformats.org/drawingml/2006/main" xmlns:r="http://schemas.openxmlformats.org/officeDocument/2006/relationships" xmlns:p="http://schemas.openxmlformats.org/presentationml/2006/main">
-  <p:cSld>
-    <p:spTree>
-      <p:nvGrpSpPr>
-        <p:cNvPr id="1" name=""/>
-        <p:cNvGrpSpPr/>
-        <p:nvPr/>
-      </p:nvGrpSpPr>
-      <p:grpSpPr>
-        <a:xfrm>
-          <a:off x="0" y="0"/>
-          <a:ext cx="0" cy="0"/>
-          <a:chOff x="0" y="0"/>
-          <a:chExt cx="0" cy="0"/>
-        </a:xfrm>
-      </p:grpSpPr>
-      <p:sp>
-        <p:nvSpPr>
-          <p:cNvPr id="2" name="Rectangle 1"/>
-          <p:cNvSpPr/>
-          <p:nvPr/>
-        </p:nvSpPr>
-        <p:spPr>
-          <a:xfrm rot="18900000">
-            <a:off x="4438835" y="1957526"/>
-            <a:ext cx="266330" cy="2942948"/>
-          </a:xfrm>
-          <a:prstGeom prst="rect">
-            <a:avLst/>
-          </a:prstGeom>
-          <a:solidFill>
-            <a:schemeClr val="bg1"/>
-          </a:solidFill>
-          <a:ln>
-            <a:noFill/>
-          </a:ln>
-        </p:spPr>
-        <p:style>
-          <a:lnRef idx="2">
-            <a:schemeClr val="accent1">
-              <a:shade val="50000"/>
-            </a:schemeClr>
-          </a:lnRef>
-          <a:fillRef idx="1">
-            <a:schemeClr val="accent1"/>
-          </a:fillRef>
-          <a:effectRef idx="0">
-            <a:schemeClr val="accent1"/>
-          </a:effectRef>
-          <a:fontRef idx="minor">
-            <a:schemeClr val="lt1"/>
-          </a:fontRef>
-        </p:style>
-        <p:txBody>
-          <a:bodyPr rtlCol="0" anchor="ctr"/>
-          <a:lstStyle/>
-          <a:p>
-            <a:pPr algn="ctr"/>
-            <a:endParaRPr lang="en-IN"/>
-          </a:p>
-        </p:txBody>
-      </p:sp>
-    </p:spTree>
-    <p:extLst>
-      <p:ext uri="{BB962C8B-B14F-4D97-AF65-F5344CB8AC3E}">
-        <p14:creationId xmlns:p14="http://schemas.microsoft.com/office/powerpoint/2010/main" val="3332374155"/>
-      </p:ext>
-    </p:extLst>
-  </p:cSld>
-  <p:clrMapOvr>
-    <a:masterClrMapping/>
-  </p:clrMapOvr>
-  <p:timing>
-    <p:tnLst>
-      <p:par>
-        <p:cTn id="1" dur="indefinite" restart="never" nodeType="tmRoot"/>
-      </p:par>
-    </p:tnLst>
-  </p:timing>
-</p:sld>
-</file>
-
-<file path=ppt/slides/slide40.xml><?xml version="1.0" encoding="utf-8"?>
+<file path=ppt/slides/slide41.xml><?xml version="1.0" encoding="utf-8"?>
 <p:sld xmlns:a="http://schemas.openxmlformats.org/drawingml/2006/main" xmlns:r="http://schemas.openxmlformats.org/officeDocument/2006/relationships" xmlns:p="http://schemas.openxmlformats.org/presentationml/2006/main">
   <p:cSld>
     <p:spTree>
@@ -13696,7 +15560,7 @@
           <p:cNvPr id="12" name="Oval 11">
             <a:extLst>
               <a:ext uri="{FF2B5EF4-FFF2-40B4-BE49-F238E27FC236}">
-                <a16:creationId xmlns="" xmlns:a16="http://schemas.microsoft.com/office/drawing/2014/main" id="{1A059B5F-1408-40FB-BD3A-59B1FF9E11A3}"/>
+                <a16:creationId xmlns:a16="http://schemas.microsoft.com/office/drawing/2014/main" xmlns="" id="{1A059B5F-1408-40FB-BD3A-59B1FF9E11A3}"/>
               </a:ext>
             </a:extLst>
           </p:cNvPr>
@@ -13751,7 +15615,7 @@
           <p:cNvPr id="6" name="Oval 5">
             <a:extLst>
               <a:ext uri="{FF2B5EF4-FFF2-40B4-BE49-F238E27FC236}">
-                <a16:creationId xmlns="" xmlns:a16="http://schemas.microsoft.com/office/drawing/2014/main" id="{B3780517-6320-40FB-9E67-BC059FDA6F3C}"/>
+                <a16:creationId xmlns:a16="http://schemas.microsoft.com/office/drawing/2014/main" xmlns="" id="{B3780517-6320-40FB-9E67-BC059FDA6F3C}"/>
               </a:ext>
             </a:extLst>
           </p:cNvPr>
@@ -13806,7 +15670,7 @@
           <p:cNvPr id="7" name="Freeform: Shape 6">
             <a:extLst>
               <a:ext uri="{FF2B5EF4-FFF2-40B4-BE49-F238E27FC236}">
-                <a16:creationId xmlns="" xmlns:a16="http://schemas.microsoft.com/office/drawing/2014/main" id="{AECFE025-7D33-4E00-BA80-F948E98F4107}"/>
+                <a16:creationId xmlns:a16="http://schemas.microsoft.com/office/drawing/2014/main" xmlns="" id="{AECFE025-7D33-4E00-BA80-F948E98F4107}"/>
               </a:ext>
             </a:extLst>
           </p:cNvPr>
@@ -13951,7 +15815,7 @@
           <p:cNvPr id="9" name="Freeform: Shape 8">
             <a:extLst>
               <a:ext uri="{FF2B5EF4-FFF2-40B4-BE49-F238E27FC236}">
-                <a16:creationId xmlns="" xmlns:a16="http://schemas.microsoft.com/office/drawing/2014/main" id="{B3A41357-7409-4936-82F9-F5D0CFB8DA54}"/>
+                <a16:creationId xmlns:a16="http://schemas.microsoft.com/office/drawing/2014/main" xmlns="" id="{B3A41357-7409-4936-82F9-F5D0CFB8DA54}"/>
               </a:ext>
             </a:extLst>
           </p:cNvPr>
@@ -14096,7 +15960,7 @@
           <p:cNvPr id="8" name="Picture 7">
             <a:extLst>
               <a:ext uri="{FF2B5EF4-FFF2-40B4-BE49-F238E27FC236}">
-                <a16:creationId xmlns="" xmlns:a16="http://schemas.microsoft.com/office/drawing/2014/main" id="{8F1CB0A6-96B4-4825-9109-5803C657C1FB}"/>
+                <a16:creationId xmlns:a16="http://schemas.microsoft.com/office/drawing/2014/main" xmlns="" id="{8F1CB0A6-96B4-4825-9109-5803C657C1FB}"/>
               </a:ext>
             </a:extLst>
           </p:cNvPr>
@@ -14135,6 +15999,89 @@
 </file>
 
 <file path=ppt/slides/slide5.xml><?xml version="1.0" encoding="utf-8"?>
+<p:sld xmlns:a="http://schemas.openxmlformats.org/drawingml/2006/main" xmlns:r="http://schemas.openxmlformats.org/officeDocument/2006/relationships" xmlns:p="http://schemas.openxmlformats.org/presentationml/2006/main">
+  <p:cSld>
+    <p:spTree>
+      <p:nvGrpSpPr>
+        <p:cNvPr id="1" name=""/>
+        <p:cNvGrpSpPr/>
+        <p:nvPr/>
+      </p:nvGrpSpPr>
+      <p:grpSpPr>
+        <a:xfrm>
+          <a:off x="0" y="0"/>
+          <a:ext cx="0" cy="0"/>
+          <a:chOff x="0" y="0"/>
+          <a:chExt cx="0" cy="0"/>
+        </a:xfrm>
+      </p:grpSpPr>
+      <p:sp>
+        <p:nvSpPr>
+          <p:cNvPr id="2" name="Rectangle 1"/>
+          <p:cNvSpPr/>
+          <p:nvPr/>
+        </p:nvSpPr>
+        <p:spPr>
+          <a:xfrm rot="18900000">
+            <a:off x="4438835" y="1957526"/>
+            <a:ext cx="266330" cy="2942948"/>
+          </a:xfrm>
+          <a:prstGeom prst="rect">
+            <a:avLst/>
+          </a:prstGeom>
+          <a:solidFill>
+            <a:schemeClr val="bg1"/>
+          </a:solidFill>
+          <a:ln>
+            <a:noFill/>
+          </a:ln>
+        </p:spPr>
+        <p:style>
+          <a:lnRef idx="2">
+            <a:schemeClr val="accent1">
+              <a:shade val="50000"/>
+            </a:schemeClr>
+          </a:lnRef>
+          <a:fillRef idx="1">
+            <a:schemeClr val="accent1"/>
+          </a:fillRef>
+          <a:effectRef idx="0">
+            <a:schemeClr val="accent1"/>
+          </a:effectRef>
+          <a:fontRef idx="minor">
+            <a:schemeClr val="lt1"/>
+          </a:fontRef>
+        </p:style>
+        <p:txBody>
+          <a:bodyPr rtlCol="0" anchor="ctr"/>
+          <a:lstStyle/>
+          <a:p>
+            <a:pPr algn="ctr"/>
+            <a:endParaRPr lang="en-IN"/>
+          </a:p>
+        </p:txBody>
+      </p:sp>
+    </p:spTree>
+    <p:extLst>
+      <p:ext uri="{BB962C8B-B14F-4D97-AF65-F5344CB8AC3E}">
+        <p14:creationId xmlns:p14="http://schemas.microsoft.com/office/powerpoint/2010/main" val="3332374155"/>
+      </p:ext>
+    </p:extLst>
+  </p:cSld>
+  <p:clrMapOvr>
+    <a:masterClrMapping/>
+  </p:clrMapOvr>
+  <p:timing>
+    <p:tnLst>
+      <p:par>
+        <p:cTn id="1" dur="indefinite" restart="never" nodeType="tmRoot"/>
+      </p:par>
+    </p:tnLst>
+  </p:timing>
+</p:sld>
+</file>
+
+<file path=ppt/slides/slide6.xml><?xml version="1.0" encoding="utf-8"?>
 <p:sld xmlns:a="http://schemas.openxmlformats.org/drawingml/2006/main" xmlns:r="http://schemas.openxmlformats.org/officeDocument/2006/relationships" xmlns:p="http://schemas.openxmlformats.org/presentationml/2006/main">
   <p:cSld>
     <p:spTree>
@@ -14226,7 +16173,7 @@
 </p:sld>
 </file>
 
-<file path=ppt/slides/slide6.xml><?xml version="1.0" encoding="utf-8"?>
+<file path=ppt/slides/slide7.xml><?xml version="1.0" encoding="utf-8"?>
 <p:sld xmlns:a="http://schemas.openxmlformats.org/drawingml/2006/main" xmlns:r="http://schemas.openxmlformats.org/officeDocument/2006/relationships" xmlns:p="http://schemas.openxmlformats.org/presentationml/2006/main">
   <p:cSld>
     <p:spTree>
@@ -14856,7 +16803,7 @@
 </p:sld>
 </file>
 
-<file path=ppt/slides/slide7.xml><?xml version="1.0" encoding="utf-8"?>
+<file path=ppt/slides/slide8.xml><?xml version="1.0" encoding="utf-8"?>
 <p:sld xmlns:a="http://schemas.openxmlformats.org/drawingml/2006/main" xmlns:r="http://schemas.openxmlformats.org/officeDocument/2006/relationships" xmlns:p="http://schemas.openxmlformats.org/presentationml/2006/main">
   <p:cSld>
     <p:spTree>
@@ -15312,7 +17259,7 @@
 </p:sld>
 </file>
 
-<file path=ppt/slides/slide8.xml><?xml version="1.0" encoding="utf-8"?>
+<file path=ppt/slides/slide9.xml><?xml version="1.0" encoding="utf-8"?>
 <p:sld xmlns:a="http://schemas.openxmlformats.org/drawingml/2006/main" xmlns:r="http://schemas.openxmlformats.org/officeDocument/2006/relationships" xmlns:p="http://schemas.openxmlformats.org/presentationml/2006/main">
   <p:cSld>
     <p:spTree>
@@ -15453,234 +17400,6 @@
       </p:par>
     </p:tnLst>
   </p:timing>
-</p:sld>
-</file>
-
-<file path=ppt/slides/slide9.xml><?xml version="1.0" encoding="utf-8"?>
-<p:sld xmlns:a="http://schemas.openxmlformats.org/drawingml/2006/main" xmlns:r="http://schemas.openxmlformats.org/officeDocument/2006/relationships" xmlns:p="http://schemas.openxmlformats.org/presentationml/2006/main">
-  <p:cSld>
-    <p:spTree>
-      <p:nvGrpSpPr>
-        <p:cNvPr id="1" name=""/>
-        <p:cNvGrpSpPr/>
-        <p:nvPr/>
-      </p:nvGrpSpPr>
-      <p:grpSpPr>
-        <a:xfrm>
-          <a:off x="0" y="0"/>
-          <a:ext cx="0" cy="0"/>
-          <a:chOff x="0" y="0"/>
-          <a:chExt cx="0" cy="0"/>
-        </a:xfrm>
-      </p:grpSpPr>
-      <p:sp>
-        <p:nvSpPr>
-          <p:cNvPr id="2" name="Block Arc 1">
-            <a:extLst>
-              <a:ext uri="{FF2B5EF4-FFF2-40B4-BE49-F238E27FC236}">
-                <a16:creationId xmlns="" xmlns:a16="http://schemas.microsoft.com/office/drawing/2014/main" id="{50F54194-7244-4A73-A53A-5DF7B86F498D}"/>
-              </a:ext>
-            </a:extLst>
-          </p:cNvPr>
-          <p:cNvSpPr/>
-          <p:nvPr/>
-        </p:nvSpPr>
-        <p:spPr>
-          <a:xfrm>
-            <a:off x="3131820" y="1988820"/>
-            <a:ext cx="2880360" cy="2880360"/>
-          </a:xfrm>
-          <a:prstGeom prst="blockArc">
-            <a:avLst>
-              <a:gd name="adj1" fmla="val 10800000"/>
-              <a:gd name="adj2" fmla="val 9838672"/>
-              <a:gd name="adj3" fmla="val 9265"/>
-            </a:avLst>
-          </a:prstGeom>
-          <a:solidFill>
-            <a:schemeClr val="bg1"/>
-          </a:solidFill>
-          <a:ln w="190500">
-            <a:noFill/>
-          </a:ln>
-        </p:spPr>
-        <p:style>
-          <a:lnRef idx="2">
-            <a:schemeClr val="accent1">
-              <a:shade val="50000"/>
-            </a:schemeClr>
-          </a:lnRef>
-          <a:fillRef idx="1">
-            <a:schemeClr val="accent1"/>
-          </a:fillRef>
-          <a:effectRef idx="0">
-            <a:schemeClr val="accent1"/>
-          </a:effectRef>
-          <a:fontRef idx="minor">
-            <a:schemeClr val="lt1"/>
-          </a:fontRef>
-        </p:style>
-        <p:txBody>
-          <a:bodyPr rtlCol="0" anchor="ctr"/>
-          <a:lstStyle/>
-          <a:p>
-            <a:pPr algn="ctr"/>
-            <a:endParaRPr lang="en-IN"/>
-          </a:p>
-        </p:txBody>
-      </p:sp>
-      <p:sp>
-        <p:nvSpPr>
-          <p:cNvPr id="3" name="Right Triangle 2"/>
-          <p:cNvSpPr/>
-          <p:nvPr/>
-        </p:nvSpPr>
-        <p:spPr>
-          <a:xfrm rot="19800000">
-            <a:off x="2995083" y="2861428"/>
-            <a:ext cx="636815" cy="636815"/>
-          </a:xfrm>
-          <a:prstGeom prst="rtTriangle">
-            <a:avLst/>
-          </a:prstGeom>
-          <a:solidFill>
-            <a:schemeClr val="bg1"/>
-          </a:solidFill>
-          <a:ln w="190500">
-            <a:noFill/>
-          </a:ln>
-        </p:spPr>
-        <p:style>
-          <a:lnRef idx="2">
-            <a:schemeClr val="accent1">
-              <a:shade val="50000"/>
-            </a:schemeClr>
-          </a:lnRef>
-          <a:fillRef idx="1">
-            <a:schemeClr val="accent1"/>
-          </a:fillRef>
-          <a:effectRef idx="0">
-            <a:schemeClr val="accent1"/>
-          </a:effectRef>
-          <a:fontRef idx="minor">
-            <a:schemeClr val="lt1"/>
-          </a:fontRef>
-        </p:style>
-        <p:txBody>
-          <a:bodyPr rtlCol="0" anchor="ctr"/>
-          <a:lstStyle/>
-          <a:p>
-            <a:pPr algn="ctr"/>
-            <a:endParaRPr lang="en-IN"/>
-          </a:p>
-        </p:txBody>
-      </p:sp>
-      <p:sp>
-        <p:nvSpPr>
-          <p:cNvPr id="4" name="Rounded Rectangle 3"/>
-          <p:cNvSpPr/>
-          <p:nvPr/>
-        </p:nvSpPr>
-        <p:spPr>
-          <a:xfrm rot="19894297">
-            <a:off x="4248150" y="2590925"/>
-            <a:ext cx="276225" cy="1066800"/>
-          </a:xfrm>
-          <a:prstGeom prst="roundRect">
-            <a:avLst>
-              <a:gd name="adj" fmla="val 50000"/>
-            </a:avLst>
-          </a:prstGeom>
-          <a:solidFill>
-            <a:schemeClr val="bg1"/>
-          </a:solidFill>
-          <a:ln w="190500">
-            <a:noFill/>
-          </a:ln>
-        </p:spPr>
-        <p:style>
-          <a:lnRef idx="2">
-            <a:schemeClr val="accent1">
-              <a:shade val="50000"/>
-            </a:schemeClr>
-          </a:lnRef>
-          <a:fillRef idx="1">
-            <a:schemeClr val="accent1"/>
-          </a:fillRef>
-          <a:effectRef idx="0">
-            <a:schemeClr val="accent1"/>
-          </a:effectRef>
-          <a:fontRef idx="minor">
-            <a:schemeClr val="lt1"/>
-          </a:fontRef>
-        </p:style>
-        <p:txBody>
-          <a:bodyPr rtlCol="0" anchor="ctr"/>
-          <a:lstStyle/>
-          <a:p>
-            <a:pPr algn="ctr"/>
-            <a:endParaRPr lang="en-IN"/>
-          </a:p>
-        </p:txBody>
-      </p:sp>
-      <p:sp>
-        <p:nvSpPr>
-          <p:cNvPr id="5" name="Rounded Rectangle 4"/>
-          <p:cNvSpPr/>
-          <p:nvPr/>
-        </p:nvSpPr>
-        <p:spPr>
-          <a:xfrm rot="17100000">
-            <a:off x="4846746" y="3081389"/>
-            <a:ext cx="276225" cy="1066800"/>
-          </a:xfrm>
-          <a:prstGeom prst="roundRect">
-            <a:avLst>
-              <a:gd name="adj" fmla="val 50000"/>
-            </a:avLst>
-          </a:prstGeom>
-          <a:solidFill>
-            <a:schemeClr val="bg1"/>
-          </a:solidFill>
-          <a:ln w="190500">
-            <a:noFill/>
-          </a:ln>
-        </p:spPr>
-        <p:style>
-          <a:lnRef idx="2">
-            <a:schemeClr val="accent1">
-              <a:shade val="50000"/>
-            </a:schemeClr>
-          </a:lnRef>
-          <a:fillRef idx="1">
-            <a:schemeClr val="accent1"/>
-          </a:fillRef>
-          <a:effectRef idx="0">
-            <a:schemeClr val="accent1"/>
-          </a:effectRef>
-          <a:fontRef idx="minor">
-            <a:schemeClr val="lt1"/>
-          </a:fontRef>
-        </p:style>
-        <p:txBody>
-          <a:bodyPr rtlCol="0" anchor="ctr"/>
-          <a:lstStyle/>
-          <a:p>
-            <a:pPr algn="ctr"/>
-            <a:endParaRPr lang="en-IN"/>
-          </a:p>
-        </p:txBody>
-      </p:sp>
-    </p:spTree>
-    <p:extLst>
-      <p:ext uri="{BB962C8B-B14F-4D97-AF65-F5344CB8AC3E}">
-        <p14:creationId xmlns:p14="http://schemas.microsoft.com/office/powerpoint/2010/main" val="745623334"/>
-      </p:ext>
-    </p:extLst>
-  </p:cSld>
-  <p:clrMapOvr>
-    <a:masterClrMapping/>
-  </p:clrMapOvr>
 </p:sld>
 </file>
 

</xml_diff>